<commit_message>
Figure formatting and creation of top players list
</commit_message>
<xml_diff>
--- a/HG_Project_Presentation.pptx
+++ b/HG_Project_Presentation.pptx
@@ -5,17 +5,22 @@
     <p:sldMasterId id="2147483648" r:id="rId1"/>
   </p:sldMasterIdLst>
   <p:notesMasterIdLst>
-    <p:notesMasterId r:id="rId10"/>
+    <p:notesMasterId r:id="rId15"/>
   </p:notesMasterIdLst>
   <p:sldIdLst>
     <p:sldId id="256" r:id="rId2"/>
     <p:sldId id="257" r:id="rId3"/>
-    <p:sldId id="260" r:id="rId4"/>
-    <p:sldId id="258" r:id="rId5"/>
+    <p:sldId id="258" r:id="rId4"/>
+    <p:sldId id="260" r:id="rId5"/>
     <p:sldId id="259" r:id="rId6"/>
     <p:sldId id="261" r:id="rId7"/>
-    <p:sldId id="262" r:id="rId8"/>
-    <p:sldId id="263" r:id="rId9"/>
+    <p:sldId id="268" r:id="rId8"/>
+    <p:sldId id="265" r:id="rId9"/>
+    <p:sldId id="266" r:id="rId10"/>
+    <p:sldId id="267" r:id="rId11"/>
+    <p:sldId id="262" r:id="rId12"/>
+    <p:sldId id="264" r:id="rId13"/>
+    <p:sldId id="263" r:id="rId14"/>
   </p:sldIdLst>
   <p:sldSz cx="12192000" cy="6858000"/>
   <p:notesSz cx="6858000" cy="9144000"/>
@@ -114,6 +119,11 @@
       </a:defRPr>
     </a:lvl9pPr>
   </p:defaultTextStyle>
+  <p:extLst>
+    <p:ext uri="{EFAFB233-063F-42B5-8137-9DF3F51BA10A}">
+      <p15:sldGuideLst xmlns:p15="http://schemas.microsoft.com/office/powerpoint/2012/main"/>
+    </p:ext>
+  </p:extLst>
 </p:presentation>
 </file>
 
@@ -531,7 +541,91 @@
           <a:p>
             <a:fld id="{25AF314E-78C7-FF42-BF7F-A612900D3EF2}" type="slidenum">
               <a:rPr lang="en-US" smtClean="0"/>
-              <a:t>7</a:t>
+              <a:t>8</a:t>
+            </a:fld>
+            <a:endParaRPr lang="en-US"/>
+          </a:p>
+        </p:txBody>
+      </p:sp>
+    </p:spTree>
+    <p:extLst>
+      <p:ext uri="{BB962C8B-B14F-4D97-AF65-F5344CB8AC3E}">
+        <p14:creationId xmlns:p14="http://schemas.microsoft.com/office/powerpoint/2010/main" val="3943865202"/>
+      </p:ext>
+    </p:extLst>
+  </p:cSld>
+  <p:clrMapOvr>
+    <a:masterClrMapping/>
+  </p:clrMapOvr>
+</p:notes>
+</file>
+
+<file path=ppt/notesSlides/notesSlide2.xml><?xml version="1.0" encoding="utf-8"?>
+<p:notes xmlns:a="http://schemas.openxmlformats.org/drawingml/2006/main" xmlns:r="http://schemas.openxmlformats.org/officeDocument/2006/relationships" xmlns:p="http://schemas.openxmlformats.org/presentationml/2006/main">
+  <p:cSld>
+    <p:spTree>
+      <p:nvGrpSpPr>
+        <p:cNvPr id="1" name=""/>
+        <p:cNvGrpSpPr/>
+        <p:nvPr/>
+      </p:nvGrpSpPr>
+      <p:grpSpPr>
+        <a:xfrm>
+          <a:off x="0" y="0"/>
+          <a:ext cx="0" cy="0"/>
+          <a:chOff x="0" y="0"/>
+          <a:chExt cx="0" cy="0"/>
+        </a:xfrm>
+      </p:grpSpPr>
+      <p:sp>
+        <p:nvSpPr>
+          <p:cNvPr id="2" name="Slide Image Placeholder 1"/>
+          <p:cNvSpPr>
+            <a:spLocks noGrp="1" noRot="1" noChangeAspect="1"/>
+          </p:cNvSpPr>
+          <p:nvPr>
+            <p:ph type="sldImg"/>
+          </p:nvPr>
+        </p:nvSpPr>
+        <p:spPr/>
+      </p:sp>
+      <p:sp>
+        <p:nvSpPr>
+          <p:cNvPr id="3" name="Notes Placeholder 2"/>
+          <p:cNvSpPr>
+            <a:spLocks noGrp="1"/>
+          </p:cNvSpPr>
+          <p:nvPr>
+            <p:ph type="body" idx="1"/>
+          </p:nvPr>
+        </p:nvSpPr>
+        <p:spPr/>
+        <p:txBody>
+          <a:bodyPr/>
+          <a:lstStyle/>
+          <a:p>
+            <a:endParaRPr lang="en-US" dirty="0"/>
+          </a:p>
+        </p:txBody>
+      </p:sp>
+      <p:sp>
+        <p:nvSpPr>
+          <p:cNvPr id="4" name="Slide Number Placeholder 3"/>
+          <p:cNvSpPr>
+            <a:spLocks noGrp="1"/>
+          </p:cNvSpPr>
+          <p:nvPr>
+            <p:ph type="sldNum" sz="quarter" idx="5"/>
+          </p:nvPr>
+        </p:nvSpPr>
+        <p:spPr/>
+        <p:txBody>
+          <a:bodyPr/>
+          <a:lstStyle/>
+          <a:p>
+            <a:fld id="{25AF314E-78C7-FF42-BF7F-A612900D3EF2}" type="slidenum">
+              <a:rPr lang="en-US" smtClean="0"/>
+              <a:t>11</a:t>
             </a:fld>
             <a:endParaRPr lang="en-US"/>
           </a:p>
@@ -3833,6 +3927,416 @@
 </p:sld>
 </file>
 
+<file path=ppt/slides/slide10.xml><?xml version="1.0" encoding="utf-8"?>
+<p:sld xmlns:a="http://schemas.openxmlformats.org/drawingml/2006/main" xmlns:r="http://schemas.openxmlformats.org/officeDocument/2006/relationships" xmlns:p="http://schemas.openxmlformats.org/presentationml/2006/main">
+  <p:cSld>
+    <p:spTree>
+      <p:nvGrpSpPr>
+        <p:cNvPr id="1" name=""/>
+        <p:cNvGrpSpPr/>
+        <p:nvPr/>
+      </p:nvGrpSpPr>
+      <p:grpSpPr>
+        <a:xfrm>
+          <a:off x="0" y="0"/>
+          <a:ext cx="0" cy="0"/>
+          <a:chOff x="0" y="0"/>
+          <a:chExt cx="0" cy="0"/>
+        </a:xfrm>
+      </p:grpSpPr>
+      <p:pic>
+        <p:nvPicPr>
+          <p:cNvPr id="3074" name="Picture 2">
+            <a:extLst>
+              <a:ext uri="{FF2B5EF4-FFF2-40B4-BE49-F238E27FC236}">
+                <a16:creationId xmlns:a16="http://schemas.microsoft.com/office/drawing/2014/main" id="{9777288B-69F8-2148-B5EF-D8A74AB32CA4}"/>
+              </a:ext>
+            </a:extLst>
+          </p:cNvPr>
+          <p:cNvPicPr>
+            <a:picLocks noChangeAspect="1" noChangeArrowheads="1"/>
+          </p:cNvPicPr>
+          <p:nvPr/>
+        </p:nvPicPr>
+        <p:blipFill>
+          <a:blip r:embed="rId2">
+            <a:extLst>
+              <a:ext uri="{28A0092B-C50C-407E-A947-70E740481C1C}">
+                <a14:useLocalDpi xmlns:a14="http://schemas.microsoft.com/office/drawing/2010/main" val="0"/>
+              </a:ext>
+            </a:extLst>
+          </a:blip>
+          <a:srcRect/>
+          <a:stretch>
+            <a:fillRect/>
+          </a:stretch>
+        </p:blipFill>
+        <p:spPr bwMode="auto">
+          <a:xfrm>
+            <a:off x="1022349" y="1966835"/>
+            <a:ext cx="4889500" cy="3733800"/>
+          </a:xfrm>
+          <a:prstGeom prst="rect">
+            <a:avLst/>
+          </a:prstGeom>
+          <a:noFill/>
+          <a:extLst>
+            <a:ext uri="{909E8E84-426E-40DD-AFC4-6F175D3DCCD1}">
+              <a14:hiddenFill xmlns:a14="http://schemas.microsoft.com/office/drawing/2010/main">
+                <a:solidFill>
+                  <a:srgbClr val="FFFFFF"/>
+                </a:solidFill>
+              </a14:hiddenFill>
+            </a:ext>
+          </a:extLst>
+        </p:spPr>
+      </p:pic>
+      <p:pic>
+        <p:nvPicPr>
+          <p:cNvPr id="3078" name="Picture 6">
+            <a:extLst>
+              <a:ext uri="{FF2B5EF4-FFF2-40B4-BE49-F238E27FC236}">
+                <a16:creationId xmlns:a16="http://schemas.microsoft.com/office/drawing/2014/main" id="{A4C24A3D-8039-7E4B-AAE5-635E23582E2E}"/>
+              </a:ext>
+            </a:extLst>
+          </p:cNvPr>
+          <p:cNvPicPr>
+            <a:picLocks noChangeAspect="1" noChangeArrowheads="1"/>
+          </p:cNvPicPr>
+          <p:nvPr/>
+        </p:nvPicPr>
+        <p:blipFill>
+          <a:blip r:embed="rId3">
+            <a:extLst>
+              <a:ext uri="{28A0092B-C50C-407E-A947-70E740481C1C}">
+                <a14:useLocalDpi xmlns:a14="http://schemas.microsoft.com/office/drawing/2010/main" val="0"/>
+              </a:ext>
+            </a:extLst>
+          </a:blip>
+          <a:srcRect/>
+          <a:stretch>
+            <a:fillRect/>
+          </a:stretch>
+        </p:blipFill>
+        <p:spPr bwMode="auto">
+          <a:xfrm>
+            <a:off x="6210300" y="1966835"/>
+            <a:ext cx="5143500" cy="3733800"/>
+          </a:xfrm>
+          <a:prstGeom prst="rect">
+            <a:avLst/>
+          </a:prstGeom>
+          <a:noFill/>
+          <a:extLst>
+            <a:ext uri="{909E8E84-426E-40DD-AFC4-6F175D3DCCD1}">
+              <a14:hiddenFill xmlns:a14="http://schemas.microsoft.com/office/drawing/2010/main">
+                <a:solidFill>
+                  <a:srgbClr val="FFFFFF"/>
+                </a:solidFill>
+              </a14:hiddenFill>
+            </a:ext>
+          </a:extLst>
+        </p:spPr>
+      </p:pic>
+      <p:sp>
+        <p:nvSpPr>
+          <p:cNvPr id="2" name="Title 1">
+            <a:extLst>
+              <a:ext uri="{FF2B5EF4-FFF2-40B4-BE49-F238E27FC236}">
+                <a16:creationId xmlns:a16="http://schemas.microsoft.com/office/drawing/2014/main" id="{840DD44B-4DA7-104A-9AB9-B44AC23E4973}"/>
+              </a:ext>
+            </a:extLst>
+          </p:cNvPr>
+          <p:cNvSpPr>
+            <a:spLocks noGrp="1"/>
+          </p:cNvSpPr>
+          <p:nvPr>
+            <p:ph type="title"/>
+          </p:nvPr>
+        </p:nvSpPr>
+        <p:spPr/>
+        <p:txBody>
+          <a:bodyPr/>
+          <a:lstStyle/>
+          <a:p>
+            <a:pPr algn="ctr"/>
+            <a:r>
+              <a:rPr lang="en-US" dirty="0"/>
+              <a:t>Single Player Performance Over Time</a:t>
+            </a:r>
+          </a:p>
+        </p:txBody>
+      </p:sp>
+    </p:spTree>
+    <p:extLst>
+      <p:ext uri="{BB962C8B-B14F-4D97-AF65-F5344CB8AC3E}">
+        <p14:creationId xmlns:p14="http://schemas.microsoft.com/office/powerpoint/2010/main" val="2149306525"/>
+      </p:ext>
+    </p:extLst>
+  </p:cSld>
+  <p:clrMapOvr>
+    <a:masterClrMapping/>
+  </p:clrMapOvr>
+</p:sld>
+</file>
+
+<file path=ppt/slides/slide11.xml><?xml version="1.0" encoding="utf-8"?>
+<p:sld xmlns:a="http://schemas.openxmlformats.org/drawingml/2006/main" xmlns:r="http://schemas.openxmlformats.org/officeDocument/2006/relationships" xmlns:p="http://schemas.openxmlformats.org/presentationml/2006/main">
+  <p:cSld>
+    <p:spTree>
+      <p:nvGrpSpPr>
+        <p:cNvPr id="1" name=""/>
+        <p:cNvGrpSpPr/>
+        <p:nvPr/>
+      </p:nvGrpSpPr>
+      <p:grpSpPr>
+        <a:xfrm>
+          <a:off x="0" y="0"/>
+          <a:ext cx="0" cy="0"/>
+          <a:chOff x="0" y="0"/>
+          <a:chExt cx="0" cy="0"/>
+        </a:xfrm>
+      </p:grpSpPr>
+      <p:sp>
+        <p:nvSpPr>
+          <p:cNvPr id="2" name="Title 1">
+            <a:extLst>
+              <a:ext uri="{FF2B5EF4-FFF2-40B4-BE49-F238E27FC236}">
+                <a16:creationId xmlns:a16="http://schemas.microsoft.com/office/drawing/2014/main" id="{C58022DE-B214-4544-A5E6-A291C49C5676}"/>
+              </a:ext>
+            </a:extLst>
+          </p:cNvPr>
+          <p:cNvSpPr>
+            <a:spLocks noGrp="1"/>
+          </p:cNvSpPr>
+          <p:nvPr>
+            <p:ph type="title"/>
+          </p:nvPr>
+        </p:nvSpPr>
+        <p:spPr/>
+        <p:txBody>
+          <a:bodyPr/>
+          <a:lstStyle/>
+          <a:p>
+            <a:pPr algn="ctr"/>
+            <a:r>
+              <a:rPr lang="en-US" dirty="0"/>
+              <a:t>Highest Value = Lowest Cost per Point</a:t>
+            </a:r>
+          </a:p>
+        </p:txBody>
+      </p:sp>
+      <p:pic>
+        <p:nvPicPr>
+          <p:cNvPr id="4" name="Picture 3" descr="Table&#10;&#10;Description automatically generated">
+            <a:extLst>
+              <a:ext uri="{FF2B5EF4-FFF2-40B4-BE49-F238E27FC236}">
+                <a16:creationId xmlns:a16="http://schemas.microsoft.com/office/drawing/2014/main" id="{C529653B-ED51-8942-B947-AD81E8E1F673}"/>
+              </a:ext>
+            </a:extLst>
+          </p:cNvPr>
+          <p:cNvPicPr>
+            <a:picLocks noChangeAspect="1"/>
+          </p:cNvPicPr>
+          <p:nvPr/>
+        </p:nvPicPr>
+        <p:blipFill>
+          <a:blip r:embed="rId3"/>
+          <a:stretch>
+            <a:fillRect/>
+          </a:stretch>
+        </p:blipFill>
+        <p:spPr>
+          <a:xfrm>
+            <a:off x="1687018" y="1796113"/>
+            <a:ext cx="8458200" cy="3835400"/>
+          </a:xfrm>
+          <a:prstGeom prst="rect">
+            <a:avLst/>
+          </a:prstGeom>
+        </p:spPr>
+      </p:pic>
+    </p:spTree>
+    <p:extLst>
+      <p:ext uri="{BB962C8B-B14F-4D97-AF65-F5344CB8AC3E}">
+        <p14:creationId xmlns:p14="http://schemas.microsoft.com/office/powerpoint/2010/main" val="3227469902"/>
+      </p:ext>
+    </p:extLst>
+  </p:cSld>
+  <p:clrMapOvr>
+    <a:masterClrMapping/>
+  </p:clrMapOvr>
+</p:sld>
+</file>
+
+<file path=ppt/slides/slide12.xml><?xml version="1.0" encoding="utf-8"?>
+<p:sld xmlns:a="http://schemas.openxmlformats.org/drawingml/2006/main" xmlns:r="http://schemas.openxmlformats.org/officeDocument/2006/relationships" xmlns:p="http://schemas.openxmlformats.org/presentationml/2006/main">
+  <p:cSld>
+    <p:spTree>
+      <p:nvGrpSpPr>
+        <p:cNvPr id="1" name=""/>
+        <p:cNvGrpSpPr/>
+        <p:nvPr/>
+      </p:nvGrpSpPr>
+      <p:grpSpPr>
+        <a:xfrm>
+          <a:off x="0" y="0"/>
+          <a:ext cx="0" cy="0"/>
+          <a:chOff x="0" y="0"/>
+          <a:chExt cx="0" cy="0"/>
+        </a:xfrm>
+      </p:grpSpPr>
+      <p:sp>
+        <p:nvSpPr>
+          <p:cNvPr id="2" name="Title 1">
+            <a:extLst>
+              <a:ext uri="{FF2B5EF4-FFF2-40B4-BE49-F238E27FC236}">
+                <a16:creationId xmlns:a16="http://schemas.microsoft.com/office/drawing/2014/main" id="{6302AD75-A531-EF44-A79E-FAEDFEE71576}"/>
+              </a:ext>
+            </a:extLst>
+          </p:cNvPr>
+          <p:cNvSpPr>
+            <a:spLocks noGrp="1"/>
+          </p:cNvSpPr>
+          <p:nvPr>
+            <p:ph type="title"/>
+          </p:nvPr>
+        </p:nvSpPr>
+        <p:spPr/>
+        <p:txBody>
+          <a:bodyPr/>
+          <a:lstStyle/>
+          <a:p>
+            <a:r>
+              <a:rPr lang="en-US" dirty="0"/>
+              <a:t>Future Work &amp; Next Steps</a:t>
+            </a:r>
+          </a:p>
+        </p:txBody>
+      </p:sp>
+      <p:sp>
+        <p:nvSpPr>
+          <p:cNvPr id="3" name="Content Placeholder 2">
+            <a:extLst>
+              <a:ext uri="{FF2B5EF4-FFF2-40B4-BE49-F238E27FC236}">
+                <a16:creationId xmlns:a16="http://schemas.microsoft.com/office/drawing/2014/main" id="{07BE3513-2B3D-6D4A-BE42-F25E410E6682}"/>
+              </a:ext>
+            </a:extLst>
+          </p:cNvPr>
+          <p:cNvSpPr>
+            <a:spLocks noGrp="1"/>
+          </p:cNvSpPr>
+          <p:nvPr>
+            <p:ph idx="1"/>
+          </p:nvPr>
+        </p:nvSpPr>
+        <p:spPr/>
+        <p:txBody>
+          <a:bodyPr/>
+          <a:lstStyle/>
+          <a:p>
+            <a:r>
+              <a:rPr lang="en-US" dirty="0"/>
+              <a:t>Create an app that can randomly generate lineups</a:t>
+            </a:r>
+          </a:p>
+          <a:p>
+            <a:r>
+              <a:rPr lang="en-US" dirty="0"/>
+              <a:t>Fill lineups with only my “highest valued” players at each position</a:t>
+            </a:r>
+          </a:p>
+          <a:p>
+            <a:r>
+              <a:rPr lang="en-US" dirty="0"/>
+              <a:t>Select lineup with highest projected points</a:t>
+            </a:r>
+          </a:p>
+          <a:p>
+            <a:r>
+              <a:rPr lang="en-US" dirty="0"/>
+              <a:t>Evaluate success over time</a:t>
+            </a:r>
+          </a:p>
+        </p:txBody>
+      </p:sp>
+    </p:spTree>
+    <p:extLst>
+      <p:ext uri="{BB962C8B-B14F-4D97-AF65-F5344CB8AC3E}">
+        <p14:creationId xmlns:p14="http://schemas.microsoft.com/office/powerpoint/2010/main" val="756298464"/>
+      </p:ext>
+    </p:extLst>
+  </p:cSld>
+  <p:clrMapOvr>
+    <a:masterClrMapping/>
+  </p:clrMapOvr>
+</p:sld>
+</file>
+
+<file path=ppt/slides/slide13.xml><?xml version="1.0" encoding="utf-8"?>
+<p:sld xmlns:a="http://schemas.openxmlformats.org/drawingml/2006/main" xmlns:r="http://schemas.openxmlformats.org/officeDocument/2006/relationships" xmlns:p="http://schemas.openxmlformats.org/presentationml/2006/main">
+  <p:cSld>
+    <p:spTree>
+      <p:nvGrpSpPr>
+        <p:cNvPr id="1" name=""/>
+        <p:cNvGrpSpPr/>
+        <p:nvPr/>
+      </p:nvGrpSpPr>
+      <p:grpSpPr>
+        <a:xfrm>
+          <a:off x="0" y="0"/>
+          <a:ext cx="0" cy="0"/>
+          <a:chOff x="0" y="0"/>
+          <a:chExt cx="0" cy="0"/>
+        </a:xfrm>
+      </p:grpSpPr>
+      <p:sp>
+        <p:nvSpPr>
+          <p:cNvPr id="2" name="Title 1">
+            <a:extLst>
+              <a:ext uri="{FF2B5EF4-FFF2-40B4-BE49-F238E27FC236}">
+                <a16:creationId xmlns:a16="http://schemas.microsoft.com/office/drawing/2014/main" id="{FF17B8DA-BB1D-DF4D-B4C7-7719CF8352BC}"/>
+              </a:ext>
+            </a:extLst>
+          </p:cNvPr>
+          <p:cNvSpPr>
+            <a:spLocks noGrp="1"/>
+          </p:cNvSpPr>
+          <p:nvPr>
+            <p:ph type="title"/>
+          </p:nvPr>
+        </p:nvSpPr>
+        <p:spPr>
+          <a:xfrm>
+            <a:off x="838200" y="2103437"/>
+            <a:ext cx="10515600" cy="1325563"/>
+          </a:xfrm>
+        </p:spPr>
+        <p:txBody>
+          <a:bodyPr/>
+          <a:lstStyle/>
+          <a:p>
+            <a:pPr algn="ctr"/>
+            <a:r>
+              <a:rPr lang="en-US" dirty="0"/>
+              <a:t>Questions?</a:t>
+            </a:r>
+          </a:p>
+        </p:txBody>
+      </p:sp>
+    </p:spTree>
+    <p:extLst>
+      <p:ext uri="{BB962C8B-B14F-4D97-AF65-F5344CB8AC3E}">
+        <p14:creationId xmlns:p14="http://schemas.microsoft.com/office/powerpoint/2010/main" val="2126567139"/>
+      </p:ext>
+    </p:extLst>
+  </p:cSld>
+  <p:clrMapOvr>
+    <a:masterClrMapping/>
+  </p:clrMapOvr>
+</p:sld>
+</file>
+
 <file path=ppt/slides/slide2.xml><?xml version="1.0" encoding="utf-8"?>
 <p:sld xmlns:a="http://schemas.openxmlformats.org/drawingml/2006/main" xmlns:r="http://schemas.openxmlformats.org/officeDocument/2006/relationships" xmlns:p="http://schemas.openxmlformats.org/presentationml/2006/main">
   <p:cSld>
@@ -3960,171 +4464,6 @@
           <a:chExt cx="0" cy="0"/>
         </a:xfrm>
       </p:grpSpPr>
-      <p:sp>
-        <p:nvSpPr>
-          <p:cNvPr id="2" name="Title 1">
-            <a:extLst>
-              <a:ext uri="{FF2B5EF4-FFF2-40B4-BE49-F238E27FC236}">
-                <a16:creationId xmlns:a16="http://schemas.microsoft.com/office/drawing/2014/main" id="{EEC47722-A41A-7145-B261-826E941E6E1A}"/>
-              </a:ext>
-            </a:extLst>
-          </p:cNvPr>
-          <p:cNvSpPr>
-            <a:spLocks noGrp="1"/>
-          </p:cNvSpPr>
-          <p:nvPr>
-            <p:ph type="title"/>
-          </p:nvPr>
-        </p:nvSpPr>
-        <p:spPr/>
-        <p:txBody>
-          <a:bodyPr/>
-          <a:lstStyle/>
-          <a:p>
-            <a:r>
-              <a:rPr lang="en-US" dirty="0"/>
-              <a:t>Market</a:t>
-            </a:r>
-          </a:p>
-        </p:txBody>
-      </p:sp>
-      <p:sp>
-        <p:nvSpPr>
-          <p:cNvPr id="3" name="Content Placeholder 2">
-            <a:extLst>
-              <a:ext uri="{FF2B5EF4-FFF2-40B4-BE49-F238E27FC236}">
-                <a16:creationId xmlns:a16="http://schemas.microsoft.com/office/drawing/2014/main" id="{D6255476-AA63-DB4D-B386-90BC4F45106A}"/>
-              </a:ext>
-            </a:extLst>
-          </p:cNvPr>
-          <p:cNvSpPr>
-            <a:spLocks noGrp="1"/>
-          </p:cNvSpPr>
-          <p:nvPr>
-            <p:ph idx="1"/>
-          </p:nvPr>
-        </p:nvSpPr>
-        <p:spPr/>
-        <p:txBody>
-          <a:bodyPr>
-            <a:normAutofit lnSpcReduction="10000"/>
-          </a:bodyPr>
-          <a:lstStyle/>
-          <a:p>
-            <a:r>
-              <a:rPr lang="en-US" dirty="0"/>
-              <a:t>Estimated 59 million fantasy sports players in US &amp; Canada</a:t>
-            </a:r>
-          </a:p>
-          <a:p>
-            <a:pPr lvl="1"/>
-            <a:r>
-              <a:rPr lang="en-US" dirty="0"/>
-              <a:t>40 million for fantasy football</a:t>
-            </a:r>
-          </a:p>
-          <a:p>
-            <a:r>
-              <a:rPr lang="en-US" dirty="0"/>
-              <a:t>$18.6 billion market</a:t>
-            </a:r>
-          </a:p>
-          <a:p>
-            <a:r>
-              <a:rPr lang="en-US" dirty="0"/>
-              <a:t>FanDuel</a:t>
-            </a:r>
-          </a:p>
-          <a:p>
-            <a:pPr lvl="1"/>
-            <a:r>
-              <a:rPr lang="en-US" dirty="0"/>
-              <a:t>$363 million in VC raised</a:t>
-            </a:r>
-          </a:p>
-          <a:p>
-            <a:pPr lvl="1"/>
-            <a:r>
-              <a:rPr lang="en-US" dirty="0"/>
-              <a:t>1,000 employees</a:t>
-            </a:r>
-          </a:p>
-          <a:p>
-            <a:pPr lvl="1"/>
-            <a:r>
-              <a:rPr lang="en-US" dirty="0"/>
-              <a:t>Estimated to pay out over $2 billion in winnings this year</a:t>
-            </a:r>
-          </a:p>
-          <a:p>
-            <a:pPr lvl="1"/>
-            <a:endParaRPr lang="en-US" dirty="0"/>
-          </a:p>
-          <a:p>
-            <a:pPr lvl="1"/>
-            <a:endParaRPr lang="en-US" dirty="0"/>
-          </a:p>
-          <a:p>
-            <a:pPr marL="457200" lvl="1" indent="0">
-              <a:buNone/>
-            </a:pPr>
-            <a:r>
-              <a:rPr lang="en-US" sz="1600" dirty="0"/>
-              <a:t>Sources: </a:t>
-            </a:r>
-            <a:r>
-              <a:rPr lang="en-US" sz="1600" dirty="0">
-                <a:hlinkClick r:id="rId2"/>
-              </a:rPr>
-              <a:t>https://www.sportsmanagementdegreehub.com/fantasy-football-industry/</a:t>
-            </a:r>
-            <a:r>
-              <a:rPr lang="en-US" sz="1600" dirty="0"/>
-              <a:t>, </a:t>
-            </a:r>
-            <a:r>
-              <a:rPr lang="en-US" sz="1600" dirty="0">
-                <a:hlinkClick r:id="rId3"/>
-              </a:rPr>
-              <a:t>https://appinventiv.com/blog/online-fantasy-sports-platform-changing-sports-industry/</a:t>
-            </a:r>
-            <a:r>
-              <a:rPr lang="en-US" sz="1600" dirty="0"/>
-              <a:t> </a:t>
-            </a:r>
-          </a:p>
-        </p:txBody>
-      </p:sp>
-    </p:spTree>
-    <p:extLst>
-      <p:ext uri="{BB962C8B-B14F-4D97-AF65-F5344CB8AC3E}">
-        <p14:creationId xmlns:p14="http://schemas.microsoft.com/office/powerpoint/2010/main" val="2250781521"/>
-      </p:ext>
-    </p:extLst>
-  </p:cSld>
-  <p:clrMapOvr>
-    <a:masterClrMapping/>
-  </p:clrMapOvr>
-</p:sld>
-</file>
-
-<file path=ppt/slides/slide4.xml><?xml version="1.0" encoding="utf-8"?>
-<p:sld xmlns:a="http://schemas.openxmlformats.org/drawingml/2006/main" xmlns:r="http://schemas.openxmlformats.org/officeDocument/2006/relationships" xmlns:p="http://schemas.openxmlformats.org/presentationml/2006/main">
-  <p:cSld>
-    <p:spTree>
-      <p:nvGrpSpPr>
-        <p:cNvPr id="1" name=""/>
-        <p:cNvGrpSpPr/>
-        <p:nvPr/>
-      </p:nvGrpSpPr>
-      <p:grpSpPr>
-        <a:xfrm>
-          <a:off x="0" y="0"/>
-          <a:ext cx="0" cy="0"/>
-          <a:chOff x="0" y="0"/>
-          <a:chExt cx="0" cy="0"/>
-        </a:xfrm>
-      </p:grpSpPr>
       <p:pic>
         <p:nvPicPr>
           <p:cNvPr id="1026" name="Picture 2" descr="Fantasy football advice, Wild Card weekend: FanDuel roster tinkering -  SBNation.com">
@@ -4154,7 +4493,7 @@
         </p:blipFill>
         <p:spPr bwMode="auto">
           <a:xfrm>
-            <a:off x="1176095" y="766068"/>
+            <a:off x="1580830" y="665573"/>
             <a:ext cx="7795883" cy="5526854"/>
           </a:xfrm>
           <a:prstGeom prst="rect">
@@ -4185,6 +4524,171 @@
 </p:sld>
 </file>
 
+<file path=ppt/slides/slide4.xml><?xml version="1.0" encoding="utf-8"?>
+<p:sld xmlns:a="http://schemas.openxmlformats.org/drawingml/2006/main" xmlns:r="http://schemas.openxmlformats.org/officeDocument/2006/relationships" xmlns:p="http://schemas.openxmlformats.org/presentationml/2006/main">
+  <p:cSld>
+    <p:spTree>
+      <p:nvGrpSpPr>
+        <p:cNvPr id="1" name=""/>
+        <p:cNvGrpSpPr/>
+        <p:nvPr/>
+      </p:nvGrpSpPr>
+      <p:grpSpPr>
+        <a:xfrm>
+          <a:off x="0" y="0"/>
+          <a:ext cx="0" cy="0"/>
+          <a:chOff x="0" y="0"/>
+          <a:chExt cx="0" cy="0"/>
+        </a:xfrm>
+      </p:grpSpPr>
+      <p:sp>
+        <p:nvSpPr>
+          <p:cNvPr id="2" name="Title 1">
+            <a:extLst>
+              <a:ext uri="{FF2B5EF4-FFF2-40B4-BE49-F238E27FC236}">
+                <a16:creationId xmlns:a16="http://schemas.microsoft.com/office/drawing/2014/main" id="{EEC47722-A41A-7145-B261-826E941E6E1A}"/>
+              </a:ext>
+            </a:extLst>
+          </p:cNvPr>
+          <p:cNvSpPr>
+            <a:spLocks noGrp="1"/>
+          </p:cNvSpPr>
+          <p:nvPr>
+            <p:ph type="title"/>
+          </p:nvPr>
+        </p:nvSpPr>
+        <p:spPr/>
+        <p:txBody>
+          <a:bodyPr/>
+          <a:lstStyle/>
+          <a:p>
+            <a:r>
+              <a:rPr lang="en-US" dirty="0"/>
+              <a:t>Market</a:t>
+            </a:r>
+          </a:p>
+        </p:txBody>
+      </p:sp>
+      <p:sp>
+        <p:nvSpPr>
+          <p:cNvPr id="3" name="Content Placeholder 2">
+            <a:extLst>
+              <a:ext uri="{FF2B5EF4-FFF2-40B4-BE49-F238E27FC236}">
+                <a16:creationId xmlns:a16="http://schemas.microsoft.com/office/drawing/2014/main" id="{D6255476-AA63-DB4D-B386-90BC4F45106A}"/>
+              </a:ext>
+            </a:extLst>
+          </p:cNvPr>
+          <p:cNvSpPr>
+            <a:spLocks noGrp="1"/>
+          </p:cNvSpPr>
+          <p:nvPr>
+            <p:ph idx="1"/>
+          </p:nvPr>
+        </p:nvSpPr>
+        <p:spPr/>
+        <p:txBody>
+          <a:bodyPr>
+            <a:normAutofit lnSpcReduction="10000"/>
+          </a:bodyPr>
+          <a:lstStyle/>
+          <a:p>
+            <a:r>
+              <a:rPr lang="en-US" dirty="0"/>
+              <a:t>Estimated 59 million fantasy sports players in US &amp; Canada</a:t>
+            </a:r>
+          </a:p>
+          <a:p>
+            <a:pPr lvl="1"/>
+            <a:r>
+              <a:rPr lang="en-US" dirty="0"/>
+              <a:t>40 million for fantasy football</a:t>
+            </a:r>
+          </a:p>
+          <a:p>
+            <a:r>
+              <a:rPr lang="en-US" dirty="0"/>
+              <a:t>$18.6 billion market</a:t>
+            </a:r>
+          </a:p>
+          <a:p>
+            <a:r>
+              <a:rPr lang="en-US" dirty="0"/>
+              <a:t>FanDuel</a:t>
+            </a:r>
+          </a:p>
+          <a:p>
+            <a:pPr lvl="1"/>
+            <a:r>
+              <a:rPr lang="en-US" dirty="0"/>
+              <a:t>$363 million in VC raised</a:t>
+            </a:r>
+          </a:p>
+          <a:p>
+            <a:pPr lvl="1"/>
+            <a:r>
+              <a:rPr lang="en-US" dirty="0"/>
+              <a:t>1,000 employees</a:t>
+            </a:r>
+          </a:p>
+          <a:p>
+            <a:pPr lvl="1"/>
+            <a:r>
+              <a:rPr lang="en-US" dirty="0"/>
+              <a:t>Estimated to pay out over $2 billion in winnings this year</a:t>
+            </a:r>
+          </a:p>
+          <a:p>
+            <a:pPr lvl="1"/>
+            <a:endParaRPr lang="en-US" dirty="0"/>
+          </a:p>
+          <a:p>
+            <a:pPr lvl="1"/>
+            <a:endParaRPr lang="en-US" dirty="0"/>
+          </a:p>
+          <a:p>
+            <a:pPr marL="457200" lvl="1" indent="0">
+              <a:buNone/>
+            </a:pPr>
+            <a:r>
+              <a:rPr lang="en-US" sz="1600" dirty="0"/>
+              <a:t>Sources: </a:t>
+            </a:r>
+            <a:r>
+              <a:rPr lang="en-US" sz="1600" dirty="0">
+                <a:hlinkClick r:id="rId2"/>
+              </a:rPr>
+              <a:t>https://www.sportsmanagementdegreehub.com/fantasy-football-industry/</a:t>
+            </a:r>
+            <a:r>
+              <a:rPr lang="en-US" sz="1600" dirty="0"/>
+              <a:t>, </a:t>
+            </a:r>
+            <a:r>
+              <a:rPr lang="en-US" sz="1600" dirty="0">
+                <a:hlinkClick r:id="rId3"/>
+              </a:rPr>
+              <a:t>https://appinventiv.com/blog/online-fantasy-sports-platform-changing-sports-industry/</a:t>
+            </a:r>
+            <a:r>
+              <a:rPr lang="en-US" sz="1600" dirty="0"/>
+              <a:t> </a:t>
+            </a:r>
+          </a:p>
+        </p:txBody>
+      </p:sp>
+    </p:spTree>
+    <p:extLst>
+      <p:ext uri="{BB962C8B-B14F-4D97-AF65-F5344CB8AC3E}">
+        <p14:creationId xmlns:p14="http://schemas.microsoft.com/office/powerpoint/2010/main" val="2250781521"/>
+      </p:ext>
+    </p:extLst>
+  </p:cSld>
+  <p:clrMapOvr>
+    <a:masterClrMapping/>
+  </p:clrMapOvr>
+</p:sld>
+</file>
+
 <file path=ppt/slides/slide5.xml><?xml version="1.0" encoding="utf-8"?>
 <p:sld xmlns:a="http://schemas.openxmlformats.org/drawingml/2006/main" xmlns:r="http://schemas.openxmlformats.org/officeDocument/2006/relationships" xmlns:p="http://schemas.openxmlformats.org/presentationml/2006/main">
   <p:cSld>
@@ -4253,7 +4757,7 @@
           <a:p>
             <a:r>
               <a:rPr lang="en-US" dirty="0"/>
-              <a:t>Source: http://rotoguru1.com/</a:t>
+              <a:t>Source: ‘http://rotoguru1.com/</a:t>
             </a:r>
             <a:r>
               <a:rPr lang="en-US" dirty="0" err="1"/>
@@ -4275,7 +4779,10 @@
               <a:rPr lang="en-US" dirty="0" err="1"/>
               <a:t>fd</a:t>
             </a:r>
-            <a:endParaRPr lang="en-US" dirty="0"/>
+            <a:r>
+              <a:rPr lang="en-US" dirty="0"/>
+              <a:t>’</a:t>
+            </a:r>
           </a:p>
           <a:p>
             <a:r>
@@ -4293,13 +4800,40 @@
             <a:endParaRPr lang="en-US" dirty="0"/>
           </a:p>
           <a:p>
-            <a:r>
-              <a:rPr lang="en-US" dirty="0"/>
-              <a:t>Insert Sample Image</a:t>
-            </a:r>
-          </a:p>
-        </p:txBody>
-      </p:sp>
+            <a:endParaRPr lang="en-US" dirty="0"/>
+          </a:p>
+        </p:txBody>
+      </p:sp>
+      <p:pic>
+        <p:nvPicPr>
+          <p:cNvPr id="5" name="Picture 4" descr="Table&#10;&#10;Description automatically generated">
+            <a:extLst>
+              <a:ext uri="{FF2B5EF4-FFF2-40B4-BE49-F238E27FC236}">
+                <a16:creationId xmlns:a16="http://schemas.microsoft.com/office/drawing/2014/main" id="{6B3F620E-2B4F-4B46-B408-C0AD8B24319D}"/>
+              </a:ext>
+            </a:extLst>
+          </p:cNvPr>
+          <p:cNvPicPr>
+            <a:picLocks noChangeAspect="1"/>
+          </p:cNvPicPr>
+          <p:nvPr/>
+        </p:nvPicPr>
+        <p:blipFill>
+          <a:blip r:embed="rId2"/>
+          <a:stretch>
+            <a:fillRect/>
+          </a:stretch>
+        </p:blipFill>
+        <p:spPr>
+          <a:xfrm>
+            <a:off x="508412" y="4279900"/>
+            <a:ext cx="10591800" cy="2032000"/>
+          </a:xfrm>
+          <a:prstGeom prst="rect">
+            <a:avLst/>
+          </a:prstGeom>
+        </p:spPr>
+      </p:pic>
     </p:spTree>
     <p:extLst>
       <p:ext uri="{BB962C8B-B14F-4D97-AF65-F5344CB8AC3E}">
@@ -4351,6 +4885,7 @@
           <a:bodyPr/>
           <a:lstStyle/>
           <a:p>
+            <a:pPr algn="ctr"/>
             <a:r>
               <a:rPr lang="en-US" dirty="0"/>
               <a:t>Data Exploration for Trends</a:t>
@@ -4358,6 +4893,36 @@
           </a:p>
         </p:txBody>
       </p:sp>
+      <p:pic>
+        <p:nvPicPr>
+          <p:cNvPr id="4" name="Picture 3" descr="Table&#10;&#10;Description automatically generated">
+            <a:extLst>
+              <a:ext uri="{FF2B5EF4-FFF2-40B4-BE49-F238E27FC236}">
+                <a16:creationId xmlns:a16="http://schemas.microsoft.com/office/drawing/2014/main" id="{289B2EF7-E88D-0541-AFD5-0C5D88736911}"/>
+              </a:ext>
+            </a:extLst>
+          </p:cNvPr>
+          <p:cNvPicPr>
+            <a:picLocks noChangeAspect="1"/>
+          </p:cNvPicPr>
+          <p:nvPr/>
+        </p:nvPicPr>
+        <p:blipFill>
+          <a:blip r:embed="rId2"/>
+          <a:stretch>
+            <a:fillRect/>
+          </a:stretch>
+        </p:blipFill>
+        <p:spPr>
+          <a:xfrm>
+            <a:off x="3143248" y="2027237"/>
+            <a:ext cx="5529263" cy="3905156"/>
+          </a:xfrm>
+          <a:prstGeom prst="rect">
+            <a:avLst/>
+          </a:prstGeom>
+        </p:spPr>
+      </p:pic>
     </p:spTree>
     <p:extLst>
       <p:ext uri="{BB962C8B-B14F-4D97-AF65-F5344CB8AC3E}">
@@ -4388,38 +4953,57 @@
           <a:chExt cx="0" cy="0"/>
         </a:xfrm>
       </p:grpSpPr>
-      <p:sp>
-        <p:nvSpPr>
-          <p:cNvPr id="2" name="Title 1">
-            <a:extLst>
-              <a:ext uri="{FF2B5EF4-FFF2-40B4-BE49-F238E27FC236}">
-                <a16:creationId xmlns:a16="http://schemas.microsoft.com/office/drawing/2014/main" id="{C58022DE-B214-4544-A5E6-A291C49C5676}"/>
-              </a:ext>
-            </a:extLst>
-          </p:cNvPr>
-          <p:cNvSpPr>
-            <a:spLocks noGrp="1"/>
-          </p:cNvSpPr>
-          <p:nvPr>
-            <p:ph type="title"/>
-          </p:nvPr>
-        </p:nvSpPr>
-        <p:spPr/>
-        <p:txBody>
-          <a:bodyPr/>
-          <a:lstStyle/>
-          <a:p>
-            <a:r>
-              <a:rPr lang="en-US" dirty="0"/>
-              <a:t>Projections for Player Value and Lineup Optimization</a:t>
-            </a:r>
-          </a:p>
-        </p:txBody>
-      </p:sp>
+      <p:pic>
+        <p:nvPicPr>
+          <p:cNvPr id="4098" name="Picture 2">
+            <a:extLst>
+              <a:ext uri="{FF2B5EF4-FFF2-40B4-BE49-F238E27FC236}">
+                <a16:creationId xmlns:a16="http://schemas.microsoft.com/office/drawing/2014/main" id="{6BB01864-4D98-C449-B797-5B402A1DCCED}"/>
+              </a:ext>
+            </a:extLst>
+          </p:cNvPr>
+          <p:cNvPicPr>
+            <a:picLocks noChangeAspect="1" noChangeArrowheads="1"/>
+          </p:cNvPicPr>
+          <p:nvPr/>
+        </p:nvPicPr>
+        <p:blipFill>
+          <a:blip r:embed="rId2">
+            <a:extLst>
+              <a:ext uri="{28A0092B-C50C-407E-A947-70E740481C1C}">
+                <a14:useLocalDpi xmlns:a14="http://schemas.microsoft.com/office/drawing/2010/main" val="0"/>
+              </a:ext>
+            </a:extLst>
+          </a:blip>
+          <a:srcRect/>
+          <a:stretch>
+            <a:fillRect/>
+          </a:stretch>
+        </p:blipFill>
+        <p:spPr bwMode="auto">
+          <a:xfrm>
+            <a:off x="3086101" y="21529"/>
+            <a:ext cx="6553200" cy="6836471"/>
+          </a:xfrm>
+          <a:prstGeom prst="rect">
+            <a:avLst/>
+          </a:prstGeom>
+          <a:noFill/>
+          <a:extLst>
+            <a:ext uri="{909E8E84-426E-40DD-AFC4-6F175D3DCCD1}">
+              <a14:hiddenFill xmlns:a14="http://schemas.microsoft.com/office/drawing/2010/main">
+                <a:solidFill>
+                  <a:srgbClr val="FFFFFF"/>
+                </a:solidFill>
+              </a14:hiddenFill>
+            </a:ext>
+          </a:extLst>
+        </p:spPr>
+      </p:pic>
     </p:spTree>
     <p:extLst>
       <p:ext uri="{BB962C8B-B14F-4D97-AF65-F5344CB8AC3E}">
-        <p14:creationId xmlns:p14="http://schemas.microsoft.com/office/powerpoint/2010/main" val="3227469902"/>
+        <p14:creationId xmlns:p14="http://schemas.microsoft.com/office/powerpoint/2010/main" val="4256784671"/>
       </p:ext>
     </p:extLst>
   </p:cSld>
@@ -4446,12 +5030,106 @@
           <a:chExt cx="0" cy="0"/>
         </a:xfrm>
       </p:grpSpPr>
+      <p:pic>
+        <p:nvPicPr>
+          <p:cNvPr id="1026" name="Picture 2">
+            <a:extLst>
+              <a:ext uri="{FF2B5EF4-FFF2-40B4-BE49-F238E27FC236}">
+                <a16:creationId xmlns:a16="http://schemas.microsoft.com/office/drawing/2014/main" id="{EFCE83A6-D650-3148-87B2-BFB8232D1108}"/>
+              </a:ext>
+            </a:extLst>
+          </p:cNvPr>
+          <p:cNvPicPr>
+            <a:picLocks noChangeAspect="1" noChangeArrowheads="1"/>
+          </p:cNvPicPr>
+          <p:nvPr/>
+        </p:nvPicPr>
+        <p:blipFill>
+          <a:blip r:embed="rId3">
+            <a:extLst>
+              <a:ext uri="{28A0092B-C50C-407E-A947-70E740481C1C}">
+                <a14:useLocalDpi xmlns:a14="http://schemas.microsoft.com/office/drawing/2010/main" val="0"/>
+              </a:ext>
+            </a:extLst>
+          </a:blip>
+          <a:srcRect/>
+          <a:stretch>
+            <a:fillRect/>
+          </a:stretch>
+        </p:blipFill>
+        <p:spPr bwMode="auto">
+          <a:xfrm>
+            <a:off x="762000" y="2314784"/>
+            <a:ext cx="5334000" cy="3365500"/>
+          </a:xfrm>
+          <a:prstGeom prst="rect">
+            <a:avLst/>
+          </a:prstGeom>
+          <a:noFill/>
+          <a:extLst>
+            <a:ext uri="{909E8E84-426E-40DD-AFC4-6F175D3DCCD1}">
+              <a14:hiddenFill xmlns:a14="http://schemas.microsoft.com/office/drawing/2010/main">
+                <a:solidFill>
+                  <a:srgbClr val="FFFFFF"/>
+                </a:solidFill>
+              </a14:hiddenFill>
+            </a:ext>
+          </a:extLst>
+        </p:spPr>
+      </p:pic>
+      <p:pic>
+        <p:nvPicPr>
+          <p:cNvPr id="1028" name="Picture 4">
+            <a:extLst>
+              <a:ext uri="{FF2B5EF4-FFF2-40B4-BE49-F238E27FC236}">
+                <a16:creationId xmlns:a16="http://schemas.microsoft.com/office/drawing/2014/main" id="{7D0AE4E1-5468-0949-AF98-F103E797A8AA}"/>
+              </a:ext>
+            </a:extLst>
+          </p:cNvPr>
+          <p:cNvPicPr>
+            <a:picLocks noChangeAspect="1" noChangeArrowheads="1"/>
+          </p:cNvPicPr>
+          <p:nvPr/>
+        </p:nvPicPr>
+        <p:blipFill>
+          <a:blip r:embed="rId4">
+            <a:extLst>
+              <a:ext uri="{28A0092B-C50C-407E-A947-70E740481C1C}">
+                <a14:useLocalDpi xmlns:a14="http://schemas.microsoft.com/office/drawing/2010/main" val="0"/>
+              </a:ext>
+            </a:extLst>
+          </a:blip>
+          <a:srcRect/>
+          <a:stretch>
+            <a:fillRect/>
+          </a:stretch>
+        </p:blipFill>
+        <p:spPr bwMode="auto">
+          <a:xfrm>
+            <a:off x="6261100" y="2314784"/>
+            <a:ext cx="5092700" cy="3403600"/>
+          </a:xfrm>
+          <a:prstGeom prst="rect">
+            <a:avLst/>
+          </a:prstGeom>
+          <a:noFill/>
+          <a:extLst>
+            <a:ext uri="{909E8E84-426E-40DD-AFC4-6F175D3DCCD1}">
+              <a14:hiddenFill xmlns:a14="http://schemas.microsoft.com/office/drawing/2010/main">
+                <a:solidFill>
+                  <a:srgbClr val="FFFFFF"/>
+                </a:solidFill>
+              </a14:hiddenFill>
+            </a:ext>
+          </a:extLst>
+        </p:spPr>
+      </p:pic>
       <p:sp>
         <p:nvSpPr>
           <p:cNvPr id="2" name="Title 1">
             <a:extLst>
               <a:ext uri="{FF2B5EF4-FFF2-40B4-BE49-F238E27FC236}">
-                <a16:creationId xmlns:a16="http://schemas.microsoft.com/office/drawing/2014/main" id="{FF17B8DA-BB1D-DF4D-B4C7-7719CF8352BC}"/>
+                <a16:creationId xmlns:a16="http://schemas.microsoft.com/office/drawing/2014/main" id="{AFB892CB-2E9F-5D42-AF66-2A386D5C3A08}"/>
               </a:ext>
             </a:extLst>
           </p:cNvPr>
@@ -4464,12 +5142,15 @@
         </p:nvSpPr>
         <p:spPr/>
         <p:txBody>
-          <a:bodyPr/>
-          <a:lstStyle/>
-          <a:p>
-            <a:r>
-              <a:rPr lang="en-US" dirty="0"/>
-              <a:t>Questions</a:t>
+          <a:bodyPr>
+            <a:normAutofit/>
+          </a:bodyPr>
+          <a:lstStyle/>
+          <a:p>
+            <a:pPr algn="ctr"/>
+            <a:r>
+              <a:rPr lang="en-US" sz="3600" dirty="0"/>
+              <a:t>Total Fantasy Points per Year and Average Player Salary</a:t>
             </a:r>
           </a:p>
         </p:txBody>
@@ -4477,7 +5158,160 @@
     </p:spTree>
     <p:extLst>
       <p:ext uri="{BB962C8B-B14F-4D97-AF65-F5344CB8AC3E}">
-        <p14:creationId xmlns:p14="http://schemas.microsoft.com/office/powerpoint/2010/main" val="2126567139"/>
+        <p14:creationId xmlns:p14="http://schemas.microsoft.com/office/powerpoint/2010/main" val="3109062628"/>
+      </p:ext>
+    </p:extLst>
+  </p:cSld>
+  <p:clrMapOvr>
+    <a:masterClrMapping/>
+  </p:clrMapOvr>
+</p:sld>
+</file>
+
+<file path=ppt/slides/slide9.xml><?xml version="1.0" encoding="utf-8"?>
+<p:sld xmlns:a="http://schemas.openxmlformats.org/drawingml/2006/main" xmlns:r="http://schemas.openxmlformats.org/officeDocument/2006/relationships" xmlns:p="http://schemas.openxmlformats.org/presentationml/2006/main">
+  <p:cSld>
+    <p:spTree>
+      <p:nvGrpSpPr>
+        <p:cNvPr id="1" name=""/>
+        <p:cNvGrpSpPr/>
+        <p:nvPr/>
+      </p:nvGrpSpPr>
+      <p:grpSpPr>
+        <a:xfrm>
+          <a:off x="0" y="0"/>
+          <a:ext cx="0" cy="0"/>
+          <a:chOff x="0" y="0"/>
+          <a:chExt cx="0" cy="0"/>
+        </a:xfrm>
+      </p:grpSpPr>
+      <p:pic>
+        <p:nvPicPr>
+          <p:cNvPr id="2054" name="Picture 6">
+            <a:extLst>
+              <a:ext uri="{FF2B5EF4-FFF2-40B4-BE49-F238E27FC236}">
+                <a16:creationId xmlns:a16="http://schemas.microsoft.com/office/drawing/2014/main" id="{4E8B70EB-90CA-324D-9309-B43AFC619F50}"/>
+              </a:ext>
+            </a:extLst>
+          </p:cNvPr>
+          <p:cNvPicPr>
+            <a:picLocks noChangeAspect="1" noChangeArrowheads="1"/>
+          </p:cNvPicPr>
+          <p:nvPr/>
+        </p:nvPicPr>
+        <p:blipFill>
+          <a:blip r:embed="rId2">
+            <a:extLst>
+              <a:ext uri="{28A0092B-C50C-407E-A947-70E740481C1C}">
+                <a14:useLocalDpi xmlns:a14="http://schemas.microsoft.com/office/drawing/2010/main" val="0"/>
+              </a:ext>
+            </a:extLst>
+          </a:blip>
+          <a:srcRect/>
+          <a:stretch>
+            <a:fillRect/>
+          </a:stretch>
+        </p:blipFill>
+        <p:spPr bwMode="auto">
+          <a:xfrm>
+            <a:off x="765175" y="1960562"/>
+            <a:ext cx="4889500" cy="3365500"/>
+          </a:xfrm>
+          <a:prstGeom prst="rect">
+            <a:avLst/>
+          </a:prstGeom>
+          <a:noFill/>
+          <a:extLst>
+            <a:ext uri="{909E8E84-426E-40DD-AFC4-6F175D3DCCD1}">
+              <a14:hiddenFill xmlns:a14="http://schemas.microsoft.com/office/drawing/2010/main">
+                <a:solidFill>
+                  <a:srgbClr val="FFFFFF"/>
+                </a:solidFill>
+              </a14:hiddenFill>
+            </a:ext>
+          </a:extLst>
+        </p:spPr>
+      </p:pic>
+      <p:sp>
+        <p:nvSpPr>
+          <p:cNvPr id="2" name="Title 1">
+            <a:extLst>
+              <a:ext uri="{FF2B5EF4-FFF2-40B4-BE49-F238E27FC236}">
+                <a16:creationId xmlns:a16="http://schemas.microsoft.com/office/drawing/2014/main" id="{2646CAD8-55C5-764F-80BE-3B5B3EB35286}"/>
+              </a:ext>
+            </a:extLst>
+          </p:cNvPr>
+          <p:cNvSpPr>
+            <a:spLocks noGrp="1"/>
+          </p:cNvSpPr>
+          <p:nvPr>
+            <p:ph type="title"/>
+          </p:nvPr>
+        </p:nvSpPr>
+        <p:spPr/>
+        <p:txBody>
+          <a:bodyPr/>
+          <a:lstStyle/>
+          <a:p>
+            <a:pPr algn="ctr"/>
+            <a:r>
+              <a:rPr lang="en-US" dirty="0"/>
+              <a:t>Salary Classification vs Points</a:t>
+            </a:r>
+          </a:p>
+        </p:txBody>
+      </p:sp>
+      <p:pic>
+        <p:nvPicPr>
+          <p:cNvPr id="2058" name="Picture 10">
+            <a:extLst>
+              <a:ext uri="{FF2B5EF4-FFF2-40B4-BE49-F238E27FC236}">
+                <a16:creationId xmlns:a16="http://schemas.microsoft.com/office/drawing/2014/main" id="{49AE5F85-50A8-C749-8E79-75DB207B7926}"/>
+              </a:ext>
+            </a:extLst>
+          </p:cNvPr>
+          <p:cNvPicPr>
+            <a:picLocks noChangeAspect="1" noChangeArrowheads="1"/>
+          </p:cNvPicPr>
+          <p:nvPr/>
+        </p:nvPicPr>
+        <p:blipFill>
+          <a:blip r:embed="rId3">
+            <a:extLst>
+              <a:ext uri="{28A0092B-C50C-407E-A947-70E740481C1C}">
+                <a14:useLocalDpi xmlns:a14="http://schemas.microsoft.com/office/drawing/2010/main" val="0"/>
+              </a:ext>
+            </a:extLst>
+          </a:blip>
+          <a:srcRect/>
+          <a:stretch>
+            <a:fillRect/>
+          </a:stretch>
+        </p:blipFill>
+        <p:spPr bwMode="auto">
+          <a:xfrm>
+            <a:off x="6096000" y="1960562"/>
+            <a:ext cx="4889500" cy="3365500"/>
+          </a:xfrm>
+          <a:prstGeom prst="rect">
+            <a:avLst/>
+          </a:prstGeom>
+          <a:noFill/>
+          <a:extLst>
+            <a:ext uri="{909E8E84-426E-40DD-AFC4-6F175D3DCCD1}">
+              <a14:hiddenFill xmlns:a14="http://schemas.microsoft.com/office/drawing/2010/main">
+                <a:solidFill>
+                  <a:srgbClr val="FFFFFF"/>
+                </a:solidFill>
+              </a14:hiddenFill>
+            </a:ext>
+          </a:extLst>
+        </p:spPr>
+      </p:pic>
+    </p:spTree>
+    <p:extLst>
+      <p:ext uri="{BB962C8B-B14F-4D97-AF65-F5344CB8AC3E}">
+        <p14:creationId xmlns:p14="http://schemas.microsoft.com/office/powerpoint/2010/main" val="1038417506"/>
       </p:ext>
     </p:extLst>
   </p:cSld>

</xml_diff>

<commit_message>
formatting and code commenting
</commit_message>
<xml_diff>
--- a/HG_Project_Presentation.pptx
+++ b/HG_Project_Presentation.pptx
@@ -2,7 +2,7 @@
 <file path=ppt/presentation.xml><?xml version="1.0" encoding="utf-8"?>
 <p:presentation xmlns:a="http://schemas.openxmlformats.org/drawingml/2006/main" xmlns:r="http://schemas.openxmlformats.org/officeDocument/2006/relationships" xmlns:p="http://schemas.openxmlformats.org/presentationml/2006/main" saveSubsetFonts="1" autoCompressPictures="0">
   <p:sldMasterIdLst>
-    <p:sldMasterId id="2147483648" r:id="rId1"/>
+    <p:sldMasterId id="2147483660" r:id="rId1"/>
   </p:sldMasterIdLst>
   <p:notesMasterIdLst>
     <p:notesMasterId r:id="rId15"/>
@@ -28,7 +28,7 @@
     <a:defPPr>
       <a:defRPr lang="en-US"/>
     </a:defPPr>
-    <a:lvl1pPr marL="0" algn="l" defTabSz="914400" rtl="0" eaLnBrk="1" latinLnBrk="0" hangingPunct="1">
+    <a:lvl1pPr marL="0" algn="l" defTabSz="457200" rtl="0" eaLnBrk="1" latinLnBrk="0" hangingPunct="1">
       <a:defRPr sz="1800" kern="1200">
         <a:solidFill>
           <a:schemeClr val="tx1"/>
@@ -38,7 +38,7 @@
         <a:cs typeface="+mn-cs"/>
       </a:defRPr>
     </a:lvl1pPr>
-    <a:lvl2pPr marL="457200" algn="l" defTabSz="914400" rtl="0" eaLnBrk="1" latinLnBrk="0" hangingPunct="1">
+    <a:lvl2pPr marL="457200" algn="l" defTabSz="457200" rtl="0" eaLnBrk="1" latinLnBrk="0" hangingPunct="1">
       <a:defRPr sz="1800" kern="1200">
         <a:solidFill>
           <a:schemeClr val="tx1"/>
@@ -48,7 +48,7 @@
         <a:cs typeface="+mn-cs"/>
       </a:defRPr>
     </a:lvl2pPr>
-    <a:lvl3pPr marL="914400" algn="l" defTabSz="914400" rtl="0" eaLnBrk="1" latinLnBrk="0" hangingPunct="1">
+    <a:lvl3pPr marL="914400" algn="l" defTabSz="457200" rtl="0" eaLnBrk="1" latinLnBrk="0" hangingPunct="1">
       <a:defRPr sz="1800" kern="1200">
         <a:solidFill>
           <a:schemeClr val="tx1"/>
@@ -58,7 +58,7 @@
         <a:cs typeface="+mn-cs"/>
       </a:defRPr>
     </a:lvl3pPr>
-    <a:lvl4pPr marL="1371600" algn="l" defTabSz="914400" rtl="0" eaLnBrk="1" latinLnBrk="0" hangingPunct="1">
+    <a:lvl4pPr marL="1371600" algn="l" defTabSz="457200" rtl="0" eaLnBrk="1" latinLnBrk="0" hangingPunct="1">
       <a:defRPr sz="1800" kern="1200">
         <a:solidFill>
           <a:schemeClr val="tx1"/>
@@ -68,7 +68,7 @@
         <a:cs typeface="+mn-cs"/>
       </a:defRPr>
     </a:lvl4pPr>
-    <a:lvl5pPr marL="1828800" algn="l" defTabSz="914400" rtl="0" eaLnBrk="1" latinLnBrk="0" hangingPunct="1">
+    <a:lvl5pPr marL="1828800" algn="l" defTabSz="457200" rtl="0" eaLnBrk="1" latinLnBrk="0" hangingPunct="1">
       <a:defRPr sz="1800" kern="1200">
         <a:solidFill>
           <a:schemeClr val="tx1"/>
@@ -78,7 +78,7 @@
         <a:cs typeface="+mn-cs"/>
       </a:defRPr>
     </a:lvl5pPr>
-    <a:lvl6pPr marL="2286000" algn="l" defTabSz="914400" rtl="0" eaLnBrk="1" latinLnBrk="0" hangingPunct="1">
+    <a:lvl6pPr marL="2286000" algn="l" defTabSz="457200" rtl="0" eaLnBrk="1" latinLnBrk="0" hangingPunct="1">
       <a:defRPr sz="1800" kern="1200">
         <a:solidFill>
           <a:schemeClr val="tx1"/>
@@ -88,7 +88,7 @@
         <a:cs typeface="+mn-cs"/>
       </a:defRPr>
     </a:lvl6pPr>
-    <a:lvl7pPr marL="2743200" algn="l" defTabSz="914400" rtl="0" eaLnBrk="1" latinLnBrk="0" hangingPunct="1">
+    <a:lvl7pPr marL="2743200" algn="l" defTabSz="457200" rtl="0" eaLnBrk="1" latinLnBrk="0" hangingPunct="1">
       <a:defRPr sz="1800" kern="1200">
         <a:solidFill>
           <a:schemeClr val="tx1"/>
@@ -98,7 +98,7 @@
         <a:cs typeface="+mn-cs"/>
       </a:defRPr>
     </a:lvl7pPr>
-    <a:lvl8pPr marL="3200400" algn="l" defTabSz="914400" rtl="0" eaLnBrk="1" latinLnBrk="0" hangingPunct="1">
+    <a:lvl8pPr marL="3200400" algn="l" defTabSz="457200" rtl="0" eaLnBrk="1" latinLnBrk="0" hangingPunct="1">
       <a:defRPr sz="1800" kern="1200">
         <a:solidFill>
           <a:schemeClr val="tx1"/>
@@ -108,7 +108,7 @@
         <a:cs typeface="+mn-cs"/>
       </a:defRPr>
     </a:lvl8pPr>
-    <a:lvl9pPr marL="3657600" algn="l" defTabSz="914400" rtl="0" eaLnBrk="1" latinLnBrk="0" hangingPunct="1">
+    <a:lvl9pPr marL="3657600" algn="l" defTabSz="457200" rtl="0" eaLnBrk="1" latinLnBrk="0" hangingPunct="1">
       <a:defRPr sz="1800" kern="1200">
         <a:solidFill>
           <a:schemeClr val="tx1"/>
@@ -209,7 +209,7 @@
           <a:p>
             <a:fld id="{293D1C3D-69E2-694F-ACA9-302B15AB7957}" type="datetimeFigureOut">
               <a:rPr lang="en-US" smtClean="0"/>
-              <a:t>10/16/21</a:t>
+              <a:t>10/17/21</a:t>
             </a:fld>
             <a:endParaRPr lang="en-US"/>
           </a:p>
@@ -663,13 +663,7 @@
       </p:grpSpPr>
       <p:sp>
         <p:nvSpPr>
-          <p:cNvPr id="2" name="Title 1">
-            <a:extLst>
-              <a:ext uri="{FF2B5EF4-FFF2-40B4-BE49-F238E27FC236}">
-                <a16:creationId xmlns:a16="http://schemas.microsoft.com/office/drawing/2014/main" id="{344A4810-EDC1-1745-A810-DF7DF49174DF}"/>
-              </a:ext>
-            </a:extLst>
-          </p:cNvPr>
+          <p:cNvPr id="2" name="Title 1"/>
           <p:cNvSpPr>
             <a:spLocks noGrp="1"/>
           </p:cNvSpPr>
@@ -679,15 +673,17 @@
         </p:nvSpPr>
         <p:spPr>
           <a:xfrm>
-            <a:off x="1524000" y="1122363"/>
-            <a:ext cx="9144000" cy="2387600"/>
-          </a:xfrm>
-        </p:spPr>
-        <p:txBody>
-          <a:bodyPr anchor="b"/>
+            <a:off x="2417779" y="802298"/>
+            <a:ext cx="8637073" cy="2541431"/>
+          </a:xfrm>
+        </p:spPr>
+        <p:txBody>
+          <a:bodyPr bIns="0" anchor="b">
+            <a:normAutofit/>
+          </a:bodyPr>
           <a:lstStyle>
-            <a:lvl1pPr algn="ctr">
-              <a:defRPr sz="6000"/>
+            <a:lvl1pPr algn="l">
+              <a:defRPr sz="6600"/>
             </a:lvl1pPr>
           </a:lstStyle>
           <a:p>
@@ -695,18 +691,13 @@
               <a:rPr lang="en-US"/>
               <a:t>Click to edit Master title style</a:t>
             </a:r>
-          </a:p>
-        </p:txBody>
-      </p:sp>
-      <p:sp>
-        <p:nvSpPr>
-          <p:cNvPr id="3" name="Subtitle 2">
-            <a:extLst>
-              <a:ext uri="{FF2B5EF4-FFF2-40B4-BE49-F238E27FC236}">
-                <a16:creationId xmlns:a16="http://schemas.microsoft.com/office/drawing/2014/main" id="{AE9CBC19-FDF6-D041-88A2-D7C4FA2091B7}"/>
-              </a:ext>
-            </a:extLst>
-          </p:cNvPr>
+            <a:endParaRPr lang="en-US" dirty="0"/>
+          </a:p>
+        </p:txBody>
+      </p:sp>
+      <p:sp>
+        <p:nvSpPr>
+          <p:cNvPr id="3" name="Subtitle 2"/>
           <p:cNvSpPr>
             <a:spLocks noGrp="1"/>
           </p:cNvSpPr>
@@ -716,20 +707,26 @@
         </p:nvSpPr>
         <p:spPr>
           <a:xfrm>
-            <a:off x="1524000" y="3602038"/>
-            <a:ext cx="9144000" cy="1655762"/>
-          </a:xfrm>
-        </p:spPr>
-        <p:txBody>
-          <a:bodyPr/>
+            <a:off x="2417780" y="3531204"/>
+            <a:ext cx="8637072" cy="977621"/>
+          </a:xfrm>
+        </p:spPr>
+        <p:txBody>
+          <a:bodyPr tIns="91440" bIns="91440">
+            <a:normAutofit/>
+          </a:bodyPr>
           <a:lstStyle>
-            <a:lvl1pPr marL="0" indent="0" algn="ctr">
+            <a:lvl1pPr marL="0" indent="0" algn="l">
               <a:buNone/>
-              <a:defRPr sz="2400"/>
+              <a:defRPr sz="1800" b="0" cap="all" baseline="0">
+                <a:solidFill>
+                  <a:schemeClr val="tx1"/>
+                </a:solidFill>
+              </a:defRPr>
             </a:lvl1pPr>
             <a:lvl2pPr marL="457200" indent="0" algn="ctr">
               <a:buNone/>
-              <a:defRPr sz="2000"/>
+              <a:defRPr sz="1800"/>
             </a:lvl2pPr>
             <a:lvl3pPr marL="914400" indent="0" algn="ctr">
               <a:buNone/>
@@ -765,18 +762,13 @@
               <a:rPr lang="en-US"/>
               <a:t>Click to edit Master subtitle style</a:t>
             </a:r>
-          </a:p>
-        </p:txBody>
-      </p:sp>
-      <p:sp>
-        <p:nvSpPr>
-          <p:cNvPr id="4" name="Date Placeholder 3">
-            <a:extLst>
-              <a:ext uri="{FF2B5EF4-FFF2-40B4-BE49-F238E27FC236}">
-                <a16:creationId xmlns:a16="http://schemas.microsoft.com/office/drawing/2014/main" id="{75F2D1CB-C202-EC41-B963-CC43FDB27D95}"/>
-              </a:ext>
-            </a:extLst>
-          </p:cNvPr>
+            <a:endParaRPr lang="en-US" dirty="0"/>
+          </a:p>
+        </p:txBody>
+      </p:sp>
+      <p:sp>
+        <p:nvSpPr>
+          <p:cNvPr id="4" name="Date Placeholder 3"/>
           <p:cNvSpPr>
             <a:spLocks noGrp="1"/>
           </p:cNvSpPr>
@@ -791,7 +783,7 @@
           <a:p>
             <a:fld id="{A7EDA9A7-C2A3-014D-A1A7-33CDA929B4A4}" type="datetimeFigureOut">
               <a:rPr lang="en-US" smtClean="0"/>
-              <a:t>10/16/21</a:t>
+              <a:t>10/17/21</a:t>
             </a:fld>
             <a:endParaRPr lang="en-US"/>
           </a:p>
@@ -799,13 +791,7 @@
       </p:sp>
       <p:sp>
         <p:nvSpPr>
-          <p:cNvPr id="5" name="Footer Placeholder 4">
-            <a:extLst>
-              <a:ext uri="{FF2B5EF4-FFF2-40B4-BE49-F238E27FC236}">
-                <a16:creationId xmlns:a16="http://schemas.microsoft.com/office/drawing/2014/main" id="{9A4DBA2B-E93A-BE42-90D8-7D5FFE1967D1}"/>
-              </a:ext>
-            </a:extLst>
-          </p:cNvPr>
+          <p:cNvPr id="5" name="Footer Placeholder 4"/>
           <p:cNvSpPr>
             <a:spLocks noGrp="1"/>
           </p:cNvSpPr>
@@ -813,7 +799,12 @@
             <p:ph type="ftr" sz="quarter" idx="11"/>
           </p:nvPr>
         </p:nvSpPr>
-        <p:spPr/>
+        <p:spPr>
+          <a:xfrm>
+            <a:off x="2416500" y="329307"/>
+            <a:ext cx="4973915" cy="309201"/>
+          </a:xfrm>
+        </p:spPr>
         <p:txBody>
           <a:bodyPr/>
           <a:lstStyle/>
@@ -824,13 +815,7 @@
       </p:sp>
       <p:sp>
         <p:nvSpPr>
-          <p:cNvPr id="6" name="Slide Number Placeholder 5">
-            <a:extLst>
-              <a:ext uri="{FF2B5EF4-FFF2-40B4-BE49-F238E27FC236}">
-                <a16:creationId xmlns:a16="http://schemas.microsoft.com/office/drawing/2014/main" id="{D7DD27A2-153D-C741-B341-124D354D46AA}"/>
-              </a:ext>
-            </a:extLst>
-          </p:cNvPr>
+          <p:cNvPr id="6" name="Slide Number Placeholder 5"/>
           <p:cNvSpPr>
             <a:spLocks noGrp="1"/>
           </p:cNvSpPr>
@@ -838,7 +823,12 @@
             <p:ph type="sldNum" sz="quarter" idx="12"/>
           </p:nvPr>
         </p:nvSpPr>
-        <p:spPr/>
+        <p:spPr>
+          <a:xfrm>
+            <a:off x="1437664" y="798973"/>
+            <a:ext cx="811019" cy="503578"/>
+          </a:xfrm>
+        </p:spPr>
         <p:txBody>
           <a:bodyPr/>
           <a:lstStyle/>
@@ -851,10 +841,41 @@
           </a:p>
         </p:txBody>
       </p:sp>
+      <p:cxnSp>
+        <p:nvCxnSpPr>
+          <p:cNvPr id="15" name="Straight Connector 14"/>
+          <p:cNvCxnSpPr/>
+          <p:nvPr/>
+        </p:nvCxnSpPr>
+        <p:spPr>
+          <a:xfrm>
+            <a:off x="2417780" y="3528542"/>
+            <a:ext cx="8637072" cy="0"/>
+          </a:xfrm>
+          <a:prstGeom prst="line">
+            <a:avLst/>
+          </a:prstGeom>
+          <a:ln w="31750"/>
+        </p:spPr>
+        <p:style>
+          <a:lnRef idx="3">
+            <a:schemeClr val="accent1"/>
+          </a:lnRef>
+          <a:fillRef idx="0">
+            <a:schemeClr val="accent1"/>
+          </a:fillRef>
+          <a:effectRef idx="2">
+            <a:schemeClr val="accent1"/>
+          </a:effectRef>
+          <a:fontRef idx="minor">
+            <a:schemeClr val="tx1"/>
+          </a:fontRef>
+        </p:style>
+      </p:cxnSp>
     </p:spTree>
     <p:extLst>
       <p:ext uri="{BB962C8B-B14F-4D97-AF65-F5344CB8AC3E}">
-        <p14:creationId xmlns:p14="http://schemas.microsoft.com/office/powerpoint/2010/main" val="1540697853"/>
+        <p14:creationId xmlns:p14="http://schemas.microsoft.com/office/powerpoint/2010/main" val="1355242330"/>
       </p:ext>
     </p:extLst>
   </p:cSld>
@@ -883,13 +904,7 @@
       </p:grpSpPr>
       <p:sp>
         <p:nvSpPr>
-          <p:cNvPr id="2" name="Title 1">
-            <a:extLst>
-              <a:ext uri="{FF2B5EF4-FFF2-40B4-BE49-F238E27FC236}">
-                <a16:creationId xmlns:a16="http://schemas.microsoft.com/office/drawing/2014/main" id="{9885A1CE-9404-1944-8F3D-3E09E7995DAC}"/>
-              </a:ext>
-            </a:extLst>
-          </p:cNvPr>
+          <p:cNvPr id="2" name="Title 1"/>
           <p:cNvSpPr>
             <a:spLocks noGrp="1"/>
           </p:cNvSpPr>
@@ -906,18 +921,13 @@
               <a:rPr lang="en-US"/>
               <a:t>Click to edit Master title style</a:t>
             </a:r>
-          </a:p>
-        </p:txBody>
-      </p:sp>
-      <p:sp>
-        <p:nvSpPr>
-          <p:cNvPr id="3" name="Vertical Text Placeholder 2">
-            <a:extLst>
-              <a:ext uri="{FF2B5EF4-FFF2-40B4-BE49-F238E27FC236}">
-                <a16:creationId xmlns:a16="http://schemas.microsoft.com/office/drawing/2014/main" id="{80B5BE22-A525-EE49-8BAB-345FC6DC5A0A}"/>
-              </a:ext>
-            </a:extLst>
-          </p:cNvPr>
+            <a:endParaRPr lang="en-US" dirty="0"/>
+          </a:p>
+        </p:txBody>
+      </p:sp>
+      <p:sp>
+        <p:nvSpPr>
+          <p:cNvPr id="3" name="Vertical Text Placeholder 2"/>
           <p:cNvSpPr>
             <a:spLocks noGrp="1"/>
           </p:cNvSpPr>
@@ -963,18 +973,13 @@
               <a:rPr lang="en-US"/>
               <a:t>Fifth level</a:t>
             </a:r>
-          </a:p>
-        </p:txBody>
-      </p:sp>
-      <p:sp>
-        <p:nvSpPr>
-          <p:cNvPr id="4" name="Date Placeholder 3">
-            <a:extLst>
-              <a:ext uri="{FF2B5EF4-FFF2-40B4-BE49-F238E27FC236}">
-                <a16:creationId xmlns:a16="http://schemas.microsoft.com/office/drawing/2014/main" id="{2C045728-5A6B-D440-B8C8-F7285603ED37}"/>
-              </a:ext>
-            </a:extLst>
-          </p:cNvPr>
+            <a:endParaRPr lang="en-US" dirty="0"/>
+          </a:p>
+        </p:txBody>
+      </p:sp>
+      <p:sp>
+        <p:nvSpPr>
+          <p:cNvPr id="4" name="Date Placeholder 3"/>
           <p:cNvSpPr>
             <a:spLocks noGrp="1"/>
           </p:cNvSpPr>
@@ -989,7 +994,7 @@
           <a:p>
             <a:fld id="{A7EDA9A7-C2A3-014D-A1A7-33CDA929B4A4}" type="datetimeFigureOut">
               <a:rPr lang="en-US" smtClean="0"/>
-              <a:t>10/16/21</a:t>
+              <a:t>10/17/21</a:t>
             </a:fld>
             <a:endParaRPr lang="en-US"/>
           </a:p>
@@ -997,13 +1002,7 @@
       </p:sp>
       <p:sp>
         <p:nvSpPr>
-          <p:cNvPr id="5" name="Footer Placeholder 4">
-            <a:extLst>
-              <a:ext uri="{FF2B5EF4-FFF2-40B4-BE49-F238E27FC236}">
-                <a16:creationId xmlns:a16="http://schemas.microsoft.com/office/drawing/2014/main" id="{D3C5ADA0-375A-4545-AA0B-25A0F68FE43C}"/>
-              </a:ext>
-            </a:extLst>
-          </p:cNvPr>
+          <p:cNvPr id="5" name="Footer Placeholder 4"/>
           <p:cNvSpPr>
             <a:spLocks noGrp="1"/>
           </p:cNvSpPr>
@@ -1022,13 +1021,7 @@
       </p:sp>
       <p:sp>
         <p:nvSpPr>
-          <p:cNvPr id="6" name="Slide Number Placeholder 5">
-            <a:extLst>
-              <a:ext uri="{FF2B5EF4-FFF2-40B4-BE49-F238E27FC236}">
-                <a16:creationId xmlns:a16="http://schemas.microsoft.com/office/drawing/2014/main" id="{8B726E12-D04E-904C-9B11-812A9E6CB8B3}"/>
-              </a:ext>
-            </a:extLst>
-          </p:cNvPr>
+          <p:cNvPr id="6" name="Slide Number Placeholder 5"/>
           <p:cNvSpPr>
             <a:spLocks noGrp="1"/>
           </p:cNvSpPr>
@@ -1049,10 +1042,41 @@
           </a:p>
         </p:txBody>
       </p:sp>
+      <p:cxnSp>
+        <p:nvCxnSpPr>
+          <p:cNvPr id="26" name="Straight Connector 25"/>
+          <p:cNvCxnSpPr/>
+          <p:nvPr/>
+        </p:nvCxnSpPr>
+        <p:spPr>
+          <a:xfrm>
+            <a:off x="1453896" y="1847088"/>
+            <a:ext cx="9607522" cy="0"/>
+          </a:xfrm>
+          <a:prstGeom prst="line">
+            <a:avLst/>
+          </a:prstGeom>
+          <a:ln w="31750"/>
+        </p:spPr>
+        <p:style>
+          <a:lnRef idx="3">
+            <a:schemeClr val="accent1"/>
+          </a:lnRef>
+          <a:fillRef idx="0">
+            <a:schemeClr val="accent1"/>
+          </a:fillRef>
+          <a:effectRef idx="2">
+            <a:schemeClr val="accent1"/>
+          </a:effectRef>
+          <a:fontRef idx="minor">
+            <a:schemeClr val="tx1"/>
+          </a:fontRef>
+        </p:style>
+      </p:cxnSp>
     </p:spTree>
     <p:extLst>
       <p:ext uri="{BB962C8B-B14F-4D97-AF65-F5344CB8AC3E}">
-        <p14:creationId xmlns:p14="http://schemas.microsoft.com/office/powerpoint/2010/main" val="1359627786"/>
+        <p14:creationId xmlns:p14="http://schemas.microsoft.com/office/powerpoint/2010/main" val="3539086547"/>
       </p:ext>
     </p:extLst>
   </p:cSld>
@@ -1081,13 +1105,7 @@
       </p:grpSpPr>
       <p:sp>
         <p:nvSpPr>
-          <p:cNvPr id="2" name="Vertical Title 1">
-            <a:extLst>
-              <a:ext uri="{FF2B5EF4-FFF2-40B4-BE49-F238E27FC236}">
-                <a16:creationId xmlns:a16="http://schemas.microsoft.com/office/drawing/2014/main" id="{66B0A46C-DE3F-4145-8ACE-089638F6EA7A}"/>
-              </a:ext>
-            </a:extLst>
-          </p:cNvPr>
+          <p:cNvPr id="2" name="Vertical Title 1"/>
           <p:cNvSpPr>
             <a:spLocks noGrp="1"/>
           </p:cNvSpPr>
@@ -1097,30 +1115,29 @@
         </p:nvSpPr>
         <p:spPr>
           <a:xfrm>
-            <a:off x="8724900" y="365125"/>
-            <a:ext cx="2628900" cy="5811838"/>
+            <a:off x="9439111" y="798973"/>
+            <a:ext cx="1615742" cy="4659889"/>
           </a:xfrm>
         </p:spPr>
         <p:txBody>
           <a:bodyPr vert="eaVert"/>
-          <a:lstStyle/>
+          <a:lstStyle>
+            <a:lvl1pPr algn="l">
+              <a:defRPr/>
+            </a:lvl1pPr>
+          </a:lstStyle>
           <a:p>
             <a:r>
               <a:rPr lang="en-US"/>
               <a:t>Click to edit Master title style</a:t>
             </a:r>
-          </a:p>
-        </p:txBody>
-      </p:sp>
-      <p:sp>
-        <p:nvSpPr>
-          <p:cNvPr id="3" name="Vertical Text Placeholder 2">
-            <a:extLst>
-              <a:ext uri="{FF2B5EF4-FFF2-40B4-BE49-F238E27FC236}">
-                <a16:creationId xmlns:a16="http://schemas.microsoft.com/office/drawing/2014/main" id="{DCEED0E0-D951-054C-B859-B5201934B18C}"/>
-              </a:ext>
-            </a:extLst>
-          </p:cNvPr>
+            <a:endParaRPr lang="en-US" dirty="0"/>
+          </a:p>
+        </p:txBody>
+      </p:sp>
+      <p:sp>
+        <p:nvSpPr>
+          <p:cNvPr id="3" name="Vertical Text Placeholder 2"/>
           <p:cNvSpPr>
             <a:spLocks noGrp="1"/>
           </p:cNvSpPr>
@@ -1130,8 +1147,8 @@
         </p:nvSpPr>
         <p:spPr>
           <a:xfrm>
-            <a:off x="838200" y="365125"/>
-            <a:ext cx="7734300" cy="5811838"/>
+            <a:off x="1444672" y="798973"/>
+            <a:ext cx="7828830" cy="4659889"/>
           </a:xfrm>
         </p:spPr>
         <p:txBody>
@@ -1171,18 +1188,13 @@
               <a:rPr lang="en-US"/>
               <a:t>Fifth level</a:t>
             </a:r>
-          </a:p>
-        </p:txBody>
-      </p:sp>
-      <p:sp>
-        <p:nvSpPr>
-          <p:cNvPr id="4" name="Date Placeholder 3">
-            <a:extLst>
-              <a:ext uri="{FF2B5EF4-FFF2-40B4-BE49-F238E27FC236}">
-                <a16:creationId xmlns:a16="http://schemas.microsoft.com/office/drawing/2014/main" id="{672E3FFF-FB6A-B142-AEBC-357F5121B63A}"/>
-              </a:ext>
-            </a:extLst>
-          </p:cNvPr>
+            <a:endParaRPr lang="en-US" dirty="0"/>
+          </a:p>
+        </p:txBody>
+      </p:sp>
+      <p:sp>
+        <p:nvSpPr>
+          <p:cNvPr id="4" name="Date Placeholder 3"/>
           <p:cNvSpPr>
             <a:spLocks noGrp="1"/>
           </p:cNvSpPr>
@@ -1197,7 +1209,7 @@
           <a:p>
             <a:fld id="{A7EDA9A7-C2A3-014D-A1A7-33CDA929B4A4}" type="datetimeFigureOut">
               <a:rPr lang="en-US" smtClean="0"/>
-              <a:t>10/16/21</a:t>
+              <a:t>10/17/21</a:t>
             </a:fld>
             <a:endParaRPr lang="en-US"/>
           </a:p>
@@ -1205,13 +1217,7 @@
       </p:sp>
       <p:sp>
         <p:nvSpPr>
-          <p:cNvPr id="5" name="Footer Placeholder 4">
-            <a:extLst>
-              <a:ext uri="{FF2B5EF4-FFF2-40B4-BE49-F238E27FC236}">
-                <a16:creationId xmlns:a16="http://schemas.microsoft.com/office/drawing/2014/main" id="{FBFF4109-2933-5B46-915A-76F622EF9818}"/>
-              </a:ext>
-            </a:extLst>
-          </p:cNvPr>
+          <p:cNvPr id="5" name="Footer Placeholder 4"/>
           <p:cNvSpPr>
             <a:spLocks noGrp="1"/>
           </p:cNvSpPr>
@@ -1230,13 +1236,7 @@
       </p:sp>
       <p:sp>
         <p:nvSpPr>
-          <p:cNvPr id="6" name="Slide Number Placeholder 5">
-            <a:extLst>
-              <a:ext uri="{FF2B5EF4-FFF2-40B4-BE49-F238E27FC236}">
-                <a16:creationId xmlns:a16="http://schemas.microsoft.com/office/drawing/2014/main" id="{CD651B11-6715-3847-855E-2498049B85F6}"/>
-              </a:ext>
-            </a:extLst>
-          </p:cNvPr>
+          <p:cNvPr id="6" name="Slide Number Placeholder 5"/>
           <p:cNvSpPr>
             <a:spLocks noGrp="1"/>
           </p:cNvSpPr>
@@ -1257,10 +1257,41 @@
           </a:p>
         </p:txBody>
       </p:sp>
+      <p:cxnSp>
+        <p:nvCxnSpPr>
+          <p:cNvPr id="15" name="Straight Connector 14"/>
+          <p:cNvCxnSpPr/>
+          <p:nvPr/>
+        </p:nvCxnSpPr>
+        <p:spPr>
+          <a:xfrm>
+            <a:off x="9439111" y="798973"/>
+            <a:ext cx="0" cy="4659889"/>
+          </a:xfrm>
+          <a:prstGeom prst="line">
+            <a:avLst/>
+          </a:prstGeom>
+          <a:ln w="31750"/>
+        </p:spPr>
+        <p:style>
+          <a:lnRef idx="3">
+            <a:schemeClr val="accent1"/>
+          </a:lnRef>
+          <a:fillRef idx="0">
+            <a:schemeClr val="accent1"/>
+          </a:fillRef>
+          <a:effectRef idx="2">
+            <a:schemeClr val="accent1"/>
+          </a:effectRef>
+          <a:fontRef idx="minor">
+            <a:schemeClr val="tx1"/>
+          </a:fontRef>
+        </p:style>
+      </p:cxnSp>
     </p:spTree>
     <p:extLst>
       <p:ext uri="{BB962C8B-B14F-4D97-AF65-F5344CB8AC3E}">
-        <p14:creationId xmlns:p14="http://schemas.microsoft.com/office/powerpoint/2010/main" val="2411705402"/>
+        <p14:creationId xmlns:p14="http://schemas.microsoft.com/office/powerpoint/2010/main" val="244506917"/>
       </p:ext>
     </p:extLst>
   </p:cSld>
@@ -1289,13 +1320,7 @@
       </p:grpSpPr>
       <p:sp>
         <p:nvSpPr>
-          <p:cNvPr id="2" name="Title 1">
-            <a:extLst>
-              <a:ext uri="{FF2B5EF4-FFF2-40B4-BE49-F238E27FC236}">
-                <a16:creationId xmlns:a16="http://schemas.microsoft.com/office/drawing/2014/main" id="{9C89BB46-93F4-764D-A1A1-EE877EAE15AE}"/>
-              </a:ext>
-            </a:extLst>
-          </p:cNvPr>
+          <p:cNvPr id="2" name="Title 1"/>
           <p:cNvSpPr>
             <a:spLocks noGrp="1"/>
           </p:cNvSpPr>
@@ -1312,18 +1337,13 @@
               <a:rPr lang="en-US"/>
               <a:t>Click to edit Master title style</a:t>
             </a:r>
-          </a:p>
-        </p:txBody>
-      </p:sp>
-      <p:sp>
-        <p:nvSpPr>
-          <p:cNvPr id="3" name="Content Placeholder 2">
-            <a:extLst>
-              <a:ext uri="{FF2B5EF4-FFF2-40B4-BE49-F238E27FC236}">
-                <a16:creationId xmlns:a16="http://schemas.microsoft.com/office/drawing/2014/main" id="{A12E7596-680E-E34B-92CD-00B34536F119}"/>
-              </a:ext>
-            </a:extLst>
-          </p:cNvPr>
+            <a:endParaRPr lang="en-US" dirty="0"/>
+          </a:p>
+        </p:txBody>
+      </p:sp>
+      <p:sp>
+        <p:nvSpPr>
+          <p:cNvPr id="3" name="Content Placeholder 2"/>
           <p:cNvSpPr>
             <a:spLocks noGrp="1"/>
           </p:cNvSpPr>
@@ -1333,7 +1353,7 @@
         </p:nvSpPr>
         <p:spPr/>
         <p:txBody>
-          <a:bodyPr/>
+          <a:bodyPr anchor="t"/>
           <a:lstStyle/>
           <a:p>
             <a:pPr lvl="0"/>
@@ -1369,18 +1389,13 @@
               <a:rPr lang="en-US"/>
               <a:t>Fifth level</a:t>
             </a:r>
-          </a:p>
-        </p:txBody>
-      </p:sp>
-      <p:sp>
-        <p:nvSpPr>
-          <p:cNvPr id="4" name="Date Placeholder 3">
-            <a:extLst>
-              <a:ext uri="{FF2B5EF4-FFF2-40B4-BE49-F238E27FC236}">
-                <a16:creationId xmlns:a16="http://schemas.microsoft.com/office/drawing/2014/main" id="{A40E626F-2017-0243-8191-A7A4EECC72F6}"/>
-              </a:ext>
-            </a:extLst>
-          </p:cNvPr>
+            <a:endParaRPr lang="en-US" dirty="0"/>
+          </a:p>
+        </p:txBody>
+      </p:sp>
+      <p:sp>
+        <p:nvSpPr>
+          <p:cNvPr id="4" name="Date Placeholder 3"/>
           <p:cNvSpPr>
             <a:spLocks noGrp="1"/>
           </p:cNvSpPr>
@@ -1395,7 +1410,7 @@
           <a:p>
             <a:fld id="{A7EDA9A7-C2A3-014D-A1A7-33CDA929B4A4}" type="datetimeFigureOut">
               <a:rPr lang="en-US" smtClean="0"/>
-              <a:t>10/16/21</a:t>
+              <a:t>10/17/21</a:t>
             </a:fld>
             <a:endParaRPr lang="en-US"/>
           </a:p>
@@ -1403,13 +1418,7 @@
       </p:sp>
       <p:sp>
         <p:nvSpPr>
-          <p:cNvPr id="5" name="Footer Placeholder 4">
-            <a:extLst>
-              <a:ext uri="{FF2B5EF4-FFF2-40B4-BE49-F238E27FC236}">
-                <a16:creationId xmlns:a16="http://schemas.microsoft.com/office/drawing/2014/main" id="{64EEB91B-7333-024C-864C-422BB2D112BA}"/>
-              </a:ext>
-            </a:extLst>
-          </p:cNvPr>
+          <p:cNvPr id="5" name="Footer Placeholder 4"/>
           <p:cNvSpPr>
             <a:spLocks noGrp="1"/>
           </p:cNvSpPr>
@@ -1428,13 +1437,7 @@
       </p:sp>
       <p:sp>
         <p:nvSpPr>
-          <p:cNvPr id="6" name="Slide Number Placeholder 5">
-            <a:extLst>
-              <a:ext uri="{FF2B5EF4-FFF2-40B4-BE49-F238E27FC236}">
-                <a16:creationId xmlns:a16="http://schemas.microsoft.com/office/drawing/2014/main" id="{FF4E5164-CF98-B84A-8398-4688412AF0FE}"/>
-              </a:ext>
-            </a:extLst>
-          </p:cNvPr>
+          <p:cNvPr id="6" name="Slide Number Placeholder 5"/>
           <p:cNvSpPr>
             <a:spLocks noGrp="1"/>
           </p:cNvSpPr>
@@ -1455,10 +1458,41 @@
           </a:p>
         </p:txBody>
       </p:sp>
+      <p:cxnSp>
+        <p:nvCxnSpPr>
+          <p:cNvPr id="33" name="Straight Connector 32"/>
+          <p:cNvCxnSpPr/>
+          <p:nvPr/>
+        </p:nvCxnSpPr>
+        <p:spPr>
+          <a:xfrm>
+            <a:off x="1453896" y="1847088"/>
+            <a:ext cx="9607522" cy="0"/>
+          </a:xfrm>
+          <a:prstGeom prst="line">
+            <a:avLst/>
+          </a:prstGeom>
+          <a:ln w="31750"/>
+        </p:spPr>
+        <p:style>
+          <a:lnRef idx="3">
+            <a:schemeClr val="accent1"/>
+          </a:lnRef>
+          <a:fillRef idx="0">
+            <a:schemeClr val="accent1"/>
+          </a:fillRef>
+          <a:effectRef idx="2">
+            <a:schemeClr val="accent1"/>
+          </a:effectRef>
+          <a:fontRef idx="minor">
+            <a:schemeClr val="tx1"/>
+          </a:fontRef>
+        </p:style>
+      </p:cxnSp>
     </p:spTree>
     <p:extLst>
       <p:ext uri="{BB962C8B-B14F-4D97-AF65-F5344CB8AC3E}">
-        <p14:creationId xmlns:p14="http://schemas.microsoft.com/office/powerpoint/2010/main" val="3803982714"/>
+        <p14:creationId xmlns:p14="http://schemas.microsoft.com/office/powerpoint/2010/main" val="4131886271"/>
       </p:ext>
     </p:extLst>
   </p:cSld>
@@ -1487,13 +1521,7 @@
       </p:grpSpPr>
       <p:sp>
         <p:nvSpPr>
-          <p:cNvPr id="2" name="Title 1">
-            <a:extLst>
-              <a:ext uri="{FF2B5EF4-FFF2-40B4-BE49-F238E27FC236}">
-                <a16:creationId xmlns:a16="http://schemas.microsoft.com/office/drawing/2014/main" id="{D32D0DD7-3999-D947-9AF1-354F3971F058}"/>
-              </a:ext>
-            </a:extLst>
-          </p:cNvPr>
+          <p:cNvPr id="2" name="Title 1"/>
           <p:cNvSpPr>
             <a:spLocks noGrp="1"/>
           </p:cNvSpPr>
@@ -1503,15 +1531,17 @@
         </p:nvSpPr>
         <p:spPr>
           <a:xfrm>
-            <a:off x="831850" y="1709738"/>
-            <a:ext cx="10515600" cy="2852737"/>
-          </a:xfrm>
-        </p:spPr>
-        <p:txBody>
-          <a:bodyPr anchor="b"/>
+            <a:off x="1454239" y="1756130"/>
+            <a:ext cx="8643154" cy="1887950"/>
+          </a:xfrm>
+        </p:spPr>
+        <p:txBody>
+          <a:bodyPr anchor="b">
+            <a:normAutofit/>
+          </a:bodyPr>
           <a:lstStyle>
-            <a:lvl1pPr>
-              <a:defRPr sz="6000"/>
+            <a:lvl1pPr algn="l">
+              <a:defRPr sz="3600"/>
             </a:lvl1pPr>
           </a:lstStyle>
           <a:p>
@@ -1519,18 +1549,13 @@
               <a:rPr lang="en-US"/>
               <a:t>Click to edit Master title style</a:t>
             </a:r>
-          </a:p>
-        </p:txBody>
-      </p:sp>
-      <p:sp>
-        <p:nvSpPr>
-          <p:cNvPr id="3" name="Text Placeholder 2">
-            <a:extLst>
-              <a:ext uri="{FF2B5EF4-FFF2-40B4-BE49-F238E27FC236}">
-                <a16:creationId xmlns:a16="http://schemas.microsoft.com/office/drawing/2014/main" id="{4DF7DAD1-5692-054D-BE79-247ECF063407}"/>
-              </a:ext>
-            </a:extLst>
-          </p:cNvPr>
+            <a:endParaRPr lang="en-US" dirty="0"/>
+          </a:p>
+        </p:txBody>
+      </p:sp>
+      <p:sp>
+        <p:nvSpPr>
+          <p:cNvPr id="3" name="Text Placeholder 2"/>
           <p:cNvSpPr>
             <a:spLocks noGrp="1"/>
           </p:cNvSpPr>
@@ -1540,26 +1565,26 @@
         </p:nvSpPr>
         <p:spPr>
           <a:xfrm>
-            <a:off x="831850" y="4589463"/>
-            <a:ext cx="10515600" cy="1500187"/>
-          </a:xfrm>
-        </p:spPr>
-        <p:txBody>
-          <a:bodyPr/>
+            <a:off x="1454239" y="3806195"/>
+            <a:ext cx="8630446" cy="1012929"/>
+          </a:xfrm>
+        </p:spPr>
+        <p:txBody>
+          <a:bodyPr tIns="91440">
+            <a:normAutofit/>
+          </a:bodyPr>
           <a:lstStyle>
-            <a:lvl1pPr marL="0" indent="0">
+            <a:lvl1pPr marL="0" indent="0" algn="l">
               <a:buNone/>
-              <a:defRPr sz="2400">
+              <a:defRPr sz="1800">
                 <a:solidFill>
-                  <a:schemeClr val="tx1">
-                    <a:tint val="75000"/>
-                  </a:schemeClr>
+                  <a:schemeClr val="tx1"/>
                 </a:solidFill>
               </a:defRPr>
             </a:lvl1pPr>
             <a:lvl2pPr marL="457200" indent="0">
               <a:buNone/>
-              <a:defRPr sz="2000">
+              <a:defRPr sz="1800">
                 <a:solidFill>
                   <a:schemeClr val="tx1">
                     <a:tint val="75000"/>
@@ -1649,13 +1674,7 @@
       </p:sp>
       <p:sp>
         <p:nvSpPr>
-          <p:cNvPr id="4" name="Date Placeholder 3">
-            <a:extLst>
-              <a:ext uri="{FF2B5EF4-FFF2-40B4-BE49-F238E27FC236}">
-                <a16:creationId xmlns:a16="http://schemas.microsoft.com/office/drawing/2014/main" id="{B83B4E9D-0CD9-794C-9971-52DE7E9B00EF}"/>
-              </a:ext>
-            </a:extLst>
-          </p:cNvPr>
+          <p:cNvPr id="4" name="Date Placeholder 3"/>
           <p:cNvSpPr>
             <a:spLocks noGrp="1"/>
           </p:cNvSpPr>
@@ -1670,7 +1689,7 @@
           <a:p>
             <a:fld id="{A7EDA9A7-C2A3-014D-A1A7-33CDA929B4A4}" type="datetimeFigureOut">
               <a:rPr lang="en-US" smtClean="0"/>
-              <a:t>10/16/21</a:t>
+              <a:t>10/17/21</a:t>
             </a:fld>
             <a:endParaRPr lang="en-US"/>
           </a:p>
@@ -1678,13 +1697,7 @@
       </p:sp>
       <p:sp>
         <p:nvSpPr>
-          <p:cNvPr id="5" name="Footer Placeholder 4">
-            <a:extLst>
-              <a:ext uri="{FF2B5EF4-FFF2-40B4-BE49-F238E27FC236}">
-                <a16:creationId xmlns:a16="http://schemas.microsoft.com/office/drawing/2014/main" id="{FC667F6E-3797-1D45-8233-A8D43B499A14}"/>
-              </a:ext>
-            </a:extLst>
-          </p:cNvPr>
+          <p:cNvPr id="5" name="Footer Placeholder 4"/>
           <p:cNvSpPr>
             <a:spLocks noGrp="1"/>
           </p:cNvSpPr>
@@ -1703,13 +1716,7 @@
       </p:sp>
       <p:sp>
         <p:nvSpPr>
-          <p:cNvPr id="6" name="Slide Number Placeholder 5">
-            <a:extLst>
-              <a:ext uri="{FF2B5EF4-FFF2-40B4-BE49-F238E27FC236}">
-                <a16:creationId xmlns:a16="http://schemas.microsoft.com/office/drawing/2014/main" id="{54D58FA6-2724-A54D-8048-85DDACC658AC}"/>
-              </a:ext>
-            </a:extLst>
-          </p:cNvPr>
+          <p:cNvPr id="6" name="Slide Number Placeholder 5"/>
           <p:cNvSpPr>
             <a:spLocks noGrp="1"/>
           </p:cNvSpPr>
@@ -1730,10 +1737,41 @@
           </a:p>
         </p:txBody>
       </p:sp>
+      <p:cxnSp>
+        <p:nvCxnSpPr>
+          <p:cNvPr id="15" name="Straight Connector 14"/>
+          <p:cNvCxnSpPr/>
+          <p:nvPr/>
+        </p:nvCxnSpPr>
+        <p:spPr>
+          <a:xfrm>
+            <a:off x="1454239" y="3804985"/>
+            <a:ext cx="8630446" cy="0"/>
+          </a:xfrm>
+          <a:prstGeom prst="line">
+            <a:avLst/>
+          </a:prstGeom>
+          <a:ln w="31750"/>
+        </p:spPr>
+        <p:style>
+          <a:lnRef idx="3">
+            <a:schemeClr val="accent1"/>
+          </a:lnRef>
+          <a:fillRef idx="0">
+            <a:schemeClr val="accent1"/>
+          </a:fillRef>
+          <a:effectRef idx="2">
+            <a:schemeClr val="accent1"/>
+          </a:effectRef>
+          <a:fontRef idx="minor">
+            <a:schemeClr val="tx1"/>
+          </a:fontRef>
+        </p:style>
+      </p:cxnSp>
     </p:spTree>
     <p:extLst>
       <p:ext uri="{BB962C8B-B14F-4D97-AF65-F5344CB8AC3E}">
-        <p14:creationId xmlns:p14="http://schemas.microsoft.com/office/powerpoint/2010/main" val="3217572637"/>
+        <p14:creationId xmlns:p14="http://schemas.microsoft.com/office/powerpoint/2010/main" val="150339958"/>
       </p:ext>
     </p:extLst>
   </p:cSld>
@@ -1762,13 +1800,7 @@
       </p:grpSpPr>
       <p:sp>
         <p:nvSpPr>
-          <p:cNvPr id="2" name="Title 1">
-            <a:extLst>
-              <a:ext uri="{FF2B5EF4-FFF2-40B4-BE49-F238E27FC236}">
-                <a16:creationId xmlns:a16="http://schemas.microsoft.com/office/drawing/2014/main" id="{52A02208-82D8-4F4B-A21B-E9C0E9322B9B}"/>
-              </a:ext>
-            </a:extLst>
-          </p:cNvPr>
+          <p:cNvPr id="2" name="Title 1"/>
           <p:cNvSpPr>
             <a:spLocks noGrp="1"/>
           </p:cNvSpPr>
@@ -1776,7 +1808,12 @@
             <p:ph type="title"/>
           </p:nvPr>
         </p:nvSpPr>
-        <p:spPr/>
+        <p:spPr>
+          <a:xfrm>
+            <a:off x="1449217" y="804889"/>
+            <a:ext cx="9605635" cy="1059305"/>
+          </a:xfrm>
+        </p:spPr>
         <p:txBody>
           <a:bodyPr/>
           <a:lstStyle/>
@@ -1785,18 +1822,13 @@
               <a:rPr lang="en-US"/>
               <a:t>Click to edit Master title style</a:t>
             </a:r>
-          </a:p>
-        </p:txBody>
-      </p:sp>
-      <p:sp>
-        <p:nvSpPr>
-          <p:cNvPr id="3" name="Content Placeholder 2">
-            <a:extLst>
-              <a:ext uri="{FF2B5EF4-FFF2-40B4-BE49-F238E27FC236}">
-                <a16:creationId xmlns:a16="http://schemas.microsoft.com/office/drawing/2014/main" id="{17E0F984-8777-BD45-A656-CF9AC437C2FA}"/>
-              </a:ext>
-            </a:extLst>
-          </p:cNvPr>
+            <a:endParaRPr lang="en-US" dirty="0"/>
+          </a:p>
+        </p:txBody>
+      </p:sp>
+      <p:sp>
+        <p:nvSpPr>
+          <p:cNvPr id="3" name="Content Placeholder 2"/>
           <p:cNvSpPr>
             <a:spLocks noGrp="1"/>
           </p:cNvSpPr>
@@ -1806,8 +1838,8 @@
         </p:nvSpPr>
         <p:spPr>
           <a:xfrm>
-            <a:off x="838200" y="1825625"/>
-            <a:ext cx="5181600" cy="4351338"/>
+            <a:off x="1447331" y="2010878"/>
+            <a:ext cx="4645152" cy="3448595"/>
           </a:xfrm>
         </p:spPr>
         <p:txBody>
@@ -1847,18 +1879,13 @@
               <a:rPr lang="en-US"/>
               <a:t>Fifth level</a:t>
             </a:r>
-          </a:p>
-        </p:txBody>
-      </p:sp>
-      <p:sp>
-        <p:nvSpPr>
-          <p:cNvPr id="4" name="Content Placeholder 3">
-            <a:extLst>
-              <a:ext uri="{FF2B5EF4-FFF2-40B4-BE49-F238E27FC236}">
-                <a16:creationId xmlns:a16="http://schemas.microsoft.com/office/drawing/2014/main" id="{5EA0B9ED-1DE3-E941-B3A3-FD6FD3BB7794}"/>
-              </a:ext>
-            </a:extLst>
-          </p:cNvPr>
+            <a:endParaRPr lang="en-US" dirty="0"/>
+          </a:p>
+        </p:txBody>
+      </p:sp>
+      <p:sp>
+        <p:nvSpPr>
+          <p:cNvPr id="4" name="Content Placeholder 3"/>
           <p:cNvSpPr>
             <a:spLocks noGrp="1"/>
           </p:cNvSpPr>
@@ -1868,8 +1895,8 @@
         </p:nvSpPr>
         <p:spPr>
           <a:xfrm>
-            <a:off x="6172200" y="1825625"/>
-            <a:ext cx="5181600" cy="4351338"/>
+            <a:off x="6413771" y="2017343"/>
+            <a:ext cx="4645152" cy="3441520"/>
           </a:xfrm>
         </p:spPr>
         <p:txBody>
@@ -1909,18 +1936,13 @@
               <a:rPr lang="en-US"/>
               <a:t>Fifth level</a:t>
             </a:r>
-          </a:p>
-        </p:txBody>
-      </p:sp>
-      <p:sp>
-        <p:nvSpPr>
-          <p:cNvPr id="5" name="Date Placeholder 4">
-            <a:extLst>
-              <a:ext uri="{FF2B5EF4-FFF2-40B4-BE49-F238E27FC236}">
-                <a16:creationId xmlns:a16="http://schemas.microsoft.com/office/drawing/2014/main" id="{35807620-9C6D-BC4D-A48E-4D845AD3A4B6}"/>
-              </a:ext>
-            </a:extLst>
-          </p:cNvPr>
+            <a:endParaRPr lang="en-US" dirty="0"/>
+          </a:p>
+        </p:txBody>
+      </p:sp>
+      <p:sp>
+        <p:nvSpPr>
+          <p:cNvPr id="5" name="Date Placeholder 4"/>
           <p:cNvSpPr>
             <a:spLocks noGrp="1"/>
           </p:cNvSpPr>
@@ -1935,7 +1957,7 @@
           <a:p>
             <a:fld id="{A7EDA9A7-C2A3-014D-A1A7-33CDA929B4A4}" type="datetimeFigureOut">
               <a:rPr lang="en-US" smtClean="0"/>
-              <a:t>10/16/21</a:t>
+              <a:t>10/17/21</a:t>
             </a:fld>
             <a:endParaRPr lang="en-US"/>
           </a:p>
@@ -1943,13 +1965,7 @@
       </p:sp>
       <p:sp>
         <p:nvSpPr>
-          <p:cNvPr id="6" name="Footer Placeholder 5">
-            <a:extLst>
-              <a:ext uri="{FF2B5EF4-FFF2-40B4-BE49-F238E27FC236}">
-                <a16:creationId xmlns:a16="http://schemas.microsoft.com/office/drawing/2014/main" id="{29B6BABD-8D38-E340-86D7-2D2217332508}"/>
-              </a:ext>
-            </a:extLst>
-          </p:cNvPr>
+          <p:cNvPr id="6" name="Footer Placeholder 5"/>
           <p:cNvSpPr>
             <a:spLocks noGrp="1"/>
           </p:cNvSpPr>
@@ -1968,13 +1984,7 @@
       </p:sp>
       <p:sp>
         <p:nvSpPr>
-          <p:cNvPr id="7" name="Slide Number Placeholder 6">
-            <a:extLst>
-              <a:ext uri="{FF2B5EF4-FFF2-40B4-BE49-F238E27FC236}">
-                <a16:creationId xmlns:a16="http://schemas.microsoft.com/office/drawing/2014/main" id="{3D8005D3-7903-114B-81C7-A676E4FB12B2}"/>
-              </a:ext>
-            </a:extLst>
-          </p:cNvPr>
+          <p:cNvPr id="7" name="Slide Number Placeholder 6"/>
           <p:cNvSpPr>
             <a:spLocks noGrp="1"/>
           </p:cNvSpPr>
@@ -1995,10 +2005,41 @@
           </a:p>
         </p:txBody>
       </p:sp>
+      <p:cxnSp>
+        <p:nvCxnSpPr>
+          <p:cNvPr id="35" name="Straight Connector 34"/>
+          <p:cNvCxnSpPr/>
+          <p:nvPr/>
+        </p:nvCxnSpPr>
+        <p:spPr>
+          <a:xfrm>
+            <a:off x="1453896" y="1847088"/>
+            <a:ext cx="9607522" cy="0"/>
+          </a:xfrm>
+          <a:prstGeom prst="line">
+            <a:avLst/>
+          </a:prstGeom>
+          <a:ln w="31750"/>
+        </p:spPr>
+        <p:style>
+          <a:lnRef idx="3">
+            <a:schemeClr val="accent1"/>
+          </a:lnRef>
+          <a:fillRef idx="0">
+            <a:schemeClr val="accent1"/>
+          </a:fillRef>
+          <a:effectRef idx="2">
+            <a:schemeClr val="accent1"/>
+          </a:effectRef>
+          <a:fontRef idx="minor">
+            <a:schemeClr val="tx1"/>
+          </a:fontRef>
+        </p:style>
+      </p:cxnSp>
     </p:spTree>
     <p:extLst>
       <p:ext uri="{BB962C8B-B14F-4D97-AF65-F5344CB8AC3E}">
-        <p14:creationId xmlns:p14="http://schemas.microsoft.com/office/powerpoint/2010/main" val="3494608666"/>
+        <p14:creationId xmlns:p14="http://schemas.microsoft.com/office/powerpoint/2010/main" val="2324799311"/>
       </p:ext>
     </p:extLst>
   </p:cSld>
@@ -2027,13 +2068,7 @@
       </p:grpSpPr>
       <p:sp>
         <p:nvSpPr>
-          <p:cNvPr id="2" name="Title 1">
-            <a:extLst>
-              <a:ext uri="{FF2B5EF4-FFF2-40B4-BE49-F238E27FC236}">
-                <a16:creationId xmlns:a16="http://schemas.microsoft.com/office/drawing/2014/main" id="{C1351776-1348-7344-AE94-8BAFE3E42250}"/>
-              </a:ext>
-            </a:extLst>
-          </p:cNvPr>
+          <p:cNvPr id="2" name="Title 1"/>
           <p:cNvSpPr>
             <a:spLocks noGrp="1"/>
           </p:cNvSpPr>
@@ -2043,8 +2078,8 @@
         </p:nvSpPr>
         <p:spPr>
           <a:xfrm>
-            <a:off x="839788" y="365125"/>
-            <a:ext cx="10515600" cy="1325563"/>
+            <a:off x="1447191" y="804163"/>
+            <a:ext cx="9607661" cy="1056319"/>
           </a:xfrm>
         </p:spPr>
         <p:txBody>
@@ -2055,18 +2090,13 @@
               <a:rPr lang="en-US"/>
               <a:t>Click to edit Master title style</a:t>
             </a:r>
-          </a:p>
-        </p:txBody>
-      </p:sp>
-      <p:sp>
-        <p:nvSpPr>
-          <p:cNvPr id="3" name="Text Placeholder 2">
-            <a:extLst>
-              <a:ext uri="{FF2B5EF4-FFF2-40B4-BE49-F238E27FC236}">
-                <a16:creationId xmlns:a16="http://schemas.microsoft.com/office/drawing/2014/main" id="{18CFDB69-92E0-4045-9B40-0FEE023A897C}"/>
-              </a:ext>
-            </a:extLst>
-          </p:cNvPr>
+            <a:endParaRPr lang="en-US" dirty="0"/>
+          </a:p>
+        </p:txBody>
+      </p:sp>
+      <p:sp>
+        <p:nvSpPr>
+          <p:cNvPr id="3" name="Text Placeholder 2"/>
           <p:cNvSpPr>
             <a:spLocks noGrp="1"/>
           </p:cNvSpPr>
@@ -2076,16 +2106,25 @@
         </p:nvSpPr>
         <p:spPr>
           <a:xfrm>
-            <a:off x="839788" y="1681163"/>
-            <a:ext cx="5157787" cy="823912"/>
-          </a:xfrm>
-        </p:spPr>
-        <p:txBody>
-          <a:bodyPr anchor="b"/>
+            <a:off x="1447191" y="2019549"/>
+            <a:ext cx="4645152" cy="801943"/>
+          </a:xfrm>
+        </p:spPr>
+        <p:txBody>
+          <a:bodyPr anchor="b">
+            <a:normAutofit/>
+          </a:bodyPr>
           <a:lstStyle>
             <a:lvl1pPr marL="0" indent="0">
+              <a:lnSpc>
+                <a:spcPct val="100000"/>
+              </a:lnSpc>
               <a:buNone/>
-              <a:defRPr sz="2400" b="1"/>
+              <a:defRPr sz="2200" b="0" cap="all" baseline="0">
+                <a:solidFill>
+                  <a:schemeClr val="accent1"/>
+                </a:solidFill>
+              </a:defRPr>
             </a:lvl1pPr>
             <a:lvl2pPr marL="457200" indent="0">
               <a:buNone/>
@@ -2131,13 +2170,7 @@
       </p:sp>
       <p:sp>
         <p:nvSpPr>
-          <p:cNvPr id="4" name="Content Placeholder 3">
-            <a:extLst>
-              <a:ext uri="{FF2B5EF4-FFF2-40B4-BE49-F238E27FC236}">
-                <a16:creationId xmlns:a16="http://schemas.microsoft.com/office/drawing/2014/main" id="{1019C7DB-199C-074E-9F91-758A38CF451C}"/>
-              </a:ext>
-            </a:extLst>
-          </p:cNvPr>
+          <p:cNvPr id="4" name="Content Placeholder 3"/>
           <p:cNvSpPr>
             <a:spLocks noGrp="1"/>
           </p:cNvSpPr>
@@ -2147,8 +2180,8 @@
         </p:nvSpPr>
         <p:spPr>
           <a:xfrm>
-            <a:off x="839788" y="2505075"/>
-            <a:ext cx="5157787" cy="3684588"/>
+            <a:off x="1447191" y="2824269"/>
+            <a:ext cx="4645152" cy="2644457"/>
           </a:xfrm>
         </p:spPr>
         <p:txBody>
@@ -2188,18 +2221,13 @@
               <a:rPr lang="en-US"/>
               <a:t>Fifth level</a:t>
             </a:r>
-          </a:p>
-        </p:txBody>
-      </p:sp>
-      <p:sp>
-        <p:nvSpPr>
-          <p:cNvPr id="5" name="Text Placeholder 4">
-            <a:extLst>
-              <a:ext uri="{FF2B5EF4-FFF2-40B4-BE49-F238E27FC236}">
-                <a16:creationId xmlns:a16="http://schemas.microsoft.com/office/drawing/2014/main" id="{CE481A2E-5A70-1C4D-82FA-E0A041A313C9}"/>
-              </a:ext>
-            </a:extLst>
-          </p:cNvPr>
+            <a:endParaRPr lang="en-US" dirty="0"/>
+          </a:p>
+        </p:txBody>
+      </p:sp>
+      <p:sp>
+        <p:nvSpPr>
+          <p:cNvPr id="5" name="Text Placeholder 4"/>
           <p:cNvSpPr>
             <a:spLocks noGrp="1"/>
           </p:cNvSpPr>
@@ -2209,16 +2237,25 @@
         </p:nvSpPr>
         <p:spPr>
           <a:xfrm>
-            <a:off x="6172200" y="1681163"/>
-            <a:ext cx="5183188" cy="823912"/>
-          </a:xfrm>
-        </p:spPr>
-        <p:txBody>
-          <a:bodyPr anchor="b"/>
+            <a:off x="6412362" y="2023003"/>
+            <a:ext cx="4645152" cy="802237"/>
+          </a:xfrm>
+        </p:spPr>
+        <p:txBody>
+          <a:bodyPr anchor="b">
+            <a:normAutofit/>
+          </a:bodyPr>
           <a:lstStyle>
             <a:lvl1pPr marL="0" indent="0">
+              <a:lnSpc>
+                <a:spcPct val="100000"/>
+              </a:lnSpc>
               <a:buNone/>
-              <a:defRPr sz="2400" b="1"/>
+              <a:defRPr sz="2200" b="0" cap="all" baseline="0">
+                <a:solidFill>
+                  <a:schemeClr val="accent1"/>
+                </a:solidFill>
+              </a:defRPr>
             </a:lvl1pPr>
             <a:lvl2pPr marL="457200" indent="0">
               <a:buNone/>
@@ -2264,13 +2301,7 @@
       </p:sp>
       <p:sp>
         <p:nvSpPr>
-          <p:cNvPr id="6" name="Content Placeholder 5">
-            <a:extLst>
-              <a:ext uri="{FF2B5EF4-FFF2-40B4-BE49-F238E27FC236}">
-                <a16:creationId xmlns:a16="http://schemas.microsoft.com/office/drawing/2014/main" id="{AA04055F-1B66-074D-AFB6-AEFCBE330EEC}"/>
-              </a:ext>
-            </a:extLst>
-          </p:cNvPr>
+          <p:cNvPr id="6" name="Content Placeholder 5"/>
           <p:cNvSpPr>
             <a:spLocks noGrp="1"/>
           </p:cNvSpPr>
@@ -2280,8 +2311,8 @@
         </p:nvSpPr>
         <p:spPr>
           <a:xfrm>
-            <a:off x="6172200" y="2505075"/>
-            <a:ext cx="5183188" cy="3684588"/>
+            <a:off x="6412362" y="2821491"/>
+            <a:ext cx="4645152" cy="2637371"/>
           </a:xfrm>
         </p:spPr>
         <p:txBody>
@@ -2321,18 +2352,13 @@
               <a:rPr lang="en-US"/>
               <a:t>Fifth level</a:t>
             </a:r>
-          </a:p>
-        </p:txBody>
-      </p:sp>
-      <p:sp>
-        <p:nvSpPr>
-          <p:cNvPr id="7" name="Date Placeholder 6">
-            <a:extLst>
-              <a:ext uri="{FF2B5EF4-FFF2-40B4-BE49-F238E27FC236}">
-                <a16:creationId xmlns:a16="http://schemas.microsoft.com/office/drawing/2014/main" id="{EE87D378-74FB-334C-84D5-8A9EF8EB17E5}"/>
-              </a:ext>
-            </a:extLst>
-          </p:cNvPr>
+            <a:endParaRPr lang="en-US" dirty="0"/>
+          </a:p>
+        </p:txBody>
+      </p:sp>
+      <p:sp>
+        <p:nvSpPr>
+          <p:cNvPr id="7" name="Date Placeholder 6"/>
           <p:cNvSpPr>
             <a:spLocks noGrp="1"/>
           </p:cNvSpPr>
@@ -2347,7 +2373,7 @@
           <a:p>
             <a:fld id="{A7EDA9A7-C2A3-014D-A1A7-33CDA929B4A4}" type="datetimeFigureOut">
               <a:rPr lang="en-US" smtClean="0"/>
-              <a:t>10/16/21</a:t>
+              <a:t>10/17/21</a:t>
             </a:fld>
             <a:endParaRPr lang="en-US"/>
           </a:p>
@@ -2355,13 +2381,7 @@
       </p:sp>
       <p:sp>
         <p:nvSpPr>
-          <p:cNvPr id="8" name="Footer Placeholder 7">
-            <a:extLst>
-              <a:ext uri="{FF2B5EF4-FFF2-40B4-BE49-F238E27FC236}">
-                <a16:creationId xmlns:a16="http://schemas.microsoft.com/office/drawing/2014/main" id="{7A86A1D7-877D-1C4D-BBDC-B6A5B590E063}"/>
-              </a:ext>
-            </a:extLst>
-          </p:cNvPr>
+          <p:cNvPr id="8" name="Footer Placeholder 7"/>
           <p:cNvSpPr>
             <a:spLocks noGrp="1"/>
           </p:cNvSpPr>
@@ -2380,13 +2400,7 @@
       </p:sp>
       <p:sp>
         <p:nvSpPr>
-          <p:cNvPr id="9" name="Slide Number Placeholder 8">
-            <a:extLst>
-              <a:ext uri="{FF2B5EF4-FFF2-40B4-BE49-F238E27FC236}">
-                <a16:creationId xmlns:a16="http://schemas.microsoft.com/office/drawing/2014/main" id="{AE58F1EC-A588-F540-A3E6-1B5269AD3DB0}"/>
-              </a:ext>
-            </a:extLst>
-          </p:cNvPr>
+          <p:cNvPr id="9" name="Slide Number Placeholder 8"/>
           <p:cNvSpPr>
             <a:spLocks noGrp="1"/>
           </p:cNvSpPr>
@@ -2407,10 +2421,41 @@
           </a:p>
         </p:txBody>
       </p:sp>
+      <p:cxnSp>
+        <p:nvCxnSpPr>
+          <p:cNvPr id="29" name="Straight Connector 28"/>
+          <p:cNvCxnSpPr/>
+          <p:nvPr/>
+        </p:nvCxnSpPr>
+        <p:spPr>
+          <a:xfrm>
+            <a:off x="1453896" y="1847088"/>
+            <a:ext cx="9607522" cy="0"/>
+          </a:xfrm>
+          <a:prstGeom prst="line">
+            <a:avLst/>
+          </a:prstGeom>
+          <a:ln w="31750"/>
+        </p:spPr>
+        <p:style>
+          <a:lnRef idx="3">
+            <a:schemeClr val="accent1"/>
+          </a:lnRef>
+          <a:fillRef idx="0">
+            <a:schemeClr val="accent1"/>
+          </a:fillRef>
+          <a:effectRef idx="2">
+            <a:schemeClr val="accent1"/>
+          </a:effectRef>
+          <a:fontRef idx="minor">
+            <a:schemeClr val="tx1"/>
+          </a:fontRef>
+        </p:style>
+      </p:cxnSp>
     </p:spTree>
     <p:extLst>
       <p:ext uri="{BB962C8B-B14F-4D97-AF65-F5344CB8AC3E}">
-        <p14:creationId xmlns:p14="http://schemas.microsoft.com/office/powerpoint/2010/main" val="1589233367"/>
+        <p14:creationId xmlns:p14="http://schemas.microsoft.com/office/powerpoint/2010/main" val="1991562986"/>
       </p:ext>
     </p:extLst>
   </p:cSld>
@@ -2439,13 +2484,7 @@
       </p:grpSpPr>
       <p:sp>
         <p:nvSpPr>
-          <p:cNvPr id="2" name="Title 1">
-            <a:extLst>
-              <a:ext uri="{FF2B5EF4-FFF2-40B4-BE49-F238E27FC236}">
-                <a16:creationId xmlns:a16="http://schemas.microsoft.com/office/drawing/2014/main" id="{C8B9F96C-06F7-F34F-801E-503CADE9DCC8}"/>
-              </a:ext>
-            </a:extLst>
-          </p:cNvPr>
+          <p:cNvPr id="2" name="Title 1"/>
           <p:cNvSpPr>
             <a:spLocks noGrp="1"/>
           </p:cNvSpPr>
@@ -2462,18 +2501,13 @@
               <a:rPr lang="en-US"/>
               <a:t>Click to edit Master title style</a:t>
             </a:r>
-          </a:p>
-        </p:txBody>
-      </p:sp>
-      <p:sp>
-        <p:nvSpPr>
-          <p:cNvPr id="3" name="Date Placeholder 2">
-            <a:extLst>
-              <a:ext uri="{FF2B5EF4-FFF2-40B4-BE49-F238E27FC236}">
-                <a16:creationId xmlns:a16="http://schemas.microsoft.com/office/drawing/2014/main" id="{93ED2E92-49CD-6A4A-8158-A32F1D870F55}"/>
-              </a:ext>
-            </a:extLst>
-          </p:cNvPr>
+            <a:endParaRPr lang="en-US" dirty="0"/>
+          </a:p>
+        </p:txBody>
+      </p:sp>
+      <p:sp>
+        <p:nvSpPr>
+          <p:cNvPr id="3" name="Date Placeholder 2"/>
           <p:cNvSpPr>
             <a:spLocks noGrp="1"/>
           </p:cNvSpPr>
@@ -2488,7 +2522,7 @@
           <a:p>
             <a:fld id="{A7EDA9A7-C2A3-014D-A1A7-33CDA929B4A4}" type="datetimeFigureOut">
               <a:rPr lang="en-US" smtClean="0"/>
-              <a:t>10/16/21</a:t>
+              <a:t>10/17/21</a:t>
             </a:fld>
             <a:endParaRPr lang="en-US"/>
           </a:p>
@@ -2496,13 +2530,7 @@
       </p:sp>
       <p:sp>
         <p:nvSpPr>
-          <p:cNvPr id="4" name="Footer Placeholder 3">
-            <a:extLst>
-              <a:ext uri="{FF2B5EF4-FFF2-40B4-BE49-F238E27FC236}">
-                <a16:creationId xmlns:a16="http://schemas.microsoft.com/office/drawing/2014/main" id="{791F494A-F060-B246-B11C-0AE946F2503B}"/>
-              </a:ext>
-            </a:extLst>
-          </p:cNvPr>
+          <p:cNvPr id="4" name="Footer Placeholder 3"/>
           <p:cNvSpPr>
             <a:spLocks noGrp="1"/>
           </p:cNvSpPr>
@@ -2521,13 +2549,7 @@
       </p:sp>
       <p:sp>
         <p:nvSpPr>
-          <p:cNvPr id="5" name="Slide Number Placeholder 4">
-            <a:extLst>
-              <a:ext uri="{FF2B5EF4-FFF2-40B4-BE49-F238E27FC236}">
-                <a16:creationId xmlns:a16="http://schemas.microsoft.com/office/drawing/2014/main" id="{9185F91E-EE51-8342-BD6E-22498FF28975}"/>
-              </a:ext>
-            </a:extLst>
-          </p:cNvPr>
+          <p:cNvPr id="5" name="Slide Number Placeholder 4"/>
           <p:cNvSpPr>
             <a:spLocks noGrp="1"/>
           </p:cNvSpPr>
@@ -2548,10 +2570,41 @@
           </a:p>
         </p:txBody>
       </p:sp>
+      <p:cxnSp>
+        <p:nvCxnSpPr>
+          <p:cNvPr id="25" name="Straight Connector 24"/>
+          <p:cNvCxnSpPr/>
+          <p:nvPr/>
+        </p:nvCxnSpPr>
+        <p:spPr>
+          <a:xfrm>
+            <a:off x="1453896" y="1847088"/>
+            <a:ext cx="9607522" cy="0"/>
+          </a:xfrm>
+          <a:prstGeom prst="line">
+            <a:avLst/>
+          </a:prstGeom>
+          <a:ln w="31750"/>
+        </p:spPr>
+        <p:style>
+          <a:lnRef idx="3">
+            <a:schemeClr val="accent1"/>
+          </a:lnRef>
+          <a:fillRef idx="0">
+            <a:schemeClr val="accent1"/>
+          </a:fillRef>
+          <a:effectRef idx="2">
+            <a:schemeClr val="accent1"/>
+          </a:effectRef>
+          <a:fontRef idx="minor">
+            <a:schemeClr val="tx1"/>
+          </a:fontRef>
+        </p:style>
+      </p:cxnSp>
     </p:spTree>
     <p:extLst>
       <p:ext uri="{BB962C8B-B14F-4D97-AF65-F5344CB8AC3E}">
-        <p14:creationId xmlns:p14="http://schemas.microsoft.com/office/powerpoint/2010/main" val="2492704487"/>
+        <p14:creationId xmlns:p14="http://schemas.microsoft.com/office/powerpoint/2010/main" val="3324879260"/>
       </p:ext>
     </p:extLst>
   </p:cSld>
@@ -2580,13 +2633,7 @@
       </p:grpSpPr>
       <p:sp>
         <p:nvSpPr>
-          <p:cNvPr id="2" name="Date Placeholder 1">
-            <a:extLst>
-              <a:ext uri="{FF2B5EF4-FFF2-40B4-BE49-F238E27FC236}">
-                <a16:creationId xmlns:a16="http://schemas.microsoft.com/office/drawing/2014/main" id="{71577E3A-2142-244D-9DDC-D85AF4A2F13E}"/>
-              </a:ext>
-            </a:extLst>
-          </p:cNvPr>
+          <p:cNvPr id="2" name="Date Placeholder 1"/>
           <p:cNvSpPr>
             <a:spLocks noGrp="1"/>
           </p:cNvSpPr>
@@ -2601,7 +2648,7 @@
           <a:p>
             <a:fld id="{A7EDA9A7-C2A3-014D-A1A7-33CDA929B4A4}" type="datetimeFigureOut">
               <a:rPr lang="en-US" smtClean="0"/>
-              <a:t>10/16/21</a:t>
+              <a:t>10/17/21</a:t>
             </a:fld>
             <a:endParaRPr lang="en-US"/>
           </a:p>
@@ -2609,13 +2656,7 @@
       </p:sp>
       <p:sp>
         <p:nvSpPr>
-          <p:cNvPr id="3" name="Footer Placeholder 2">
-            <a:extLst>
-              <a:ext uri="{FF2B5EF4-FFF2-40B4-BE49-F238E27FC236}">
-                <a16:creationId xmlns:a16="http://schemas.microsoft.com/office/drawing/2014/main" id="{2CE8C7FC-FB03-9D4F-AD7D-9FC8D2EB2148}"/>
-              </a:ext>
-            </a:extLst>
-          </p:cNvPr>
+          <p:cNvPr id="3" name="Footer Placeholder 2"/>
           <p:cNvSpPr>
             <a:spLocks noGrp="1"/>
           </p:cNvSpPr>
@@ -2634,13 +2675,7 @@
       </p:sp>
       <p:sp>
         <p:nvSpPr>
-          <p:cNvPr id="4" name="Slide Number Placeholder 3">
-            <a:extLst>
-              <a:ext uri="{FF2B5EF4-FFF2-40B4-BE49-F238E27FC236}">
-                <a16:creationId xmlns:a16="http://schemas.microsoft.com/office/drawing/2014/main" id="{818FE54F-73CC-2B41-807B-ACFACFD19680}"/>
-              </a:ext>
-            </a:extLst>
-          </p:cNvPr>
+          <p:cNvPr id="4" name="Slide Number Placeholder 3"/>
           <p:cNvSpPr>
             <a:spLocks noGrp="1"/>
           </p:cNvSpPr>
@@ -2664,7 +2699,7 @@
     </p:spTree>
     <p:extLst>
       <p:ext uri="{BB962C8B-B14F-4D97-AF65-F5344CB8AC3E}">
-        <p14:creationId xmlns:p14="http://schemas.microsoft.com/office/powerpoint/2010/main" val="1819442636"/>
+        <p14:creationId xmlns:p14="http://schemas.microsoft.com/office/powerpoint/2010/main" val="3919410924"/>
       </p:ext>
     </p:extLst>
   </p:cSld>
@@ -2693,13 +2728,7 @@
       </p:grpSpPr>
       <p:sp>
         <p:nvSpPr>
-          <p:cNvPr id="2" name="Title 1">
-            <a:extLst>
-              <a:ext uri="{FF2B5EF4-FFF2-40B4-BE49-F238E27FC236}">
-                <a16:creationId xmlns:a16="http://schemas.microsoft.com/office/drawing/2014/main" id="{CDDBD71B-8C33-9A45-B51C-467E0594E621}"/>
-              </a:ext>
-            </a:extLst>
-          </p:cNvPr>
+          <p:cNvPr id="2" name="Title 1"/>
           <p:cNvSpPr>
             <a:spLocks noGrp="1"/>
           </p:cNvSpPr>
@@ -2709,15 +2738,17 @@
         </p:nvSpPr>
         <p:spPr>
           <a:xfrm>
-            <a:off x="839788" y="457200"/>
-            <a:ext cx="3932237" cy="1600200"/>
-          </a:xfrm>
-        </p:spPr>
-        <p:txBody>
-          <a:bodyPr anchor="b"/>
+            <a:off x="1444671" y="798973"/>
+            <a:ext cx="3273099" cy="2247117"/>
+          </a:xfrm>
+        </p:spPr>
+        <p:txBody>
+          <a:bodyPr anchor="b">
+            <a:normAutofit/>
+          </a:bodyPr>
           <a:lstStyle>
-            <a:lvl1pPr>
-              <a:defRPr sz="3200"/>
+            <a:lvl1pPr algn="l">
+              <a:defRPr sz="2400"/>
             </a:lvl1pPr>
           </a:lstStyle>
           <a:p>
@@ -2725,18 +2756,13 @@
               <a:rPr lang="en-US"/>
               <a:t>Click to edit Master title style</a:t>
             </a:r>
-          </a:p>
-        </p:txBody>
-      </p:sp>
-      <p:sp>
-        <p:nvSpPr>
-          <p:cNvPr id="3" name="Content Placeholder 2">
-            <a:extLst>
-              <a:ext uri="{FF2B5EF4-FFF2-40B4-BE49-F238E27FC236}">
-                <a16:creationId xmlns:a16="http://schemas.microsoft.com/office/drawing/2014/main" id="{6D9447F7-3A6A-CF44-BD0A-485077F7BDE9}"/>
-              </a:ext>
-            </a:extLst>
-          </p:cNvPr>
+            <a:endParaRPr lang="en-US" dirty="0"/>
+          </a:p>
+        </p:txBody>
+      </p:sp>
+      <p:sp>
+        <p:nvSpPr>
+          <p:cNvPr id="3" name="Content Placeholder 2"/>
           <p:cNvSpPr>
             <a:spLocks noGrp="1"/>
           </p:cNvSpPr>
@@ -2746,104 +2772,71 @@
         </p:nvSpPr>
         <p:spPr>
           <a:xfrm>
-            <a:off x="5183188" y="987425"/>
-            <a:ext cx="6172200" cy="4873625"/>
+            <a:off x="5043714" y="798974"/>
+            <a:ext cx="6012470" cy="4658826"/>
+          </a:xfrm>
+        </p:spPr>
+        <p:txBody>
+          <a:bodyPr anchor="ctr"/>
+          <a:lstStyle/>
+          <a:p>
+            <a:pPr lvl="0"/>
+            <a:r>
+              <a:rPr lang="en-US"/>
+              <a:t>Click to edit Master text styles</a:t>
+            </a:r>
+          </a:p>
+          <a:p>
+            <a:pPr lvl="1"/>
+            <a:r>
+              <a:rPr lang="en-US"/>
+              <a:t>Second level</a:t>
+            </a:r>
+          </a:p>
+          <a:p>
+            <a:pPr lvl="2"/>
+            <a:r>
+              <a:rPr lang="en-US"/>
+              <a:t>Third level</a:t>
+            </a:r>
+          </a:p>
+          <a:p>
+            <a:pPr lvl="3"/>
+            <a:r>
+              <a:rPr lang="en-US"/>
+              <a:t>Fourth level</a:t>
+            </a:r>
+          </a:p>
+          <a:p>
+            <a:pPr lvl="4"/>
+            <a:r>
+              <a:rPr lang="en-US"/>
+              <a:t>Fifth level</a:t>
+            </a:r>
+            <a:endParaRPr lang="en-US" dirty="0"/>
+          </a:p>
+        </p:txBody>
+      </p:sp>
+      <p:sp>
+        <p:nvSpPr>
+          <p:cNvPr id="4" name="Text Placeholder 3"/>
+          <p:cNvSpPr>
+            <a:spLocks noGrp="1"/>
+          </p:cNvSpPr>
+          <p:nvPr>
+            <p:ph type="body" sz="half" idx="2"/>
+          </p:nvPr>
+        </p:nvSpPr>
+        <p:spPr>
+          <a:xfrm>
+            <a:off x="1444671" y="3205491"/>
+            <a:ext cx="3275013" cy="2248181"/>
           </a:xfrm>
         </p:spPr>
         <p:txBody>
           <a:bodyPr/>
           <a:lstStyle>
-            <a:lvl1pPr>
-              <a:defRPr sz="3200"/>
-            </a:lvl1pPr>
-            <a:lvl2pPr>
-              <a:defRPr sz="2800"/>
-            </a:lvl2pPr>
-            <a:lvl3pPr>
-              <a:defRPr sz="2400"/>
-            </a:lvl3pPr>
-            <a:lvl4pPr>
-              <a:defRPr sz="2000"/>
-            </a:lvl4pPr>
-            <a:lvl5pPr>
-              <a:defRPr sz="2000"/>
-            </a:lvl5pPr>
-            <a:lvl6pPr>
-              <a:defRPr sz="2000"/>
-            </a:lvl6pPr>
-            <a:lvl7pPr>
-              <a:defRPr sz="2000"/>
-            </a:lvl7pPr>
-            <a:lvl8pPr>
-              <a:defRPr sz="2000"/>
-            </a:lvl8pPr>
-            <a:lvl9pPr>
-              <a:defRPr sz="2000"/>
-            </a:lvl9pPr>
-          </a:lstStyle>
-          <a:p>
-            <a:pPr lvl="0"/>
-            <a:r>
-              <a:rPr lang="en-US"/>
-              <a:t>Click to edit Master text styles</a:t>
-            </a:r>
-          </a:p>
-          <a:p>
-            <a:pPr lvl="1"/>
-            <a:r>
-              <a:rPr lang="en-US"/>
-              <a:t>Second level</a:t>
-            </a:r>
-          </a:p>
-          <a:p>
-            <a:pPr lvl="2"/>
-            <a:r>
-              <a:rPr lang="en-US"/>
-              <a:t>Third level</a:t>
-            </a:r>
-          </a:p>
-          <a:p>
-            <a:pPr lvl="3"/>
-            <a:r>
-              <a:rPr lang="en-US"/>
-              <a:t>Fourth level</a:t>
-            </a:r>
-          </a:p>
-          <a:p>
-            <a:pPr lvl="4"/>
-            <a:r>
-              <a:rPr lang="en-US"/>
-              <a:t>Fifth level</a:t>
-            </a:r>
-          </a:p>
-        </p:txBody>
-      </p:sp>
-      <p:sp>
-        <p:nvSpPr>
-          <p:cNvPr id="4" name="Text Placeholder 3">
-            <a:extLst>
-              <a:ext uri="{FF2B5EF4-FFF2-40B4-BE49-F238E27FC236}">
-                <a16:creationId xmlns:a16="http://schemas.microsoft.com/office/drawing/2014/main" id="{F01AF557-9648-3245-AA1A-681ADB513F4F}"/>
-              </a:ext>
-            </a:extLst>
-          </p:cNvPr>
-          <p:cNvSpPr>
-            <a:spLocks noGrp="1"/>
-          </p:cNvSpPr>
-          <p:nvPr>
-            <p:ph type="body" sz="half" idx="2"/>
-          </p:nvPr>
-        </p:nvSpPr>
-        <p:spPr>
-          <a:xfrm>
-            <a:off x="839788" y="2057400"/>
-            <a:ext cx="3932237" cy="3811588"/>
-          </a:xfrm>
-        </p:spPr>
-        <p:txBody>
-          <a:bodyPr/>
-          <a:lstStyle>
-            <a:lvl1pPr marL="0" indent="0">
+            <a:lvl1pPr marL="0" indent="0" algn="l">
               <a:buNone/>
               <a:defRPr sz="1600"/>
             </a:lvl1pPr>
@@ -2891,13 +2884,7 @@
       </p:sp>
       <p:sp>
         <p:nvSpPr>
-          <p:cNvPr id="5" name="Date Placeholder 4">
-            <a:extLst>
-              <a:ext uri="{FF2B5EF4-FFF2-40B4-BE49-F238E27FC236}">
-                <a16:creationId xmlns:a16="http://schemas.microsoft.com/office/drawing/2014/main" id="{D741C116-10AF-1947-9874-A4638CEA068F}"/>
-              </a:ext>
-            </a:extLst>
-          </p:cNvPr>
+          <p:cNvPr id="5" name="Date Placeholder 4"/>
           <p:cNvSpPr>
             <a:spLocks noGrp="1"/>
           </p:cNvSpPr>
@@ -2912,7 +2899,7 @@
           <a:p>
             <a:fld id="{A7EDA9A7-C2A3-014D-A1A7-33CDA929B4A4}" type="datetimeFigureOut">
               <a:rPr lang="en-US" smtClean="0"/>
-              <a:t>10/16/21</a:t>
+              <a:t>10/17/21</a:t>
             </a:fld>
             <a:endParaRPr lang="en-US"/>
           </a:p>
@@ -2920,13 +2907,7 @@
       </p:sp>
       <p:sp>
         <p:nvSpPr>
-          <p:cNvPr id="6" name="Footer Placeholder 5">
-            <a:extLst>
-              <a:ext uri="{FF2B5EF4-FFF2-40B4-BE49-F238E27FC236}">
-                <a16:creationId xmlns:a16="http://schemas.microsoft.com/office/drawing/2014/main" id="{B952F7A8-3345-8945-8964-4FC4598C5252}"/>
-              </a:ext>
-            </a:extLst>
-          </p:cNvPr>
+          <p:cNvPr id="6" name="Footer Placeholder 5"/>
           <p:cNvSpPr>
             <a:spLocks noGrp="1"/>
           </p:cNvSpPr>
@@ -2945,13 +2926,7 @@
       </p:sp>
       <p:sp>
         <p:nvSpPr>
-          <p:cNvPr id="7" name="Slide Number Placeholder 6">
-            <a:extLst>
-              <a:ext uri="{FF2B5EF4-FFF2-40B4-BE49-F238E27FC236}">
-                <a16:creationId xmlns:a16="http://schemas.microsoft.com/office/drawing/2014/main" id="{159873DA-CF39-CF44-B1EC-4D57FB5F0488}"/>
-              </a:ext>
-            </a:extLst>
-          </p:cNvPr>
+          <p:cNvPr id="7" name="Slide Number Placeholder 6"/>
           <p:cNvSpPr>
             <a:spLocks noGrp="1"/>
           </p:cNvSpPr>
@@ -2972,10 +2947,41 @@
           </a:p>
         </p:txBody>
       </p:sp>
+      <p:cxnSp>
+        <p:nvCxnSpPr>
+          <p:cNvPr id="17" name="Straight Connector 16"/>
+          <p:cNvCxnSpPr/>
+          <p:nvPr/>
+        </p:nvCxnSpPr>
+        <p:spPr>
+          <a:xfrm>
+            <a:off x="1448280" y="3205491"/>
+            <a:ext cx="3269490" cy="0"/>
+          </a:xfrm>
+          <a:prstGeom prst="line">
+            <a:avLst/>
+          </a:prstGeom>
+          <a:ln w="31750"/>
+        </p:spPr>
+        <p:style>
+          <a:lnRef idx="3">
+            <a:schemeClr val="accent1"/>
+          </a:lnRef>
+          <a:fillRef idx="0">
+            <a:schemeClr val="accent1"/>
+          </a:fillRef>
+          <a:effectRef idx="2">
+            <a:schemeClr val="accent1"/>
+          </a:effectRef>
+          <a:fontRef idx="minor">
+            <a:schemeClr val="tx1"/>
+          </a:fontRef>
+        </p:style>
+      </p:cxnSp>
     </p:spTree>
     <p:extLst>
       <p:ext uri="{BB962C8B-B14F-4D97-AF65-F5344CB8AC3E}">
-        <p14:creationId xmlns:p14="http://schemas.microsoft.com/office/powerpoint/2010/main" val="3718504186"/>
+        <p14:creationId xmlns:p14="http://schemas.microsoft.com/office/powerpoint/2010/main" val="2345584066"/>
       </p:ext>
     </p:extLst>
   </p:cSld>
@@ -3002,15 +3008,143 @@
           <a:chExt cx="0" cy="0"/>
         </a:xfrm>
       </p:grpSpPr>
-      <p:sp>
-        <p:nvSpPr>
-          <p:cNvPr id="2" name="Title 1">
-            <a:extLst>
-              <a:ext uri="{FF2B5EF4-FFF2-40B4-BE49-F238E27FC236}">
-                <a16:creationId xmlns:a16="http://schemas.microsoft.com/office/drawing/2014/main" id="{0590B43E-4C83-C04F-8BA6-0DC347C953D7}"/>
-              </a:ext>
-            </a:extLst>
-          </p:cNvPr>
+      <p:grpSp>
+        <p:nvGrpSpPr>
+          <p:cNvPr id="8" name="Group 7"/>
+          <p:cNvGrpSpPr/>
+          <p:nvPr/>
+        </p:nvGrpSpPr>
+        <p:grpSpPr>
+          <a:xfrm>
+            <a:off x="7477387" y="482170"/>
+            <a:ext cx="4074533" cy="5149101"/>
+            <a:chOff x="7477387" y="482170"/>
+            <a:chExt cx="4074533" cy="5149101"/>
+          </a:xfrm>
+        </p:grpSpPr>
+        <p:sp>
+          <p:nvSpPr>
+            <p:cNvPr id="18" name="Rectangle 17"/>
+            <p:cNvSpPr/>
+            <p:nvPr/>
+          </p:nvSpPr>
+          <p:spPr bwMode="black">
+            <a:xfrm>
+              <a:off x="7477387" y="482170"/>
+              <a:ext cx="4074533" cy="5149101"/>
+            </a:xfrm>
+            <a:prstGeom prst="rect">
+              <a:avLst/>
+            </a:prstGeom>
+            <a:gradFill>
+              <a:gsLst>
+                <a:gs pos="0">
+                  <a:srgbClr val="000001"/>
+                </a:gs>
+                <a:gs pos="100000">
+                  <a:srgbClr val="191919"/>
+                </a:gs>
+              </a:gsLst>
+            </a:gradFill>
+            <a:ln w="76200" cmpd="sng">
+              <a:noFill/>
+              <a:miter lim="800000"/>
+            </a:ln>
+            <a:effectLst>
+              <a:outerShdw blurRad="127000" dist="228600" dir="4740000" sx="98000" sy="98000" algn="tl" rotWithShape="0">
+                <a:srgbClr val="000000">
+                  <a:alpha val="34000"/>
+                </a:srgbClr>
+              </a:outerShdw>
+            </a:effectLst>
+            <a:scene3d>
+              <a:camera prst="orthographicFront"/>
+              <a:lightRig rig="threePt" dir="t"/>
+            </a:scene3d>
+            <a:sp3d>
+              <a:bevelT w="152400" h="50800" prst="softRound"/>
+            </a:sp3d>
+          </p:spPr>
+          <p:style>
+            <a:lnRef idx="1">
+              <a:schemeClr val="accent1"/>
+            </a:lnRef>
+            <a:fillRef idx="3">
+              <a:schemeClr val="accent1"/>
+            </a:fillRef>
+            <a:effectRef idx="2">
+              <a:schemeClr val="accent1"/>
+            </a:effectRef>
+            <a:fontRef idx="minor">
+              <a:schemeClr val="lt1"/>
+            </a:fontRef>
+          </p:style>
+        </p:sp>
+        <p:sp>
+          <p:nvSpPr>
+            <p:cNvPr id="19" name="Rectangle 18"/>
+            <p:cNvSpPr/>
+            <p:nvPr/>
+          </p:nvSpPr>
+          <p:spPr bwMode="blackWhite">
+            <a:xfrm>
+              <a:off x="7790446" y="812506"/>
+              <a:ext cx="3450289" cy="4466452"/>
+            </a:xfrm>
+            <a:prstGeom prst="rect">
+              <a:avLst/>
+            </a:prstGeom>
+            <a:gradFill>
+              <a:gsLst>
+                <a:gs pos="0">
+                  <a:srgbClr val="DADADA"/>
+                </a:gs>
+                <a:gs pos="100000">
+                  <a:srgbClr val="FFFFFE"/>
+                </a:gs>
+              </a:gsLst>
+              <a:lin ang="16200000" scaled="0"/>
+            </a:gradFill>
+            <a:ln w="50800" cmpd="sng">
+              <a:solidFill>
+                <a:srgbClr val="191919"/>
+              </a:solidFill>
+              <a:miter lim="800000"/>
+            </a:ln>
+            <a:effectLst>
+              <a:innerShdw blurRad="63500" dist="88900" dir="14100000">
+                <a:srgbClr val="000000">
+                  <a:alpha val="30000"/>
+                </a:srgbClr>
+              </a:innerShdw>
+            </a:effectLst>
+            <a:scene3d>
+              <a:camera prst="orthographicFront"/>
+              <a:lightRig rig="threePt" dir="t"/>
+            </a:scene3d>
+            <a:sp3d>
+              <a:bevelT prst="relaxedInset"/>
+            </a:sp3d>
+          </p:spPr>
+          <p:style>
+            <a:lnRef idx="1">
+              <a:schemeClr val="accent1"/>
+            </a:lnRef>
+            <a:fillRef idx="3">
+              <a:schemeClr val="accent1"/>
+            </a:fillRef>
+            <a:effectRef idx="2">
+              <a:schemeClr val="accent1"/>
+            </a:effectRef>
+            <a:fontRef idx="minor">
+              <a:schemeClr val="lt1"/>
+            </a:fontRef>
+          </p:style>
+        </p:sp>
+      </p:grpSp>
+      <p:sp>
+        <p:nvSpPr>
+          <p:cNvPr id="2" name="Title 1"/>
           <p:cNvSpPr>
             <a:spLocks noGrp="1"/>
           </p:cNvSpPr>
@@ -3020,12 +3154,14 @@
         </p:nvSpPr>
         <p:spPr>
           <a:xfrm>
-            <a:off x="839788" y="457200"/>
-            <a:ext cx="3932237" cy="1600200"/>
-          </a:xfrm>
-        </p:spPr>
-        <p:txBody>
-          <a:bodyPr anchor="b"/>
+            <a:off x="1451206" y="1129513"/>
+            <a:ext cx="5532328" cy="1830584"/>
+          </a:xfrm>
+        </p:spPr>
+        <p:txBody>
+          <a:bodyPr anchor="b">
+            <a:normAutofit/>
+          </a:bodyPr>
           <a:lstStyle>
             <a:lvl1pPr>
               <a:defRPr sz="3200"/>
@@ -3036,20 +3172,15 @@
               <a:rPr lang="en-US"/>
               <a:t>Click to edit Master title style</a:t>
             </a:r>
-          </a:p>
-        </p:txBody>
-      </p:sp>
-      <p:sp>
-        <p:nvSpPr>
-          <p:cNvPr id="3" name="Picture Placeholder 2">
-            <a:extLst>
-              <a:ext uri="{FF2B5EF4-FFF2-40B4-BE49-F238E27FC236}">
-                <a16:creationId xmlns:a16="http://schemas.microsoft.com/office/drawing/2014/main" id="{D97D571B-4745-E842-8F89-A9C8F335F543}"/>
-              </a:ext>
-            </a:extLst>
-          </p:cNvPr>
-          <p:cNvSpPr>
-            <a:spLocks noGrp="1"/>
+            <a:endParaRPr lang="en-US" dirty="0"/>
+          </a:p>
+        </p:txBody>
+      </p:sp>
+      <p:sp>
+        <p:nvSpPr>
+          <p:cNvPr id="3" name="Picture Placeholder 2"/>
+          <p:cNvSpPr>
+            <a:spLocks noGrp="1" noChangeAspect="1"/>
           </p:cNvSpPr>
           <p:nvPr>
             <p:ph type="pic" idx="1"/>
@@ -3057,14 +3188,24 @@
         </p:nvSpPr>
         <p:spPr>
           <a:xfrm>
-            <a:off x="5183188" y="987425"/>
-            <a:ext cx="6172200" cy="4873625"/>
-          </a:xfrm>
-        </p:spPr>
-        <p:txBody>
-          <a:bodyPr/>
+            <a:off x="8124389" y="1122542"/>
+            <a:ext cx="2791171" cy="3866327"/>
+          </a:xfrm>
+          <a:solidFill>
+            <a:schemeClr val="bg1">
+              <a:lumMod val="85000"/>
+            </a:schemeClr>
+          </a:solidFill>
+          <a:ln w="9525" cap="sq">
+            <a:noFill/>
+            <a:miter lim="800000"/>
+          </a:ln>
+          <a:effectLst/>
+        </p:spPr>
+        <p:txBody>
+          <a:bodyPr anchor="t"/>
           <a:lstStyle>
-            <a:lvl1pPr marL="0" indent="0">
+            <a:lvl1pPr marL="0" indent="0" algn="ctr">
               <a:buNone/>
               <a:defRPr sz="3200"/>
             </a:lvl1pPr>
@@ -3102,19 +3243,17 @@
             </a:lvl9pPr>
           </a:lstStyle>
           <a:p>
-            <a:endParaRPr lang="en-US"/>
-          </a:p>
-        </p:txBody>
-      </p:sp>
-      <p:sp>
-        <p:nvSpPr>
-          <p:cNvPr id="4" name="Text Placeholder 3">
-            <a:extLst>
-              <a:ext uri="{FF2B5EF4-FFF2-40B4-BE49-F238E27FC236}">
-                <a16:creationId xmlns:a16="http://schemas.microsoft.com/office/drawing/2014/main" id="{A609D985-FDC0-9E43-B780-57AE20CA617A}"/>
-              </a:ext>
-            </a:extLst>
-          </p:cNvPr>
+            <a:r>
+              <a:rPr lang="en-US"/>
+              <a:t>Click icon to add picture</a:t>
+            </a:r>
+            <a:endParaRPr lang="en-US" dirty="0"/>
+          </a:p>
+        </p:txBody>
+      </p:sp>
+      <p:sp>
+        <p:nvSpPr>
+          <p:cNvPr id="4" name="Text Placeholder 3"/>
           <p:cNvSpPr>
             <a:spLocks noGrp="1"/>
           </p:cNvSpPr>
@@ -3124,16 +3263,18 @@
         </p:nvSpPr>
         <p:spPr>
           <a:xfrm>
-            <a:off x="839788" y="2057400"/>
-            <a:ext cx="3932237" cy="3811588"/>
-          </a:xfrm>
-        </p:spPr>
-        <p:txBody>
-          <a:bodyPr/>
+            <a:off x="1450329" y="3145992"/>
+            <a:ext cx="5524404" cy="2003742"/>
+          </a:xfrm>
+        </p:spPr>
+        <p:txBody>
+          <a:bodyPr>
+            <a:normAutofit/>
+          </a:bodyPr>
           <a:lstStyle>
-            <a:lvl1pPr marL="0" indent="0">
+            <a:lvl1pPr marL="0" indent="0" algn="l">
               <a:buNone/>
-              <a:defRPr sz="1600"/>
+              <a:defRPr sz="1800"/>
             </a:lvl1pPr>
             <a:lvl2pPr marL="457200" indent="0">
               <a:buNone/>
@@ -3179,13 +3320,7 @@
       </p:sp>
       <p:sp>
         <p:nvSpPr>
-          <p:cNvPr id="5" name="Date Placeholder 4">
-            <a:extLst>
-              <a:ext uri="{FF2B5EF4-FFF2-40B4-BE49-F238E27FC236}">
-                <a16:creationId xmlns:a16="http://schemas.microsoft.com/office/drawing/2014/main" id="{AA1FFCCF-0367-7C42-81A5-FBD78638FA71}"/>
-              </a:ext>
-            </a:extLst>
-          </p:cNvPr>
+          <p:cNvPr id="5" name="Date Placeholder 4"/>
           <p:cNvSpPr>
             <a:spLocks noGrp="1"/>
           </p:cNvSpPr>
@@ -3193,14 +3328,23 @@
             <p:ph type="dt" sz="half" idx="10"/>
           </p:nvPr>
         </p:nvSpPr>
-        <p:spPr/>
+        <p:spPr>
+          <a:xfrm>
+            <a:off x="1447382" y="5469856"/>
+            <a:ext cx="5527351" cy="320123"/>
+          </a:xfrm>
+        </p:spPr>
         <p:txBody>
           <a:bodyPr/>
-          <a:lstStyle/>
+          <a:lstStyle>
+            <a:lvl1pPr algn="l">
+              <a:defRPr/>
+            </a:lvl1pPr>
+          </a:lstStyle>
           <a:p>
             <a:fld id="{A7EDA9A7-C2A3-014D-A1A7-33CDA929B4A4}" type="datetimeFigureOut">
               <a:rPr lang="en-US" smtClean="0"/>
-              <a:t>10/16/21</a:t>
+              <a:t>10/17/21</a:t>
             </a:fld>
             <a:endParaRPr lang="en-US"/>
           </a:p>
@@ -3208,13 +3352,7 @@
       </p:sp>
       <p:sp>
         <p:nvSpPr>
-          <p:cNvPr id="6" name="Footer Placeholder 5">
-            <a:extLst>
-              <a:ext uri="{FF2B5EF4-FFF2-40B4-BE49-F238E27FC236}">
-                <a16:creationId xmlns:a16="http://schemas.microsoft.com/office/drawing/2014/main" id="{4B93D697-6D49-AA42-A4D9-7CCA08AAF2BF}"/>
-              </a:ext>
-            </a:extLst>
-          </p:cNvPr>
+          <p:cNvPr id="6" name="Footer Placeholder 5"/>
           <p:cNvSpPr>
             <a:spLocks noGrp="1"/>
           </p:cNvSpPr>
@@ -3222,7 +3360,12 @@
             <p:ph type="ftr" sz="quarter" idx="11"/>
           </p:nvPr>
         </p:nvSpPr>
-        <p:spPr/>
+        <p:spPr>
+          <a:xfrm>
+            <a:off x="1447382" y="318640"/>
+            <a:ext cx="5541004" cy="320931"/>
+          </a:xfrm>
+        </p:spPr>
         <p:txBody>
           <a:bodyPr/>
           <a:lstStyle/>
@@ -3233,13 +3376,7 @@
       </p:sp>
       <p:sp>
         <p:nvSpPr>
-          <p:cNvPr id="7" name="Slide Number Placeholder 6">
-            <a:extLst>
-              <a:ext uri="{FF2B5EF4-FFF2-40B4-BE49-F238E27FC236}">
-                <a16:creationId xmlns:a16="http://schemas.microsoft.com/office/drawing/2014/main" id="{58530C15-A553-4947-81E8-25BBA1DF97A9}"/>
-              </a:ext>
-            </a:extLst>
-          </p:cNvPr>
+          <p:cNvPr id="7" name="Slide Number Placeholder 6"/>
           <p:cNvSpPr>
             <a:spLocks noGrp="1"/>
           </p:cNvSpPr>
@@ -3260,10 +3397,41 @@
           </a:p>
         </p:txBody>
       </p:sp>
+      <p:cxnSp>
+        <p:nvCxnSpPr>
+          <p:cNvPr id="31" name="Straight Connector 30"/>
+          <p:cNvCxnSpPr/>
+          <p:nvPr/>
+        </p:nvCxnSpPr>
+        <p:spPr>
+          <a:xfrm>
+            <a:off x="1447382" y="3143605"/>
+            <a:ext cx="5527351" cy="0"/>
+          </a:xfrm>
+          <a:prstGeom prst="line">
+            <a:avLst/>
+          </a:prstGeom>
+          <a:ln w="31750"/>
+        </p:spPr>
+        <p:style>
+          <a:lnRef idx="3">
+            <a:schemeClr val="accent1"/>
+          </a:lnRef>
+          <a:fillRef idx="0">
+            <a:schemeClr val="accent1"/>
+          </a:fillRef>
+          <a:effectRef idx="2">
+            <a:schemeClr val="accent1"/>
+          </a:effectRef>
+          <a:fontRef idx="minor">
+            <a:schemeClr val="tx1"/>
+          </a:fontRef>
+        </p:style>
+      </p:cxnSp>
     </p:spTree>
     <p:extLst>
       <p:ext uri="{BB962C8B-B14F-4D97-AF65-F5344CB8AC3E}">
-        <p14:creationId xmlns:p14="http://schemas.microsoft.com/office/powerpoint/2010/main" val="592999643"/>
+        <p14:creationId xmlns:p14="http://schemas.microsoft.com/office/powerpoint/2010/main" val="1171620700"/>
       </p:ext>
     </p:extLst>
   </p:cSld>
@@ -3277,8 +3445,8 @@
 <p:sldMaster xmlns:a="http://schemas.openxmlformats.org/drawingml/2006/main" xmlns:r="http://schemas.openxmlformats.org/officeDocument/2006/relationships" xmlns:p="http://schemas.openxmlformats.org/presentationml/2006/main">
   <p:cSld>
     <p:bg>
-      <p:bgRef idx="1001">
-        <a:schemeClr val="bg1"/>
+      <p:bgRef idx="1003">
+        <a:schemeClr val="bg2"/>
       </p:bgRef>
     </p:bg>
     <p:spTree>
@@ -3297,67 +3465,134 @@
       </p:grpSpPr>
       <p:sp>
         <p:nvSpPr>
-          <p:cNvPr id="2" name="Title Placeholder 1">
-            <a:extLst>
-              <a:ext uri="{FF2B5EF4-FFF2-40B4-BE49-F238E27FC236}">
-                <a16:creationId xmlns:a16="http://schemas.microsoft.com/office/drawing/2014/main" id="{B8D72243-E5E4-6345-8544-8AA532309041}"/>
-              </a:ext>
-            </a:extLst>
-          </p:cNvPr>
-          <p:cNvSpPr>
-            <a:spLocks noGrp="1"/>
-          </p:cNvSpPr>
-          <p:nvPr>
-            <p:ph type="title"/>
-          </p:nvPr>
+          <p:cNvPr id="8" name="Rectangle 7"/>
+          <p:cNvSpPr/>
+          <p:nvPr/>
         </p:nvSpPr>
         <p:spPr>
           <a:xfrm>
-            <a:off x="838200" y="365125"/>
-            <a:ext cx="10515600" cy="1325563"/>
+            <a:off x="0" y="2019476"/>
+            <a:ext cx="12192000" cy="4105941"/>
           </a:xfrm>
           <a:prstGeom prst="rect">
             <a:avLst/>
           </a:prstGeom>
-        </p:spPr>
-        <p:txBody>
-          <a:bodyPr vert="horz" lIns="91440" tIns="45720" rIns="91440" bIns="45720" rtlCol="0" anchor="ctr">
-            <a:normAutofit/>
-          </a:bodyPr>
-          <a:lstStyle/>
-          <a:p>
-            <a:r>
-              <a:rPr lang="en-US"/>
-              <a:t>Click to edit Master title style</a:t>
-            </a:r>
-          </a:p>
-        </p:txBody>
-      </p:sp>
-      <p:sp>
-        <p:nvSpPr>
-          <p:cNvPr id="3" name="Text Placeholder 2">
+          <a:gradFill flip="none" rotWithShape="1">
+            <a:gsLst>
+              <a:gs pos="0">
+                <a:schemeClr val="bg2">
+                  <a:alpha val="0"/>
+                </a:schemeClr>
+              </a:gs>
+              <a:gs pos="100000">
+                <a:schemeClr val="bg2"/>
+              </a:gs>
+            </a:gsLst>
+            <a:lin ang="5400000" scaled="0"/>
+            <a:tileRect/>
+          </a:gradFill>
+          <a:ln>
+            <a:noFill/>
+          </a:ln>
+        </p:spPr>
+        <p:style>
+          <a:lnRef idx="2">
+            <a:schemeClr val="accent1">
+              <a:shade val="50000"/>
+            </a:schemeClr>
+          </a:lnRef>
+          <a:fillRef idx="1">
+            <a:schemeClr val="accent1"/>
+          </a:fillRef>
+          <a:effectRef idx="0">
+            <a:schemeClr val="accent1"/>
+          </a:effectRef>
+          <a:fontRef idx="minor">
+            <a:schemeClr val="lt1"/>
+          </a:fontRef>
+        </p:style>
+      </p:sp>
+      <p:pic>
+        <p:nvPicPr>
+          <p:cNvPr id="7" name="Picture 6"/>
+          <p:cNvPicPr>
+            <a:picLocks noChangeAspect="1"/>
+          </p:cNvPicPr>
+          <p:nvPr/>
+        </p:nvPicPr>
+        <p:blipFill rotWithShape="1">
+          <a:blip r:embed="rId13">
             <a:extLst>
-              <a:ext uri="{FF2B5EF4-FFF2-40B4-BE49-F238E27FC236}">
-                <a16:creationId xmlns:a16="http://schemas.microsoft.com/office/drawing/2014/main" id="{1E2FB944-1B6B-7747-B994-7E7E9B9E80F1}"/>
+              <a:ext uri="{28A0092B-C50C-407E-A947-70E740481C1C}">
+                <a14:useLocalDpi xmlns:a14="http://schemas.microsoft.com/office/drawing/2010/main" val="0"/>
               </a:ext>
             </a:extLst>
-          </p:cNvPr>
-          <p:cNvSpPr>
-            <a:spLocks noGrp="1"/>
-          </p:cNvSpPr>
-          <p:nvPr>
-            <p:ph type="body" idx="1"/>
-          </p:nvPr>
-        </p:nvSpPr>
-        <p:spPr>
-          <a:xfrm>
-            <a:off x="838200" y="1825625"/>
-            <a:ext cx="10515600" cy="4351338"/>
+          </a:blip>
+          <a:srcRect t="1538" b="-1538"/>
+          <a:stretch/>
+        </p:blipFill>
+        <p:spPr bwMode="black">
+          <a:xfrm>
+            <a:off x="0" y="6126480"/>
+            <a:ext cx="12192000" cy="742950"/>
           </a:xfrm>
           <a:prstGeom prst="rect">
             <a:avLst/>
           </a:prstGeom>
         </p:spPr>
+      </p:pic>
+      <p:sp>
+        <p:nvSpPr>
+          <p:cNvPr id="2" name="Title Placeholder 1"/>
+          <p:cNvSpPr>
+            <a:spLocks noGrp="1"/>
+          </p:cNvSpPr>
+          <p:nvPr>
+            <p:ph type="title"/>
+          </p:nvPr>
+        </p:nvSpPr>
+        <p:spPr>
+          <a:xfrm>
+            <a:off x="1451579" y="804519"/>
+            <a:ext cx="9603275" cy="1049235"/>
+          </a:xfrm>
+          <a:prstGeom prst="rect">
+            <a:avLst/>
+          </a:prstGeom>
+        </p:spPr>
+        <p:txBody>
+          <a:bodyPr vert="horz" lIns="91440" tIns="45720" rIns="91440" bIns="45720" rtlCol="0" anchor="t">
+            <a:normAutofit/>
+          </a:bodyPr>
+          <a:lstStyle/>
+          <a:p>
+            <a:r>
+              <a:rPr lang="en-US"/>
+              <a:t>Click to edit Master title style</a:t>
+            </a:r>
+            <a:endParaRPr lang="en-US" dirty="0"/>
+          </a:p>
+        </p:txBody>
+      </p:sp>
+      <p:sp>
+        <p:nvSpPr>
+          <p:cNvPr id="3" name="Text Placeholder 2"/>
+          <p:cNvSpPr>
+            <a:spLocks noGrp="1"/>
+          </p:cNvSpPr>
+          <p:nvPr>
+            <p:ph type="body" idx="1"/>
+          </p:nvPr>
+        </p:nvSpPr>
+        <p:spPr>
+          <a:xfrm>
+            <a:off x="1451579" y="2015732"/>
+            <a:ext cx="9603275" cy="3450613"/>
+          </a:xfrm>
+          <a:prstGeom prst="rect">
+            <a:avLst/>
+          </a:prstGeom>
+        </p:spPr>
         <p:txBody>
           <a:bodyPr vert="horz" lIns="91440" tIns="45720" rIns="91440" bIns="45720" rtlCol="0">
             <a:normAutofit/>
@@ -3397,18 +3632,13 @@
               <a:rPr lang="en-US"/>
               <a:t>Fifth level</a:t>
             </a:r>
-          </a:p>
-        </p:txBody>
-      </p:sp>
-      <p:sp>
-        <p:nvSpPr>
-          <p:cNvPr id="4" name="Date Placeholder 3">
-            <a:extLst>
-              <a:ext uri="{FF2B5EF4-FFF2-40B4-BE49-F238E27FC236}">
-                <a16:creationId xmlns:a16="http://schemas.microsoft.com/office/drawing/2014/main" id="{7C0685C2-3A09-C140-9B38-59865A7D73EF}"/>
-              </a:ext>
-            </a:extLst>
-          </p:cNvPr>
+            <a:endParaRPr lang="en-US" dirty="0"/>
+          </a:p>
+        </p:txBody>
+      </p:sp>
+      <p:sp>
+        <p:nvSpPr>
+          <p:cNvPr id="4" name="Date Placeholder 3"/>
           <p:cNvSpPr>
             <a:spLocks noGrp="1"/>
           </p:cNvSpPr>
@@ -3418,8 +3648,8 @@
         </p:nvSpPr>
         <p:spPr>
           <a:xfrm>
-            <a:off x="838200" y="6356350"/>
-            <a:ext cx="2743200" cy="365125"/>
+            <a:off x="7554138" y="330370"/>
+            <a:ext cx="3500715" cy="309201"/>
           </a:xfrm>
           <a:prstGeom prst="rect">
             <a:avLst/>
@@ -3428,8 +3658,8 @@
         <p:txBody>
           <a:bodyPr vert="horz" lIns="91440" tIns="45720" rIns="91440" bIns="45720" rtlCol="0" anchor="ctr"/>
           <a:lstStyle>
-            <a:lvl1pPr algn="l">
-              <a:defRPr sz="1200">
+            <a:lvl1pPr algn="r">
+              <a:defRPr sz="1000">
                 <a:solidFill>
                   <a:schemeClr val="tx1">
                     <a:tint val="75000"/>
@@ -3441,7 +3671,7 @@
           <a:p>
             <a:fld id="{A7EDA9A7-C2A3-014D-A1A7-33CDA929B4A4}" type="datetimeFigureOut">
               <a:rPr lang="en-US" smtClean="0"/>
-              <a:t>10/16/21</a:t>
+              <a:t>10/17/21</a:t>
             </a:fld>
             <a:endParaRPr lang="en-US"/>
           </a:p>
@@ -3449,13 +3679,7 @@
       </p:sp>
       <p:sp>
         <p:nvSpPr>
-          <p:cNvPr id="5" name="Footer Placeholder 4">
-            <a:extLst>
-              <a:ext uri="{FF2B5EF4-FFF2-40B4-BE49-F238E27FC236}">
-                <a16:creationId xmlns:a16="http://schemas.microsoft.com/office/drawing/2014/main" id="{AB691739-5E41-7A4D-AC23-F7A19D7C6144}"/>
-              </a:ext>
-            </a:extLst>
-          </p:cNvPr>
+          <p:cNvPr id="5" name="Footer Placeholder 4"/>
           <p:cNvSpPr>
             <a:spLocks noGrp="1"/>
           </p:cNvSpPr>
@@ -3465,8 +3689,8 @@
         </p:nvSpPr>
         <p:spPr>
           <a:xfrm>
-            <a:off x="4038600" y="6356350"/>
-            <a:ext cx="4114800" cy="365125"/>
+            <a:off x="1451579" y="329307"/>
+            <a:ext cx="5938836" cy="309201"/>
           </a:xfrm>
           <a:prstGeom prst="rect">
             <a:avLst/>
@@ -3475,8 +3699,8 @@
         <p:txBody>
           <a:bodyPr vert="horz" lIns="91440" tIns="45720" rIns="91440" bIns="45720" rtlCol="0" anchor="ctr"/>
           <a:lstStyle>
-            <a:lvl1pPr algn="ctr">
-              <a:defRPr sz="1200">
+            <a:lvl1pPr algn="l">
+              <a:defRPr sz="1000">
                 <a:solidFill>
                   <a:schemeClr val="tx1">
                     <a:tint val="75000"/>
@@ -3492,13 +3716,7 @@
       </p:sp>
       <p:sp>
         <p:nvSpPr>
-          <p:cNvPr id="6" name="Slide Number Placeholder 5">
-            <a:extLst>
-              <a:ext uri="{FF2B5EF4-FFF2-40B4-BE49-F238E27FC236}">
-                <a16:creationId xmlns:a16="http://schemas.microsoft.com/office/drawing/2014/main" id="{E5FF33FD-A0DC-0D43-BCA8-0DA6EAF9BE1A}"/>
-              </a:ext>
-            </a:extLst>
-          </p:cNvPr>
+          <p:cNvPr id="6" name="Slide Number Placeholder 5"/>
           <p:cNvSpPr>
             <a:spLocks noGrp="1"/>
           </p:cNvSpPr>
@@ -3508,22 +3726,20 @@
         </p:nvSpPr>
         <p:spPr>
           <a:xfrm>
-            <a:off x="8610600" y="6356350"/>
-            <a:ext cx="2743200" cy="365125"/>
+            <a:off x="480060" y="798973"/>
+            <a:ext cx="811019" cy="503578"/>
           </a:xfrm>
           <a:prstGeom prst="rect">
             <a:avLst/>
           </a:prstGeom>
         </p:spPr>
         <p:txBody>
-          <a:bodyPr vert="horz" lIns="91440" tIns="45720" rIns="91440" bIns="45720" rtlCol="0" anchor="ctr"/>
+          <a:bodyPr vert="horz" lIns="91440" tIns="45720" rIns="91440" bIns="45720" rtlCol="0" anchor="t"/>
           <a:lstStyle>
             <a:lvl1pPr algn="r">
-              <a:defRPr sz="1200">
+              <a:defRPr sz="2800">
                 <a:solidFill>
-                  <a:schemeClr val="tx1">
-                    <a:tint val="75000"/>
-                  </a:schemeClr>
+                  <a:schemeClr val="accent1"/>
                 </a:solidFill>
               </a:defRPr>
             </a:lvl1pPr>
@@ -3537,26 +3753,63 @@
           </a:p>
         </p:txBody>
       </p:sp>
+      <p:cxnSp>
+        <p:nvCxnSpPr>
+          <p:cNvPr id="10" name="Straight Connector 9"/>
+          <p:cNvCxnSpPr/>
+          <p:nvPr/>
+        </p:nvCxnSpPr>
+        <p:spPr>
+          <a:xfrm>
+            <a:off x="0" y="6128413"/>
+            <a:ext cx="12192000" cy="0"/>
+          </a:xfrm>
+          <a:prstGeom prst="line">
+            <a:avLst/>
+          </a:prstGeom>
+          <a:ln w="12700">
+            <a:solidFill>
+              <a:srgbClr val="000001">
+                <a:alpha val="20000"/>
+              </a:srgbClr>
+            </a:solidFill>
+          </a:ln>
+        </p:spPr>
+        <p:style>
+          <a:lnRef idx="1">
+            <a:schemeClr val="accent1"/>
+          </a:lnRef>
+          <a:fillRef idx="0">
+            <a:schemeClr val="accent1"/>
+          </a:fillRef>
+          <a:effectRef idx="0">
+            <a:schemeClr val="accent1"/>
+          </a:effectRef>
+          <a:fontRef idx="minor">
+            <a:schemeClr val="tx1"/>
+          </a:fontRef>
+        </p:style>
+      </p:cxnSp>
     </p:spTree>
     <p:extLst>
       <p:ext uri="{BB962C8B-B14F-4D97-AF65-F5344CB8AC3E}">
-        <p14:creationId xmlns:p14="http://schemas.microsoft.com/office/powerpoint/2010/main" val="701532571"/>
+        <p14:creationId xmlns:p14="http://schemas.microsoft.com/office/powerpoint/2010/main" val="2394970057"/>
       </p:ext>
     </p:extLst>
   </p:cSld>
   <p:clrMap bg1="lt1" tx1="dk1" bg2="lt2" tx2="dk2" accent1="accent1" accent2="accent2" accent3="accent3" accent4="accent4" accent5="accent5" accent6="accent6" hlink="hlink" folHlink="folHlink"/>
   <p:sldLayoutIdLst>
-    <p:sldLayoutId id="2147483649" r:id="rId1"/>
-    <p:sldLayoutId id="2147483650" r:id="rId2"/>
-    <p:sldLayoutId id="2147483651" r:id="rId3"/>
-    <p:sldLayoutId id="2147483652" r:id="rId4"/>
-    <p:sldLayoutId id="2147483653" r:id="rId5"/>
-    <p:sldLayoutId id="2147483654" r:id="rId6"/>
-    <p:sldLayoutId id="2147483655" r:id="rId7"/>
-    <p:sldLayoutId id="2147483656" r:id="rId8"/>
-    <p:sldLayoutId id="2147483657" r:id="rId9"/>
-    <p:sldLayoutId id="2147483658" r:id="rId10"/>
-    <p:sldLayoutId id="2147483659" r:id="rId11"/>
+    <p:sldLayoutId id="2147483661" r:id="rId1"/>
+    <p:sldLayoutId id="2147483662" r:id="rId2"/>
+    <p:sldLayoutId id="2147483663" r:id="rId3"/>
+    <p:sldLayoutId id="2147483664" r:id="rId4"/>
+    <p:sldLayoutId id="2147483665" r:id="rId5"/>
+    <p:sldLayoutId id="2147483666" r:id="rId6"/>
+    <p:sldLayoutId id="2147483667" r:id="rId7"/>
+    <p:sldLayoutId id="2147483668" r:id="rId8"/>
+    <p:sldLayoutId id="2147483669" r:id="rId9"/>
+    <p:sldLayoutId id="2147483670" r:id="rId10"/>
+    <p:sldLayoutId id="2147483671" r:id="rId11"/>
   </p:sldLayoutIdLst>
   <p:txStyles>
     <p:titleStyle>
@@ -3568,10 +3821,11 @@
           <a:spcPct val="0"/>
         </a:spcBef>
         <a:buNone/>
-        <a:defRPr sz="4400" kern="1200">
+        <a:defRPr sz="3200" b="0" i="0" kern="1200" cap="all">
           <a:solidFill>
             <a:schemeClr val="tx1"/>
           </a:solidFill>
+          <a:effectLst/>
           <a:latin typeface="+mj-lt"/>
           <a:ea typeface="+mj-ea"/>
           <a:cs typeface="+mj-cs"/>
@@ -3581,17 +3835,22 @@
     <p:bodyStyle>
       <a:lvl1pPr marL="228600" indent="-228600" algn="l" defTabSz="914400" rtl="0" eaLnBrk="1" latinLnBrk="0" hangingPunct="1">
         <a:lnSpc>
-          <a:spcPct val="90000"/>
+          <a:spcPct val="120000"/>
         </a:lnSpc>
         <a:spcBef>
           <a:spcPts val="1000"/>
         </a:spcBef>
+        <a:buClr>
+          <a:schemeClr val="accent1"/>
+        </a:buClr>
+        <a:buSzPct val="100000"/>
         <a:buFont typeface="Arial" panose="020B0604020202020204" pitchFamily="34" charset="0"/>
         <a:buChar char="•"/>
-        <a:defRPr sz="2800" kern="1200">
+        <a:defRPr sz="2000" kern="1200">
           <a:solidFill>
             <a:schemeClr val="tx1"/>
           </a:solidFill>
+          <a:effectLst/>
           <a:latin typeface="+mn-lt"/>
           <a:ea typeface="+mn-ea"/>
           <a:cs typeface="+mn-cs"/>
@@ -3599,17 +3858,22 @@
       </a:lvl1pPr>
       <a:lvl2pPr marL="685800" indent="-228600" algn="l" defTabSz="914400" rtl="0" eaLnBrk="1" latinLnBrk="0" hangingPunct="1">
         <a:lnSpc>
-          <a:spcPct val="90000"/>
+          <a:spcPct val="120000"/>
         </a:lnSpc>
         <a:spcBef>
           <a:spcPts val="500"/>
         </a:spcBef>
+        <a:buClr>
+          <a:schemeClr val="accent1"/>
+        </a:buClr>
+        <a:buSzPct val="100000"/>
         <a:buFont typeface="Arial" panose="020B0604020202020204" pitchFamily="34" charset="0"/>
         <a:buChar char="•"/>
-        <a:defRPr sz="2400" kern="1200">
+        <a:defRPr sz="1800" kern="1200" cap="none" baseline="0">
           <a:solidFill>
             <a:schemeClr val="tx1"/>
           </a:solidFill>
+          <a:effectLst/>
           <a:latin typeface="+mn-lt"/>
           <a:ea typeface="+mn-ea"/>
           <a:cs typeface="+mn-cs"/>
@@ -3617,17 +3881,22 @@
       </a:lvl2pPr>
       <a:lvl3pPr marL="1143000" indent="-228600" algn="l" defTabSz="914400" rtl="0" eaLnBrk="1" latinLnBrk="0" hangingPunct="1">
         <a:lnSpc>
-          <a:spcPct val="90000"/>
+          <a:spcPct val="120000"/>
         </a:lnSpc>
         <a:spcBef>
           <a:spcPts val="500"/>
         </a:spcBef>
+        <a:buClr>
+          <a:schemeClr val="accent1"/>
+        </a:buClr>
+        <a:buSzPct val="100000"/>
         <a:buFont typeface="Arial" panose="020B0604020202020204" pitchFamily="34" charset="0"/>
         <a:buChar char="•"/>
-        <a:defRPr sz="2000" kern="1200">
+        <a:defRPr sz="1600" kern="1200">
           <a:solidFill>
             <a:schemeClr val="tx1"/>
           </a:solidFill>
+          <a:effectLst/>
           <a:latin typeface="+mn-lt"/>
           <a:ea typeface="+mn-ea"/>
           <a:cs typeface="+mn-cs"/>
@@ -3635,17 +3904,22 @@
       </a:lvl3pPr>
       <a:lvl4pPr marL="1600200" indent="-228600" algn="l" defTabSz="914400" rtl="0" eaLnBrk="1" latinLnBrk="0" hangingPunct="1">
         <a:lnSpc>
-          <a:spcPct val="90000"/>
+          <a:spcPct val="120000"/>
         </a:lnSpc>
         <a:spcBef>
           <a:spcPts val="500"/>
         </a:spcBef>
+        <a:buClr>
+          <a:schemeClr val="accent1"/>
+        </a:buClr>
+        <a:buSzPct val="100000"/>
         <a:buFont typeface="Arial" panose="020B0604020202020204" pitchFamily="34" charset="0"/>
         <a:buChar char="•"/>
-        <a:defRPr sz="1800" kern="1200">
+        <a:defRPr sz="1400" kern="1200" cap="none" baseline="0">
           <a:solidFill>
             <a:schemeClr val="tx1"/>
           </a:solidFill>
+          <a:effectLst/>
           <a:latin typeface="+mn-lt"/>
           <a:ea typeface="+mn-ea"/>
           <a:cs typeface="+mn-cs"/>
@@ -3653,17 +3927,22 @@
       </a:lvl4pPr>
       <a:lvl5pPr marL="2057400" indent="-228600" algn="l" defTabSz="914400" rtl="0" eaLnBrk="1" latinLnBrk="0" hangingPunct="1">
         <a:lnSpc>
-          <a:spcPct val="90000"/>
+          <a:spcPct val="120000"/>
         </a:lnSpc>
         <a:spcBef>
           <a:spcPts val="500"/>
         </a:spcBef>
+        <a:buClr>
+          <a:schemeClr val="accent1"/>
+        </a:buClr>
+        <a:buSzPct val="100000"/>
         <a:buFont typeface="Arial" panose="020B0604020202020204" pitchFamily="34" charset="0"/>
         <a:buChar char="•"/>
-        <a:defRPr sz="1800" kern="1200">
+        <a:defRPr sz="1200" kern="1200">
           <a:solidFill>
             <a:schemeClr val="tx1"/>
           </a:solidFill>
+          <a:effectLst/>
           <a:latin typeface="+mn-lt"/>
           <a:ea typeface="+mn-ea"/>
           <a:cs typeface="+mn-cs"/>
@@ -3671,17 +3950,22 @@
       </a:lvl5pPr>
       <a:lvl6pPr marL="2514600" indent="-228600" algn="l" defTabSz="914400" rtl="0" eaLnBrk="1" latinLnBrk="0" hangingPunct="1">
         <a:lnSpc>
-          <a:spcPct val="90000"/>
+          <a:spcPct val="120000"/>
         </a:lnSpc>
         <a:spcBef>
           <a:spcPts val="500"/>
         </a:spcBef>
+        <a:buClr>
+          <a:schemeClr val="accent1"/>
+        </a:buClr>
+        <a:buSzPct val="100000"/>
         <a:buFont typeface="Arial" panose="020B0604020202020204" pitchFamily="34" charset="0"/>
         <a:buChar char="•"/>
-        <a:defRPr sz="1800" kern="1200">
+        <a:defRPr sz="1200" kern="1200">
           <a:solidFill>
             <a:schemeClr val="tx1"/>
           </a:solidFill>
+          <a:effectLst/>
           <a:latin typeface="+mn-lt"/>
           <a:ea typeface="+mn-ea"/>
           <a:cs typeface="+mn-cs"/>
@@ -3689,17 +3973,22 @@
       </a:lvl6pPr>
       <a:lvl7pPr marL="2971800" indent="-228600" algn="l" defTabSz="914400" rtl="0" eaLnBrk="1" latinLnBrk="0" hangingPunct="1">
         <a:lnSpc>
-          <a:spcPct val="90000"/>
+          <a:spcPct val="120000"/>
         </a:lnSpc>
         <a:spcBef>
           <a:spcPts val="500"/>
         </a:spcBef>
+        <a:buClr>
+          <a:schemeClr val="accent1"/>
+        </a:buClr>
+        <a:buSzPct val="100000"/>
         <a:buFont typeface="Arial" panose="020B0604020202020204" pitchFamily="34" charset="0"/>
         <a:buChar char="•"/>
-        <a:defRPr sz="1800" kern="1200">
+        <a:defRPr sz="1200" kern="1200">
           <a:solidFill>
             <a:schemeClr val="tx1"/>
           </a:solidFill>
+          <a:effectLst/>
           <a:latin typeface="+mn-lt"/>
           <a:ea typeface="+mn-ea"/>
           <a:cs typeface="+mn-cs"/>
@@ -3707,17 +3996,22 @@
       </a:lvl7pPr>
       <a:lvl8pPr marL="3429000" indent="-228600" algn="l" defTabSz="914400" rtl="0" eaLnBrk="1" latinLnBrk="0" hangingPunct="1">
         <a:lnSpc>
-          <a:spcPct val="90000"/>
+          <a:spcPct val="120000"/>
         </a:lnSpc>
         <a:spcBef>
           <a:spcPts val="500"/>
         </a:spcBef>
+        <a:buClr>
+          <a:schemeClr val="accent1"/>
+        </a:buClr>
+        <a:buSzPct val="100000"/>
         <a:buFont typeface="Arial" panose="020B0604020202020204" pitchFamily="34" charset="0"/>
         <a:buChar char="•"/>
-        <a:defRPr sz="1800" kern="1200">
+        <a:defRPr sz="1200" kern="1200" baseline="0">
           <a:solidFill>
             <a:schemeClr val="tx1"/>
           </a:solidFill>
+          <a:effectLst/>
           <a:latin typeface="+mn-lt"/>
           <a:ea typeface="+mn-ea"/>
           <a:cs typeface="+mn-cs"/>
@@ -3725,17 +4019,22 @@
       </a:lvl8pPr>
       <a:lvl9pPr marL="3886200" indent="-228600" algn="l" defTabSz="914400" rtl="0" eaLnBrk="1" latinLnBrk="0" hangingPunct="1">
         <a:lnSpc>
-          <a:spcPct val="90000"/>
+          <a:spcPct val="120000"/>
         </a:lnSpc>
         <a:spcBef>
           <a:spcPts val="500"/>
         </a:spcBef>
+        <a:buClr>
+          <a:schemeClr val="accent1"/>
+        </a:buClr>
+        <a:buSzPct val="100000"/>
         <a:buFont typeface="Arial" panose="020B0604020202020204" pitchFamily="34" charset="0"/>
         <a:buChar char="•"/>
-        <a:defRPr sz="1800" kern="1200">
+        <a:defRPr sz="1200" kern="1200" baseline="0">
           <a:solidFill>
             <a:schemeClr val="tx1"/>
           </a:solidFill>
+          <a:effectLst/>
           <a:latin typeface="+mn-lt"/>
           <a:ea typeface="+mn-ea"/>
           <a:cs typeface="+mn-cs"/>
@@ -3844,6 +4143,30 @@
 <file path=ppt/slides/slide1.xml><?xml version="1.0" encoding="utf-8"?>
 <p:sld xmlns:a="http://schemas.openxmlformats.org/drawingml/2006/main" xmlns:r="http://schemas.openxmlformats.org/officeDocument/2006/relationships" xmlns:p="http://schemas.openxmlformats.org/presentationml/2006/main">
   <p:cSld>
+    <p:bg>
+      <p:bgPr>
+        <a:gradFill rotWithShape="1">
+          <a:gsLst>
+            <a:gs pos="0">
+              <a:schemeClr val="bg2">
+                <a:tint val="94000"/>
+                <a:satMod val="80000"/>
+                <a:lumMod val="106000"/>
+              </a:schemeClr>
+            </a:gs>
+            <a:gs pos="100000">
+              <a:schemeClr val="bg2">
+                <a:shade val="80000"/>
+              </a:schemeClr>
+            </a:gs>
+          </a:gsLst>
+          <a:path path="circle">
+            <a:fillToRect l="43000" r="43000" b="100000"/>
+          </a:path>
+        </a:gradFill>
+        <a:effectLst/>
+      </p:bgPr>
+    </p:bg>
     <p:spTree>
       <p:nvGrpSpPr>
         <p:cNvPr id="1" name=""/>
@@ -3858,6 +4181,98 @@
           <a:chExt cx="0" cy="0"/>
         </a:xfrm>
       </p:grpSpPr>
+      <p:pic>
+        <p:nvPicPr>
+          <p:cNvPr id="5" name="Picture 4" descr="Two referees near the goal signalling touchdown to large stadium">
+            <a:extLst>
+              <a:ext uri="{FF2B5EF4-FFF2-40B4-BE49-F238E27FC236}">
+                <a16:creationId xmlns:a16="http://schemas.microsoft.com/office/drawing/2014/main" id="{D9379763-BD78-4D65-82A4-89D54EDEA222}"/>
+              </a:ext>
+            </a:extLst>
+          </p:cNvPr>
+          <p:cNvPicPr>
+            <a:picLocks noChangeAspect="1"/>
+          </p:cNvPicPr>
+          <p:nvPr/>
+        </p:nvPicPr>
+        <p:blipFill rotWithShape="1">
+          <a:blip r:embed="rId2"/>
+          <a:srcRect t="13343" r="-1" b="2068"/>
+          <a:stretch/>
+        </p:blipFill>
+        <p:spPr>
+          <a:xfrm>
+            <a:off x="2" y="10"/>
+            <a:ext cx="12191695" cy="6857990"/>
+          </a:xfrm>
+          <a:prstGeom prst="rect">
+            <a:avLst/>
+          </a:prstGeom>
+        </p:spPr>
+      </p:pic>
+      <p:sp>
+        <p:nvSpPr>
+          <p:cNvPr id="9" name="Rectangle 8">
+            <a:extLst>
+              <a:ext uri="{FF2B5EF4-FFF2-40B4-BE49-F238E27FC236}">
+                <a16:creationId xmlns:a16="http://schemas.microsoft.com/office/drawing/2014/main" id="{6A0FFA78-985C-4F50-B21A-77045C7DF657}"/>
+              </a:ext>
+              <a:ext uri="{C183D7F6-B498-43B3-948B-1728B52AA6E4}">
+                <adec:decorative xmlns:adec="http://schemas.microsoft.com/office/drawing/2017/decorative" val="1"/>
+              </a:ext>
+            </a:extLst>
+          </p:cNvPr>
+          <p:cNvSpPr>
+            <a:spLocks noGrp="1" noRot="1" noChangeAspect="1" noMove="1" noResize="1" noEditPoints="1" noAdjustHandles="1" noChangeArrowheads="1" noChangeShapeType="1" noTextEdit="1"/>
+          </p:cNvSpPr>
+          <p:nvPr>
+            <p:extLst>
+              <p:ext uri="{386F3935-93C4-4BCD-93E2-E3B085C9AB24}">
+                <p16:designElem xmlns:p16="http://schemas.microsoft.com/office/powerpoint/2015/main" val="1"/>
+              </p:ext>
+            </p:extLst>
+          </p:nvPr>
+        </p:nvSpPr>
+        <p:spPr>
+          <a:xfrm>
+            <a:off x="3896786" y="3064931"/>
+            <a:ext cx="8295215" cy="2488568"/>
+          </a:xfrm>
+          <a:prstGeom prst="rect">
+            <a:avLst/>
+          </a:prstGeom>
+          <a:solidFill>
+            <a:srgbClr val="000001">
+              <a:alpha val="75000"/>
+            </a:srgbClr>
+          </a:solidFill>
+          <a:ln>
+            <a:noFill/>
+          </a:ln>
+        </p:spPr>
+        <p:style>
+          <a:lnRef idx="1">
+            <a:schemeClr val="accent1"/>
+          </a:lnRef>
+          <a:fillRef idx="3">
+            <a:schemeClr val="accent1"/>
+          </a:fillRef>
+          <a:effectRef idx="2">
+            <a:schemeClr val="accent1"/>
+          </a:effectRef>
+          <a:fontRef idx="minor">
+            <a:schemeClr val="lt1"/>
+          </a:fontRef>
+        </p:style>
+        <p:txBody>
+          <a:bodyPr rtlCol="0" anchor="ctr"/>
+          <a:lstStyle/>
+          <a:p>
+            <a:pPr algn="ctr"/>
+            <a:endParaRPr lang="en-US"/>
+          </a:p>
+        </p:txBody>
+      </p:sp>
       <p:sp>
         <p:nvSpPr>
           <p:cNvPr id="2" name="Title 1">
@@ -3874,13 +4289,24 @@
             <p:ph type="ctrTitle"/>
           </p:nvPr>
         </p:nvSpPr>
-        <p:spPr/>
-        <p:txBody>
-          <a:bodyPr/>
-          <a:lstStyle/>
-          <a:p>
-            <a:r>
-              <a:rPr lang="en-US" dirty="0"/>
+        <p:spPr>
+          <a:xfrm>
+            <a:off x="4065511" y="3236470"/>
+            <a:ext cx="6832500" cy="1252601"/>
+          </a:xfrm>
+        </p:spPr>
+        <p:txBody>
+          <a:bodyPr>
+            <a:normAutofit/>
+          </a:bodyPr>
+          <a:lstStyle/>
+          <a:p>
+            <a:r>
+              <a:rPr lang="en-US" sz="4100">
+                <a:solidFill>
+                  <a:srgbClr val="FFFFFE"/>
+                </a:solidFill>
+              </a:rPr>
               <a:t>Weekly Fantasy Football Contest Data</a:t>
             </a:r>
           </a:p>
@@ -3902,18 +4328,81 @@
             <p:ph type="subTitle" idx="1"/>
           </p:nvPr>
         </p:nvSpPr>
-        <p:spPr/>
-        <p:txBody>
-          <a:bodyPr/>
-          <a:lstStyle/>
-          <a:p>
-            <a:r>
-              <a:rPr lang="en-US" dirty="0"/>
+        <p:spPr>
+          <a:xfrm>
+            <a:off x="4065511" y="4669144"/>
+            <a:ext cx="6832499" cy="716529"/>
+          </a:xfrm>
+        </p:spPr>
+        <p:txBody>
+          <a:bodyPr>
+            <a:normAutofit/>
+          </a:bodyPr>
+          <a:lstStyle/>
+          <a:p>
+            <a:r>
+              <a:rPr lang="en-US" sz="1600">
+                <a:solidFill>
+                  <a:srgbClr val="FFFFFE"/>
+                </a:solidFill>
+              </a:rPr>
               <a:t>Hugh Goode</a:t>
             </a:r>
           </a:p>
         </p:txBody>
       </p:sp>
+      <p:cxnSp>
+        <p:nvCxnSpPr>
+          <p:cNvPr id="11" name="Straight Connector 10">
+            <a:extLst>
+              <a:ext uri="{FF2B5EF4-FFF2-40B4-BE49-F238E27FC236}">
+                <a16:creationId xmlns:a16="http://schemas.microsoft.com/office/drawing/2014/main" id="{65409EC7-69B1-45CC-8FB7-1964C1AB6720}"/>
+              </a:ext>
+              <a:ext uri="{C183D7F6-B498-43B3-948B-1728B52AA6E4}">
+                <adec:decorative xmlns:adec="http://schemas.microsoft.com/office/drawing/2017/decorative" val="1"/>
+              </a:ext>
+            </a:extLst>
+          </p:cNvPr>
+          <p:cNvCxnSpPr>
+            <a:cxnSpLocks noGrp="1" noRot="1" noChangeAspect="1" noMove="1" noResize="1" noEditPoints="1" noAdjustHandles="1" noChangeArrowheads="1" noChangeShapeType="1"/>
+          </p:cNvCxnSpPr>
+          <p:nvPr>
+            <p:extLst>
+              <p:ext uri="{386F3935-93C4-4BCD-93E2-E3B085C9AB24}">
+                <p16:designElem xmlns:p16="http://schemas.microsoft.com/office/powerpoint/2015/main" val="1"/>
+              </p:ext>
+            </p:extLst>
+          </p:nvPr>
+        </p:nvCxnSpPr>
+        <p:spPr>
+          <a:xfrm>
+            <a:off x="4065509" y="4666480"/>
+            <a:ext cx="6832499" cy="0"/>
+          </a:xfrm>
+          <a:prstGeom prst="line">
+            <a:avLst/>
+          </a:prstGeom>
+          <a:ln w="31750">
+            <a:solidFill>
+              <a:srgbClr val="C8A56F"/>
+            </a:solidFill>
+          </a:ln>
+        </p:spPr>
+        <p:style>
+          <a:lnRef idx="3">
+            <a:schemeClr val="accent1"/>
+          </a:lnRef>
+          <a:fillRef idx="0">
+            <a:schemeClr val="accent1"/>
+          </a:fillRef>
+          <a:effectRef idx="2">
+            <a:schemeClr val="accent1"/>
+          </a:effectRef>
+          <a:fontRef idx="minor">
+            <a:schemeClr val="tx1"/>
+          </a:fontRef>
+        </p:style>
+      </p:cxnSp>
     </p:spTree>
     <p:extLst>
       <p:ext uri="{BB962C8B-B14F-4D97-AF65-F5344CB8AC3E}">
@@ -3924,6 +4413,145 @@
   <p:clrMapOvr>
     <a:masterClrMapping/>
   </p:clrMapOvr>
+  <p:timing>
+    <p:tnLst>
+      <p:par>
+        <p:cTn id="1" dur="indefinite" restart="never" nodeType="tmRoot">
+          <p:childTnLst>
+            <p:seq concurrent="1" nextAc="seek">
+              <p:cTn id="2" dur="indefinite" nodeType="mainSeq">
+                <p:childTnLst>
+                  <p:par>
+                    <p:cTn id="3" fill="hold">
+                      <p:stCondLst>
+                        <p:cond delay="indefinite"/>
+                        <p:cond evt="onBegin" delay="0">
+                          <p:tn val="2"/>
+                        </p:cond>
+                      </p:stCondLst>
+                      <p:childTnLst>
+                        <p:par>
+                          <p:cTn id="4" fill="hold">
+                            <p:stCondLst>
+                              <p:cond delay="0"/>
+                            </p:stCondLst>
+                            <p:childTnLst>
+                              <p:par>
+                                <p:cTn id="5" presetID="10" presetClass="entr" presetSubtype="0" fill="hold" grpId="0" nodeType="withEffect">
+                                  <p:stCondLst>
+                                    <p:cond delay="1500"/>
+                                  </p:stCondLst>
+                                  <p:iterate>
+                                    <p:tmPct val="10000"/>
+                                  </p:iterate>
+                                  <p:childTnLst>
+                                    <p:set>
+                                      <p:cBhvr>
+                                        <p:cTn id="6" dur="1" fill="hold">
+                                          <p:stCondLst>
+                                            <p:cond delay="0"/>
+                                          </p:stCondLst>
+                                        </p:cTn>
+                                        <p:tgtEl>
+                                          <p:spTgt spid="3">
+                                            <p:txEl>
+                                              <p:pRg st="0" end="0"/>
+                                            </p:txEl>
+                                          </p:spTgt>
+                                        </p:tgtEl>
+                                        <p:attrNameLst>
+                                          <p:attrName>style.visibility</p:attrName>
+                                        </p:attrNameLst>
+                                      </p:cBhvr>
+                                      <p:to>
+                                        <p:strVal val="visible"/>
+                                      </p:to>
+                                    </p:set>
+                                    <p:animEffect transition="in" filter="fade">
+                                      <p:cBhvr>
+                                        <p:cTn id="7" dur="700"/>
+                                        <p:tgtEl>
+                                          <p:spTgt spid="3">
+                                            <p:txEl>
+                                              <p:pRg st="0" end="0"/>
+                                            </p:txEl>
+                                          </p:spTgt>
+                                        </p:tgtEl>
+                                      </p:cBhvr>
+                                    </p:animEffect>
+                                  </p:childTnLst>
+                                </p:cTn>
+                              </p:par>
+                              <p:par>
+                                <p:cTn id="8" presetID="10" presetClass="entr" presetSubtype="0" fill="hold" grpId="0" nodeType="withEffect">
+                                  <p:stCondLst>
+                                    <p:cond delay="1000"/>
+                                  </p:stCondLst>
+                                  <p:iterate>
+                                    <p:tmPct val="10000"/>
+                                  </p:iterate>
+                                  <p:childTnLst>
+                                    <p:set>
+                                      <p:cBhvr>
+                                        <p:cTn id="9" dur="1" fill="hold">
+                                          <p:stCondLst>
+                                            <p:cond delay="0"/>
+                                          </p:stCondLst>
+                                        </p:cTn>
+                                        <p:tgtEl>
+                                          <p:spTgt spid="2"/>
+                                        </p:tgtEl>
+                                        <p:attrNameLst>
+                                          <p:attrName>style.visibility</p:attrName>
+                                        </p:attrNameLst>
+                                      </p:cBhvr>
+                                      <p:to>
+                                        <p:strVal val="visible"/>
+                                      </p:to>
+                                    </p:set>
+                                    <p:animEffect transition="in" filter="fade">
+                                      <p:cBhvr>
+                                        <p:cTn id="10" dur="700"/>
+                                        <p:tgtEl>
+                                          <p:spTgt spid="2"/>
+                                        </p:tgtEl>
+                                      </p:cBhvr>
+                                    </p:animEffect>
+                                  </p:childTnLst>
+                                </p:cTn>
+                              </p:par>
+                            </p:childTnLst>
+                          </p:cTn>
+                        </p:par>
+                      </p:childTnLst>
+                    </p:cTn>
+                  </p:par>
+                </p:childTnLst>
+              </p:cTn>
+              <p:prevCondLst>
+                <p:cond evt="onPrev" delay="0">
+                  <p:tgtEl>
+                    <p:sldTgt/>
+                  </p:tgtEl>
+                </p:cond>
+              </p:prevCondLst>
+              <p:nextCondLst>
+                <p:cond evt="onNext" delay="0">
+                  <p:tgtEl>
+                    <p:sldTgt/>
+                  </p:tgtEl>
+                </p:cond>
+              </p:nextCondLst>
+            </p:seq>
+          </p:childTnLst>
+        </p:cTn>
+      </p:par>
+    </p:tnLst>
+    <p:bldLst>
+      <p:bldP spid="2" grpId="0"/>
+      <p:bldP spid="3" grpId="0" build="p"/>
+    </p:bldLst>
+  </p:timing>
 </p:sld>
 </file>
 
@@ -4148,7 +4776,7 @@
         </p:blipFill>
         <p:spPr>
           <a:xfrm>
-            <a:off x="1687018" y="1796113"/>
+            <a:off x="1866900" y="2009473"/>
             <a:ext cx="8458200" cy="3835400"/>
           </a:xfrm>
           <a:prstGeom prst="rect">
@@ -4243,7 +4871,7 @@
           <a:p>
             <a:r>
               <a:rPr lang="en-US" dirty="0"/>
-              <a:t>Fill lineups with only my “highest valued” players at each position</a:t>
+              <a:t>Fill lineups with only my “highest value” players at each position</a:t>
             </a:r>
           </a:p>
           <a:p>
@@ -4313,12 +4941,14 @@
           </a:xfrm>
         </p:spPr>
         <p:txBody>
-          <a:bodyPr/>
+          <a:bodyPr>
+            <a:normAutofit/>
+          </a:bodyPr>
           <a:lstStyle/>
           <a:p>
             <a:pPr algn="ctr"/>
             <a:r>
-              <a:rPr lang="en-US" dirty="0"/>
+              <a:rPr lang="en-US" sz="6000" dirty="0"/>
               <a:t>Questions?</a:t>
             </a:r>
           </a:p>
@@ -4411,7 +5041,7 @@
           <a:p>
             <a:r>
               <a:rPr lang="en-US" dirty="0"/>
-              <a:t>Each player drafts a team of NFL players (Example: 1 QB, 2 RB, 3 WR, 1 TE, 1  Flex)</a:t>
+              <a:t>Each player drafts a team of NFL players (Example: 1 QB, 2 RB, 3 WR, 1 TE, 1 Flex)</a:t>
             </a:r>
           </a:p>
           <a:p>
@@ -4493,7 +5123,7 @@
         </p:blipFill>
         <p:spPr bwMode="auto">
           <a:xfrm>
-            <a:off x="1580830" y="665573"/>
+            <a:off x="1937089" y="333065"/>
             <a:ext cx="7795883" cy="5526854"/>
           </a:xfrm>
           <a:prstGeom prst="rect">
@@ -4588,7 +5218,7 @@
         <p:spPr/>
         <p:txBody>
           <a:bodyPr>
-            <a:normAutofit lnSpcReduction="10000"/>
+            <a:normAutofit fontScale="85000" lnSpcReduction="20000"/>
           </a:bodyPr>
           <a:lstStyle/>
           <a:p>
@@ -4757,31 +5387,7 @@
           <a:p>
             <a:r>
               <a:rPr lang="en-US" dirty="0"/>
-              <a:t>Source: ‘http://rotoguru1.com/</a:t>
-            </a:r>
-            <a:r>
-              <a:rPr lang="en-US" dirty="0" err="1"/>
-              <a:t>cgi</a:t>
-            </a:r>
-            <a:r>
-              <a:rPr lang="en-US" dirty="0"/>
-              <a:t>-bin/</a:t>
-            </a:r>
-            <a:r>
-              <a:rPr lang="en-US" dirty="0" err="1"/>
-              <a:t>fyday.pl?game</a:t>
-            </a:r>
-            <a:r>
-              <a:rPr lang="en-US" dirty="0"/>
-              <a:t>=</a:t>
-            </a:r>
-            <a:r>
-              <a:rPr lang="en-US" dirty="0" err="1"/>
-              <a:t>fd</a:t>
-            </a:r>
-            <a:r>
-              <a:rPr lang="en-US" dirty="0"/>
-              <a:t>’</a:t>
+              <a:t>Source:  http://rotoguru1.com</a:t>
             </a:r>
           </a:p>
           <a:p>
@@ -4826,7 +5432,7 @@
         </p:blipFill>
         <p:spPr>
           <a:xfrm>
-            <a:off x="508412" y="4279900"/>
+            <a:off x="800100" y="4021481"/>
             <a:ext cx="10591800" cy="2032000"/>
           </a:xfrm>
           <a:prstGeom prst="rect">
@@ -4850,6 +5456,30 @@
 <file path=ppt/slides/slide6.xml><?xml version="1.0" encoding="utf-8"?>
 <p:sld xmlns:a="http://schemas.openxmlformats.org/drawingml/2006/main" xmlns:r="http://schemas.openxmlformats.org/officeDocument/2006/relationships" xmlns:p="http://schemas.openxmlformats.org/presentationml/2006/main">
   <p:cSld>
+    <p:bg>
+      <p:bgPr>
+        <a:gradFill rotWithShape="1">
+          <a:gsLst>
+            <a:gs pos="0">
+              <a:schemeClr val="bg2">
+                <a:tint val="94000"/>
+                <a:satMod val="80000"/>
+                <a:lumMod val="106000"/>
+              </a:schemeClr>
+            </a:gs>
+            <a:gs pos="100000">
+              <a:schemeClr val="bg2">
+                <a:shade val="80000"/>
+              </a:schemeClr>
+            </a:gs>
+          </a:gsLst>
+          <a:path path="circle">
+            <a:fillToRect l="43000" r="43000" b="100000"/>
+          </a:path>
+        </a:gradFill>
+        <a:effectLst/>
+      </p:bgPr>
+    </p:bg>
     <p:spTree>
       <p:nvGrpSpPr>
         <p:cNvPr id="1" name=""/>
@@ -4866,6 +5496,352 @@
       </p:grpSpPr>
       <p:sp>
         <p:nvSpPr>
+          <p:cNvPr id="9" name="Rectangle 8">
+            <a:extLst>
+              <a:ext uri="{FF2B5EF4-FFF2-40B4-BE49-F238E27FC236}">
+                <a16:creationId xmlns:a16="http://schemas.microsoft.com/office/drawing/2014/main" id="{0CABCAE3-64FC-4149-819F-2C1812824154}"/>
+              </a:ext>
+              <a:ext uri="{C183D7F6-B498-43B3-948B-1728B52AA6E4}">
+                <adec:decorative xmlns:adec="http://schemas.microsoft.com/office/drawing/2017/decorative" val="1"/>
+              </a:ext>
+            </a:extLst>
+          </p:cNvPr>
+          <p:cNvSpPr>
+            <a:spLocks noGrp="1" noRot="1" noChangeAspect="1" noMove="1" noResize="1" noEditPoints="1" noAdjustHandles="1" noChangeArrowheads="1" noChangeShapeType="1" noTextEdit="1"/>
+          </p:cNvSpPr>
+          <p:nvPr>
+            <p:extLst>
+              <p:ext uri="{386F3935-93C4-4BCD-93E2-E3B085C9AB24}">
+                <p16:designElem xmlns:p16="http://schemas.microsoft.com/office/powerpoint/2015/main" val="1"/>
+              </p:ext>
+            </p:extLst>
+          </p:nvPr>
+        </p:nvSpPr>
+        <p:spPr>
+          <a:xfrm>
+            <a:off x="0" y="2019476"/>
+            <a:ext cx="12192000" cy="4105941"/>
+          </a:xfrm>
+          <a:prstGeom prst="rect">
+            <a:avLst/>
+          </a:prstGeom>
+          <a:gradFill flip="none" rotWithShape="1">
+            <a:gsLst>
+              <a:gs pos="0">
+                <a:schemeClr val="bg2">
+                  <a:alpha val="0"/>
+                </a:schemeClr>
+              </a:gs>
+              <a:gs pos="100000">
+                <a:schemeClr val="bg2"/>
+              </a:gs>
+            </a:gsLst>
+            <a:lin ang="5400000" scaled="0"/>
+            <a:tileRect/>
+          </a:gradFill>
+          <a:ln>
+            <a:noFill/>
+          </a:ln>
+        </p:spPr>
+        <p:style>
+          <a:lnRef idx="2">
+            <a:schemeClr val="accent1">
+              <a:shade val="50000"/>
+            </a:schemeClr>
+          </a:lnRef>
+          <a:fillRef idx="1">
+            <a:schemeClr val="accent1"/>
+          </a:fillRef>
+          <a:effectRef idx="0">
+            <a:schemeClr val="accent1"/>
+          </a:effectRef>
+          <a:fontRef idx="minor">
+            <a:schemeClr val="lt1"/>
+          </a:fontRef>
+        </p:style>
+      </p:sp>
+      <p:pic>
+        <p:nvPicPr>
+          <p:cNvPr id="11" name="Picture 10">
+            <a:extLst>
+              <a:ext uri="{FF2B5EF4-FFF2-40B4-BE49-F238E27FC236}">
+                <a16:creationId xmlns:a16="http://schemas.microsoft.com/office/drawing/2014/main" id="{012FDCFE-9AD2-4D8A-8CBF-B3AA37EBF6DD}"/>
+              </a:ext>
+              <a:ext uri="{C183D7F6-B498-43B3-948B-1728B52AA6E4}">
+                <adec:decorative xmlns:adec="http://schemas.microsoft.com/office/drawing/2017/decorative" val="1"/>
+              </a:ext>
+            </a:extLst>
+          </p:cNvPr>
+          <p:cNvPicPr>
+            <a:picLocks noGrp="1" noRot="1" noChangeAspect="1" noMove="1" noResize="1" noEditPoints="1" noAdjustHandles="1" noChangeArrowheads="1" noChangeShapeType="1" noCrop="1"/>
+          </p:cNvPicPr>
+          <p:nvPr>
+            <p:extLst>
+              <p:ext uri="{386F3935-93C4-4BCD-93E2-E3B085C9AB24}">
+                <p16:designElem xmlns:p16="http://schemas.microsoft.com/office/powerpoint/2015/main" val="1"/>
+              </p:ext>
+            </p:extLst>
+          </p:nvPr>
+        </p:nvPicPr>
+        <p:blipFill rotWithShape="1">
+          <a:blip r:embed="rId2">
+            <a:extLst>
+              <a:ext uri="{28A0092B-C50C-407E-A947-70E740481C1C}">
+                <a14:useLocalDpi xmlns:a14="http://schemas.microsoft.com/office/drawing/2010/main" val="0"/>
+              </a:ext>
+            </a:extLst>
+          </a:blip>
+          <a:srcRect t="1538" b="-1538"/>
+          <a:stretch/>
+        </p:blipFill>
+        <p:spPr bwMode="black">
+          <a:xfrm>
+            <a:off x="0" y="6126480"/>
+            <a:ext cx="12192000" cy="742950"/>
+          </a:xfrm>
+          <a:prstGeom prst="rect">
+            <a:avLst/>
+          </a:prstGeom>
+        </p:spPr>
+      </p:pic>
+      <p:cxnSp>
+        <p:nvCxnSpPr>
+          <p:cNvPr id="13" name="Straight Connector 12">
+            <a:extLst>
+              <a:ext uri="{FF2B5EF4-FFF2-40B4-BE49-F238E27FC236}">
+                <a16:creationId xmlns:a16="http://schemas.microsoft.com/office/drawing/2014/main" id="{FBD463FC-4CA8-4FF4-85A3-AF9F4B98D210}"/>
+              </a:ext>
+              <a:ext uri="{C183D7F6-B498-43B3-948B-1728B52AA6E4}">
+                <adec:decorative xmlns:adec="http://schemas.microsoft.com/office/drawing/2017/decorative" val="1"/>
+              </a:ext>
+            </a:extLst>
+          </p:cNvPr>
+          <p:cNvCxnSpPr>
+            <a:cxnSpLocks noGrp="1" noRot="1" noChangeAspect="1" noMove="1" noResize="1" noEditPoints="1" noAdjustHandles="1" noChangeArrowheads="1" noChangeShapeType="1"/>
+          </p:cNvCxnSpPr>
+          <p:nvPr>
+            <p:extLst>
+              <p:ext uri="{386F3935-93C4-4BCD-93E2-E3B085C9AB24}">
+                <p16:designElem xmlns:p16="http://schemas.microsoft.com/office/powerpoint/2015/main" val="1"/>
+              </p:ext>
+            </p:extLst>
+          </p:nvPr>
+        </p:nvCxnSpPr>
+        <p:spPr>
+          <a:xfrm>
+            <a:off x="0" y="6128413"/>
+            <a:ext cx="12192000" cy="0"/>
+          </a:xfrm>
+          <a:prstGeom prst="line">
+            <a:avLst/>
+          </a:prstGeom>
+          <a:ln w="12700">
+            <a:solidFill>
+              <a:srgbClr val="000001">
+                <a:alpha val="20000"/>
+              </a:srgbClr>
+            </a:solidFill>
+          </a:ln>
+        </p:spPr>
+        <p:style>
+          <a:lnRef idx="1">
+            <a:schemeClr val="accent1"/>
+          </a:lnRef>
+          <a:fillRef idx="0">
+            <a:schemeClr val="accent1"/>
+          </a:fillRef>
+          <a:effectRef idx="0">
+            <a:schemeClr val="accent1"/>
+          </a:effectRef>
+          <a:fontRef idx="minor">
+            <a:schemeClr val="tx1"/>
+          </a:fontRef>
+        </p:style>
+      </p:cxnSp>
+      <p:cxnSp>
+        <p:nvCxnSpPr>
+          <p:cNvPr id="15" name="Straight Connector 14">
+            <a:extLst>
+              <a:ext uri="{FF2B5EF4-FFF2-40B4-BE49-F238E27FC236}">
+                <a16:creationId xmlns:a16="http://schemas.microsoft.com/office/drawing/2014/main" id="{BECF35C3-8B44-4F4B-BD25-4C01823DB22A}"/>
+              </a:ext>
+              <a:ext uri="{C183D7F6-B498-43B3-948B-1728B52AA6E4}">
+                <adec:decorative xmlns:adec="http://schemas.microsoft.com/office/drawing/2017/decorative" val="1"/>
+              </a:ext>
+            </a:extLst>
+          </p:cNvPr>
+          <p:cNvCxnSpPr>
+            <a:cxnSpLocks noGrp="1" noRot="1" noChangeAspect="1" noMove="1" noResize="1" noEditPoints="1" noAdjustHandles="1" noChangeArrowheads="1" noChangeShapeType="1"/>
+          </p:cNvCxnSpPr>
+          <p:nvPr>
+            <p:extLst>
+              <p:ext uri="{386F3935-93C4-4BCD-93E2-E3B085C9AB24}">
+                <p16:designElem xmlns:p16="http://schemas.microsoft.com/office/powerpoint/2015/main" val="1"/>
+              </p:ext>
+            </p:extLst>
+          </p:nvPr>
+        </p:nvCxnSpPr>
+        <p:spPr>
+          <a:xfrm>
+            <a:off x="2417780" y="3528542"/>
+            <a:ext cx="8637072" cy="0"/>
+          </a:xfrm>
+          <a:prstGeom prst="line">
+            <a:avLst/>
+          </a:prstGeom>
+          <a:ln w="31750"/>
+        </p:spPr>
+        <p:style>
+          <a:lnRef idx="3">
+            <a:schemeClr val="accent1"/>
+          </a:lnRef>
+          <a:fillRef idx="0">
+            <a:schemeClr val="accent1"/>
+          </a:fillRef>
+          <a:effectRef idx="2">
+            <a:schemeClr val="accent1"/>
+          </a:effectRef>
+          <a:fontRef idx="minor">
+            <a:schemeClr val="tx1"/>
+          </a:fontRef>
+        </p:style>
+      </p:cxnSp>
+      <p:sp useBgFill="1">
+        <p:nvSpPr>
+          <p:cNvPr id="17" name="Rectangle 16">
+            <a:extLst>
+              <a:ext uri="{FF2B5EF4-FFF2-40B4-BE49-F238E27FC236}">
+                <a16:creationId xmlns:a16="http://schemas.microsoft.com/office/drawing/2014/main" id="{D0712110-0BC1-4B31-B3BB-63B44222E87F}"/>
+              </a:ext>
+              <a:ext uri="{C183D7F6-B498-43B3-948B-1728B52AA6E4}">
+                <adec:decorative xmlns:adec="http://schemas.microsoft.com/office/drawing/2017/decorative" val="1"/>
+              </a:ext>
+            </a:extLst>
+          </p:cNvPr>
+          <p:cNvSpPr>
+            <a:spLocks noGrp="1" noRot="1" noChangeAspect="1" noMove="1" noResize="1" noEditPoints="1" noAdjustHandles="1" noChangeArrowheads="1" noChangeShapeType="1" noTextEdit="1"/>
+          </p:cNvSpPr>
+          <p:nvPr>
+            <p:extLst>
+              <p:ext uri="{386F3935-93C4-4BCD-93E2-E3B085C9AB24}">
+                <p16:designElem xmlns:p16="http://schemas.microsoft.com/office/powerpoint/2015/main" val="1"/>
+              </p:ext>
+            </p:extLst>
+          </p:nvPr>
+        </p:nvSpPr>
+        <p:spPr>
+          <a:xfrm>
+            <a:off x="2" y="0"/>
+            <a:ext cx="12191695" cy="6858000"/>
+          </a:xfrm>
+          <a:prstGeom prst="rect">
+            <a:avLst/>
+          </a:prstGeom>
+          <a:ln>
+            <a:noFill/>
+          </a:ln>
+        </p:spPr>
+        <p:style>
+          <a:lnRef idx="2">
+            <a:schemeClr val="accent1">
+              <a:shade val="50000"/>
+            </a:schemeClr>
+          </a:lnRef>
+          <a:fillRef idx="1">
+            <a:schemeClr val="accent1"/>
+          </a:fillRef>
+          <a:effectRef idx="0">
+            <a:schemeClr val="accent1"/>
+          </a:effectRef>
+          <a:fontRef idx="minor">
+            <a:schemeClr val="lt1"/>
+          </a:fontRef>
+        </p:style>
+        <p:txBody>
+          <a:bodyPr rtlCol="0" anchor="ctr"/>
+          <a:lstStyle/>
+          <a:p>
+            <a:pPr algn="ctr"/>
+            <a:endParaRPr lang="en-US"/>
+          </a:p>
+        </p:txBody>
+      </p:sp>
+      <p:sp>
+        <p:nvSpPr>
+          <p:cNvPr id="19" name="Rectangle 18">
+            <a:extLst>
+              <a:ext uri="{FF2B5EF4-FFF2-40B4-BE49-F238E27FC236}">
+                <a16:creationId xmlns:a16="http://schemas.microsoft.com/office/drawing/2014/main" id="{4466B5F3-C053-4580-B04A-1EF949888280}"/>
+              </a:ext>
+              <a:ext uri="{C183D7F6-B498-43B3-948B-1728B52AA6E4}">
+                <adec:decorative xmlns:adec="http://schemas.microsoft.com/office/drawing/2017/decorative" val="1"/>
+              </a:ext>
+            </a:extLst>
+          </p:cNvPr>
+          <p:cNvSpPr>
+            <a:spLocks noGrp="1" noRot="1" noChangeAspect="1" noMove="1" noResize="1" noEditPoints="1" noAdjustHandles="1" noChangeArrowheads="1" noChangeShapeType="1" noTextEdit="1"/>
+          </p:cNvSpPr>
+          <p:nvPr>
+            <p:extLst>
+              <p:ext uri="{386F3935-93C4-4BCD-93E2-E3B085C9AB24}">
+                <p16:designElem xmlns:p16="http://schemas.microsoft.com/office/powerpoint/2015/main" val="1"/>
+              </p:ext>
+            </p:extLst>
+          </p:nvPr>
+        </p:nvSpPr>
+        <p:spPr>
+          <a:xfrm>
+            <a:off x="0" y="2019476"/>
+            <a:ext cx="12192000" cy="4105941"/>
+          </a:xfrm>
+          <a:prstGeom prst="rect">
+            <a:avLst/>
+          </a:prstGeom>
+          <a:gradFill flip="none" rotWithShape="1">
+            <a:gsLst>
+              <a:gs pos="0">
+                <a:schemeClr val="bg2">
+                  <a:alpha val="0"/>
+                </a:schemeClr>
+              </a:gs>
+              <a:gs pos="100000">
+                <a:schemeClr val="bg2"/>
+              </a:gs>
+            </a:gsLst>
+            <a:lin ang="5400000" scaled="0"/>
+            <a:tileRect/>
+          </a:gradFill>
+          <a:ln>
+            <a:noFill/>
+          </a:ln>
+        </p:spPr>
+        <p:style>
+          <a:lnRef idx="2">
+            <a:schemeClr val="accent1">
+              <a:shade val="50000"/>
+            </a:schemeClr>
+          </a:lnRef>
+          <a:fillRef idx="1">
+            <a:schemeClr val="accent1"/>
+          </a:fillRef>
+          <a:effectRef idx="0">
+            <a:schemeClr val="accent1"/>
+          </a:effectRef>
+          <a:fontRef idx="minor">
+            <a:schemeClr val="lt1"/>
+          </a:fontRef>
+        </p:style>
+        <p:txBody>
+          <a:bodyPr rtlCol="0" anchor="ctr"/>
+          <a:lstStyle/>
+          <a:p>
+            <a:pPr lvl="0" algn="ctr"/>
+            <a:endParaRPr lang="en-US"/>
+          </a:p>
+        </p:txBody>
+      </p:sp>
+      <p:sp>
+        <p:nvSpPr>
           <p:cNvPr id="2" name="Title 1">
             <a:extLst>
               <a:ext uri="{FF2B5EF4-FFF2-40B4-BE49-F238E27FC236}">
@@ -4880,19 +5856,73 @@
             <p:ph type="title"/>
           </p:nvPr>
         </p:nvSpPr>
-        <p:spPr/>
-        <p:txBody>
-          <a:bodyPr/>
-          <a:lstStyle/>
-          <a:p>
-            <a:pPr algn="ctr"/>
-            <a:r>
-              <a:rPr lang="en-US" dirty="0"/>
+        <p:spPr>
+          <a:xfrm>
+            <a:off x="1452616" y="962902"/>
+            <a:ext cx="4176384" cy="2380828"/>
+          </a:xfrm>
+        </p:spPr>
+        <p:txBody>
+          <a:bodyPr vert="horz" lIns="91440" tIns="45720" rIns="91440" bIns="0" rtlCol="0" anchor="b">
+            <a:normAutofit/>
+          </a:bodyPr>
+          <a:lstStyle/>
+          <a:p>
+            <a:r>
+              <a:rPr lang="en-US" sz="4400"/>
               <a:t>Data Exploration for Trends</a:t>
             </a:r>
           </a:p>
         </p:txBody>
       </p:sp>
+      <p:cxnSp>
+        <p:nvCxnSpPr>
+          <p:cNvPr id="21" name="Straight Connector 20">
+            <a:extLst>
+              <a:ext uri="{FF2B5EF4-FFF2-40B4-BE49-F238E27FC236}">
+                <a16:creationId xmlns:a16="http://schemas.microsoft.com/office/drawing/2014/main" id="{FA6123F2-4B61-414F-A7E5-5B7828EACAE2}"/>
+              </a:ext>
+              <a:ext uri="{C183D7F6-B498-43B3-948B-1728B52AA6E4}">
+                <adec:decorative xmlns:adec="http://schemas.microsoft.com/office/drawing/2017/decorative" val="1"/>
+              </a:ext>
+            </a:extLst>
+          </p:cNvPr>
+          <p:cNvCxnSpPr>
+            <a:cxnSpLocks noGrp="1" noRot="1" noChangeAspect="1" noMove="1" noResize="1" noEditPoints="1" noAdjustHandles="1" noChangeArrowheads="1" noChangeShapeType="1"/>
+          </p:cNvCxnSpPr>
+          <p:nvPr>
+            <p:extLst>
+              <p:ext uri="{386F3935-93C4-4BCD-93E2-E3B085C9AB24}">
+                <p16:designElem xmlns:p16="http://schemas.microsoft.com/office/powerpoint/2015/main" val="1"/>
+              </p:ext>
+            </p:extLst>
+          </p:nvPr>
+        </p:nvCxnSpPr>
+        <p:spPr>
+          <a:xfrm>
+            <a:off x="1452617" y="3528543"/>
+            <a:ext cx="4171479" cy="0"/>
+          </a:xfrm>
+          <a:prstGeom prst="line">
+            <a:avLst/>
+          </a:prstGeom>
+          <a:ln w="31750"/>
+        </p:spPr>
+        <p:style>
+          <a:lnRef idx="3">
+            <a:schemeClr val="accent1"/>
+          </a:lnRef>
+          <a:fillRef idx="0">
+            <a:schemeClr val="accent1"/>
+          </a:fillRef>
+          <a:effectRef idx="2">
+            <a:schemeClr val="accent1"/>
+          </a:effectRef>
+          <a:fontRef idx="minor">
+            <a:schemeClr val="tx1"/>
+          </a:fontRef>
+        </p:style>
+      </p:cxnSp>
       <p:pic>
         <p:nvPicPr>
           <p:cNvPr id="4" name="Picture 3" descr="Table&#10;&#10;Description automatically generated">
@@ -4908,21 +5938,119 @@
           <p:nvPr/>
         </p:nvPicPr>
         <p:blipFill>
-          <a:blip r:embed="rId2"/>
+          <a:blip r:embed="rId3"/>
           <a:stretch>
             <a:fillRect/>
           </a:stretch>
         </p:blipFill>
         <p:spPr>
           <a:xfrm>
-            <a:off x="3143248" y="2027237"/>
-            <a:ext cx="5529263" cy="3905156"/>
+            <a:off x="6094411" y="1384257"/>
+            <a:ext cx="4960442" cy="3503414"/>
           </a:xfrm>
           <a:prstGeom prst="rect">
             <a:avLst/>
           </a:prstGeom>
         </p:spPr>
       </p:pic>
+      <p:pic>
+        <p:nvPicPr>
+          <p:cNvPr id="23" name="Picture 22">
+            <a:extLst>
+              <a:ext uri="{FF2B5EF4-FFF2-40B4-BE49-F238E27FC236}">
+                <a16:creationId xmlns:a16="http://schemas.microsoft.com/office/drawing/2014/main" id="{25CED634-E2D0-4AB7-96DD-816C9B52C5CF}"/>
+              </a:ext>
+              <a:ext uri="{C183D7F6-B498-43B3-948B-1728B52AA6E4}">
+                <adec:decorative xmlns:adec="http://schemas.microsoft.com/office/drawing/2017/decorative" val="1"/>
+              </a:ext>
+            </a:extLst>
+          </p:cNvPr>
+          <p:cNvPicPr>
+            <a:picLocks noGrp="1" noRot="1" noChangeAspect="1" noMove="1" noResize="1" noEditPoints="1" noAdjustHandles="1" noChangeArrowheads="1" noChangeShapeType="1" noCrop="1"/>
+          </p:cNvPicPr>
+          <p:nvPr>
+            <p:extLst>
+              <p:ext uri="{386F3935-93C4-4BCD-93E2-E3B085C9AB24}">
+                <p16:designElem xmlns:p16="http://schemas.microsoft.com/office/powerpoint/2015/main" val="1"/>
+              </p:ext>
+            </p:extLst>
+          </p:nvPr>
+        </p:nvPicPr>
+        <p:blipFill rotWithShape="1">
+          <a:blip r:embed="rId2">
+            <a:extLst>
+              <a:ext uri="{28A0092B-C50C-407E-A947-70E740481C1C}">
+                <a14:useLocalDpi xmlns:a14="http://schemas.microsoft.com/office/drawing/2010/main" val="0"/>
+              </a:ext>
+            </a:extLst>
+          </a:blip>
+          <a:srcRect t="1538" b="-1538"/>
+          <a:stretch/>
+        </p:blipFill>
+        <p:spPr bwMode="black">
+          <a:xfrm>
+            <a:off x="0" y="6126480"/>
+            <a:ext cx="12192000" cy="742950"/>
+          </a:xfrm>
+          <a:prstGeom prst="rect">
+            <a:avLst/>
+          </a:prstGeom>
+        </p:spPr>
+      </p:pic>
+      <p:cxnSp>
+        <p:nvCxnSpPr>
+          <p:cNvPr id="25" name="Straight Connector 24">
+            <a:extLst>
+              <a:ext uri="{FF2B5EF4-FFF2-40B4-BE49-F238E27FC236}">
+                <a16:creationId xmlns:a16="http://schemas.microsoft.com/office/drawing/2014/main" id="{FCDDCDFB-696D-4FDF-9B58-24F71B7C37BC}"/>
+              </a:ext>
+              <a:ext uri="{C183D7F6-B498-43B3-948B-1728B52AA6E4}">
+                <adec:decorative xmlns:adec="http://schemas.microsoft.com/office/drawing/2017/decorative" val="1"/>
+              </a:ext>
+            </a:extLst>
+          </p:cNvPr>
+          <p:cNvCxnSpPr>
+            <a:cxnSpLocks noGrp="1" noRot="1" noChangeAspect="1" noMove="1" noResize="1" noEditPoints="1" noAdjustHandles="1" noChangeArrowheads="1" noChangeShapeType="1"/>
+          </p:cNvCxnSpPr>
+          <p:nvPr>
+            <p:extLst>
+              <p:ext uri="{386F3935-93C4-4BCD-93E2-E3B085C9AB24}">
+                <p16:designElem xmlns:p16="http://schemas.microsoft.com/office/powerpoint/2015/main" val="1"/>
+              </p:ext>
+            </p:extLst>
+          </p:nvPr>
+        </p:nvCxnSpPr>
+        <p:spPr>
+          <a:xfrm>
+            <a:off x="0" y="6128413"/>
+            <a:ext cx="12192000" cy="0"/>
+          </a:xfrm>
+          <a:prstGeom prst="line">
+            <a:avLst/>
+          </a:prstGeom>
+          <a:ln w="12700">
+            <a:solidFill>
+              <a:srgbClr val="000001">
+                <a:alpha val="20000"/>
+              </a:srgbClr>
+            </a:solidFill>
+          </a:ln>
+        </p:spPr>
+        <p:style>
+          <a:lnRef idx="1">
+            <a:schemeClr val="accent1"/>
+          </a:lnRef>
+          <a:fillRef idx="0">
+            <a:schemeClr val="accent1"/>
+          </a:fillRef>
+          <a:effectRef idx="0">
+            <a:schemeClr val="accent1"/>
+          </a:effectRef>
+          <a:fontRef idx="minor">
+            <a:schemeClr val="tx1"/>
+          </a:fontRef>
+        </p:style>
+      </p:cxnSp>
     </p:spTree>
     <p:extLst>
       <p:ext uri="{BB962C8B-B14F-4D97-AF65-F5344CB8AC3E}">
@@ -5143,7 +6271,7 @@
         <p:spPr/>
         <p:txBody>
           <a:bodyPr>
-            <a:normAutofit/>
+            <a:normAutofit fontScale="90000"/>
           </a:bodyPr>
           <a:lstStyle/>
           <a:p>
@@ -5214,7 +6342,7 @@
         </p:blipFill>
         <p:spPr bwMode="auto">
           <a:xfrm>
-            <a:off x="765175" y="1960562"/>
+            <a:off x="749935" y="2219642"/>
             <a:ext cx="4889500" cy="3365500"/>
           </a:xfrm>
           <a:prstGeom prst="rect">
@@ -5290,7 +6418,7 @@
         </p:blipFill>
         <p:spPr bwMode="auto">
           <a:xfrm>
-            <a:off x="6096000" y="1960562"/>
+            <a:off x="6096000" y="2219642"/>
             <a:ext cx="4889500" cy="3365500"/>
           </a:xfrm>
           <a:prstGeom prst="rect">
@@ -5322,9 +6450,9 @@
 </file>
 
 <file path=ppt/theme/theme1.xml><?xml version="1.0" encoding="utf-8"?>
-<a:theme xmlns:a="http://schemas.openxmlformats.org/drawingml/2006/main" name="Office Theme">
+<a:theme xmlns:a="http://schemas.openxmlformats.org/drawingml/2006/main" name="Gallery">
   <a:themeElements>
-    <a:clrScheme name="Office">
+    <a:clrScheme name="Gallery">
       <a:dk1>
         <a:sysClr val="windowText" lastClr="000000"/>
       </a:dk1>
@@ -5332,39 +6460,39 @@
         <a:sysClr val="window" lastClr="FFFFFF"/>
       </a:lt1>
       <a:dk2>
-        <a:srgbClr val="44546A"/>
+        <a:srgbClr val="454545"/>
       </a:dk2>
       <a:lt2>
-        <a:srgbClr val="E7E6E6"/>
+        <a:srgbClr val="DFDBD5"/>
       </a:lt2>
       <a:accent1>
-        <a:srgbClr val="4472C4"/>
+        <a:srgbClr val="B71E42"/>
       </a:accent1>
       <a:accent2>
-        <a:srgbClr val="ED7D31"/>
+        <a:srgbClr val="DE478E"/>
       </a:accent2>
       <a:accent3>
-        <a:srgbClr val="A5A5A5"/>
+        <a:srgbClr val="BC72F0"/>
       </a:accent3>
       <a:accent4>
-        <a:srgbClr val="FFC000"/>
+        <a:srgbClr val="795FAF"/>
       </a:accent4>
       <a:accent5>
-        <a:srgbClr val="5B9BD5"/>
+        <a:srgbClr val="586EA6"/>
       </a:accent5>
       <a:accent6>
-        <a:srgbClr val="70AD47"/>
+        <a:srgbClr val="6892A0"/>
       </a:accent6>
       <a:hlink>
-        <a:srgbClr val="0563C1"/>
+        <a:srgbClr val="FA2B5C"/>
       </a:hlink>
       <a:folHlink>
-        <a:srgbClr val="954F72"/>
+        <a:srgbClr val="BC658E"/>
       </a:folHlink>
     </a:clrScheme>
-    <a:fontScheme name="Office">
+    <a:fontScheme name="Gallery">
       <a:majorFont>
-        <a:latin typeface="Calibri Light" panose="020F0302020204030204"/>
+        <a:latin typeface="Gill Sans MT" panose="020B0502020104020203"/>
         <a:ea typeface=""/>
         <a:cs typeface=""/>
         <a:font script="Jpan" typeface="游ゴシック Light"/>
@@ -5397,26 +6525,9 @@
         <a:font script="Viet" typeface="Times New Roman"/>
         <a:font script="Uigh" typeface="Microsoft Uighur"/>
         <a:font script="Geor" typeface="Sylfaen"/>
-        <a:font script="Armn" typeface="Arial"/>
-        <a:font script="Bugi" typeface="Leelawadee UI"/>
-        <a:font script="Bopo" typeface="Microsoft JhengHei"/>
-        <a:font script="Java" typeface="Javanese Text"/>
-        <a:font script="Lisu" typeface="Segoe UI"/>
-        <a:font script="Mymr" typeface="Myanmar Text"/>
-        <a:font script="Nkoo" typeface="Ebrima"/>
-        <a:font script="Olck" typeface="Nirmala UI"/>
-        <a:font script="Osma" typeface="Ebrima"/>
-        <a:font script="Phag" typeface="Phagspa"/>
-        <a:font script="Syrn" typeface="Estrangelo Edessa"/>
-        <a:font script="Syrj" typeface="Estrangelo Edessa"/>
-        <a:font script="Syre" typeface="Estrangelo Edessa"/>
-        <a:font script="Sora" typeface="Nirmala UI"/>
-        <a:font script="Tale" typeface="Microsoft Tai Le"/>
-        <a:font script="Talu" typeface="Microsoft New Tai Lue"/>
-        <a:font script="Tfng" typeface="Ebrima"/>
       </a:majorFont>
       <a:minorFont>
-        <a:latin typeface="Calibri" panose="020F0502020204030204"/>
+        <a:latin typeface="Gill Sans MT" panose="020B0502020104020203"/>
         <a:ea typeface=""/>
         <a:cs typeface=""/>
         <a:font script="Jpan" typeface="游ゴシック"/>
@@ -5449,26 +6560,9 @@
         <a:font script="Viet" typeface="Arial"/>
         <a:font script="Uigh" typeface="Microsoft Uighur"/>
         <a:font script="Geor" typeface="Sylfaen"/>
-        <a:font script="Armn" typeface="Arial"/>
-        <a:font script="Bugi" typeface="Leelawadee UI"/>
-        <a:font script="Bopo" typeface="Microsoft JhengHei"/>
-        <a:font script="Java" typeface="Javanese Text"/>
-        <a:font script="Lisu" typeface="Segoe UI"/>
-        <a:font script="Mymr" typeface="Myanmar Text"/>
-        <a:font script="Nkoo" typeface="Ebrima"/>
-        <a:font script="Olck" typeface="Nirmala UI"/>
-        <a:font script="Osma" typeface="Ebrima"/>
-        <a:font script="Phag" typeface="Phagspa"/>
-        <a:font script="Syrn" typeface="Estrangelo Edessa"/>
-        <a:font script="Syrj" typeface="Estrangelo Edessa"/>
-        <a:font script="Syre" typeface="Estrangelo Edessa"/>
-        <a:font script="Sora" typeface="Nirmala UI"/>
-        <a:font script="Tale" typeface="Microsoft Tai Le"/>
-        <a:font script="Talu" typeface="Microsoft New Tai Lue"/>
-        <a:font script="Tfng" typeface="Ebrima"/>
       </a:minorFont>
     </a:fontScheme>
-    <a:fmtScheme name="Office">
+    <a:fmtScheme name="Gallery">
       <a:fillStyleLst>
         <a:solidFill>
           <a:schemeClr val="phClr"/>
@@ -5477,23 +6571,18 @@
           <a:gsLst>
             <a:gs pos="0">
               <a:schemeClr val="phClr">
+                <a:tint val="54000"/>
+                <a:alpha val="100000"/>
+                <a:satMod val="105000"/>
                 <a:lumMod val="110000"/>
-                <a:satMod val="105000"/>
-                <a:tint val="67000"/>
-              </a:schemeClr>
-            </a:gs>
-            <a:gs pos="50000">
-              <a:schemeClr val="phClr">
-                <a:lumMod val="105000"/>
-                <a:satMod val="103000"/>
-                <a:tint val="73000"/>
               </a:schemeClr>
             </a:gs>
             <a:gs pos="100000">
               <a:schemeClr val="phClr">
-                <a:lumMod val="105000"/>
+                <a:tint val="78000"/>
+                <a:alpha val="92000"/>
                 <a:satMod val="109000"/>
-                <a:tint val="81000"/>
+                <a:lumMod val="100000"/>
               </a:schemeClr>
             </a:gs>
           </a:gsLst>
@@ -5503,23 +6592,23 @@
           <a:gsLst>
             <a:gs pos="0">
               <a:schemeClr val="phClr">
-                <a:satMod val="103000"/>
-                <a:lumMod val="102000"/>
-                <a:tint val="94000"/>
+                <a:tint val="98000"/>
+                <a:satMod val="110000"/>
+                <a:lumMod val="104000"/>
               </a:schemeClr>
             </a:gs>
-            <a:gs pos="50000">
+            <a:gs pos="69000">
               <a:schemeClr val="phClr">
-                <a:satMod val="110000"/>
-                <a:lumMod val="100000"/>
-                <a:shade val="100000"/>
+                <a:shade val="88000"/>
+                <a:satMod val="130000"/>
+                <a:lumMod val="92000"/>
               </a:schemeClr>
             </a:gs>
             <a:gs pos="100000">
               <a:schemeClr val="phClr">
-                <a:lumMod val="99000"/>
-                <a:satMod val="120000"/>
                 <a:shade val="78000"/>
+                <a:satMod val="130000"/>
+                <a:lumMod val="92000"/>
               </a:schemeClr>
             </a:gs>
           </a:gsLst>
@@ -5527,26 +6616,23 @@
         </a:gradFill>
       </a:fillStyleLst>
       <a:lnStyleLst>
-        <a:ln w="6350" cap="flat" cmpd="sng" algn="ctr">
+        <a:ln w="9525" cap="flat" cmpd="sng" algn="ctr">
           <a:solidFill>
             <a:schemeClr val="phClr"/>
           </a:solidFill>
           <a:prstDash val="solid"/>
-          <a:miter lim="800000"/>
         </a:ln>
-        <a:ln w="12700" cap="flat" cmpd="sng" algn="ctr">
+        <a:ln w="15875" cap="flat" cmpd="sng" algn="ctr">
           <a:solidFill>
             <a:schemeClr val="phClr"/>
           </a:solidFill>
           <a:prstDash val="solid"/>
-          <a:miter lim="800000"/>
         </a:ln>
-        <a:ln w="19050" cap="flat" cmpd="sng" algn="ctr">
+        <a:ln w="22225" cap="flat" cmpd="sng" algn="ctr">
           <a:solidFill>
             <a:schemeClr val="phClr"/>
           </a:solidFill>
           <a:prstDash val="solid"/>
-          <a:miter lim="800000"/>
         </a:ln>
       </a:lnStyleLst>
       <a:effectStyleLst>
@@ -5558,12 +6644,23 @@
         </a:effectStyle>
         <a:effectStyle>
           <a:effectLst>
-            <a:outerShdw blurRad="57150" dist="19050" dir="5400000" algn="ctr" rotWithShape="0">
+            <a:outerShdw blurRad="50800" dist="50800" dir="5400000" sx="96000" sy="96000" rotWithShape="0">
               <a:srgbClr val="000000">
-                <a:alpha val="63000"/>
+                <a:alpha val="48000"/>
               </a:srgbClr>
             </a:outerShdw>
           </a:effectLst>
+          <a:scene3d>
+            <a:camera prst="orthographicFront">
+              <a:rot lat="0" lon="0" rev="0"/>
+            </a:camera>
+            <a:lightRig rig="balanced" dir="t">
+              <a:rot lat="0" lon="0" rev="1080000"/>
+            </a:lightRig>
+          </a:scene3d>
+          <a:sp3d>
+            <a:bevelT w="38100" h="12700" prst="softRound"/>
+          </a:sp3d>
         </a:effectStyle>
       </a:effectStyleLst>
       <a:bgFillStyleLst>
@@ -5571,37 +6668,26 @@
           <a:schemeClr val="phClr"/>
         </a:solidFill>
         <a:solidFill>
-          <a:schemeClr val="phClr">
-            <a:tint val="95000"/>
-            <a:satMod val="170000"/>
-          </a:schemeClr>
+          <a:schemeClr val="phClr"/>
         </a:solidFill>
         <a:gradFill rotWithShape="1">
           <a:gsLst>
             <a:gs pos="0">
               <a:schemeClr val="phClr">
-                <a:tint val="93000"/>
-                <a:satMod val="150000"/>
-                <a:shade val="98000"/>
-                <a:lumMod val="102000"/>
-              </a:schemeClr>
-            </a:gs>
-            <a:gs pos="50000">
-              <a:schemeClr val="phClr">
-                <a:tint val="98000"/>
-                <a:satMod val="130000"/>
-                <a:shade val="90000"/>
-                <a:lumMod val="103000"/>
+                <a:tint val="94000"/>
+                <a:satMod val="80000"/>
+                <a:lumMod val="106000"/>
               </a:schemeClr>
             </a:gs>
             <a:gs pos="100000">
               <a:schemeClr val="phClr">
-                <a:shade val="63000"/>
-                <a:satMod val="120000"/>
+                <a:shade val="80000"/>
               </a:schemeClr>
             </a:gs>
           </a:gsLst>
-          <a:lin ang="5400000" scaled="0"/>
+          <a:path path="circle">
+            <a:fillToRect l="50000" t="50000" r="50000" b="50000"/>
+          </a:path>
         </a:gradFill>
       </a:bgFillStyleLst>
     </a:fmtScheme>
@@ -5610,7 +6696,7 @@
   <a:extraClrSchemeLst/>
   <a:extLst>
     <a:ext uri="{05A4C25C-085E-4340-85A3-A5531E510DB2}">
-      <thm15:themeFamily xmlns:thm15="http://schemas.microsoft.com/office/thememl/2012/main" name="Office Theme" id="{62F939B6-93AF-4DB8-9C6B-D6C7DFDC589F}" vid="{4A3C46E8-61CC-4603-A589-7422A47A8E4A}"/>
+      <thm15:themeFamily xmlns:thm15="http://schemas.microsoft.com/office/thememl/2012/main" name="Gallery" id="{BBFCD31E-59A1-489D-B089-A3EAD7CAE12E}" vid="{F5E91637-A7B6-4E27-B710-77DA7014EE1E}"/>
     </a:ext>
   </a:extLst>
 </a:theme>

</xml_diff>